<commit_message>
Minor changes to Andre's updated version
git-svn-id: file://localhost/tmp/svn2git/svn@3244 defb5e50-622e-49ec-a68e-d72c7db87b45
</commit_message>
<xml_diff>
--- a/tutorial/general_tutorial/API-Intro-short.pptx
+++ b/tutorial/general_tutorial/API-Intro-short.pptx
@@ -1,6 +1,6 @@
 
 <file path=ppt/presentation.xml><?xml version="1.0" encoding="utf-8"?>
-<p:presentation xmlns:a="http://schemas.openxmlformats.org/drawingml/2006/main" xmlns:r="http://schemas.openxmlformats.org/officeDocument/2006/relationships" xmlns:p="http://schemas.openxmlformats.org/presentationml/2006/main" saveSubsetFonts="1" autoCompressPictures="0">
+<p:presentation xmlns:a="http://schemas.openxmlformats.org/drawingml/2006/main" xmlns:r="http://schemas.openxmlformats.org/officeDocument/2006/relationships" xmlns:mc="http://schemas.openxmlformats.org/markup-compatibility/2006" xmlns:mv="urn:schemas-microsoft-com:mac:vml" xmlns:p="http://schemas.openxmlformats.org/presentationml/2006/main" mc:Ignorable="mv" mc:PreserveAttributes="mv:*" saveSubsetFonts="1" autoCompressPictures="0">
   <p:sldMasterIdLst>
     <p:sldMasterId id="2147483648" r:id="rId1"/>
   </p:sldMasterIdLst>
@@ -156,7 +156,7 @@
 </file>
 
 <file path=ppt/handoutMasters/handoutMaster1.xml><?xml version="1.0" encoding="utf-8"?>
-<p:handoutMaster xmlns:a="http://schemas.openxmlformats.org/drawingml/2006/main" xmlns:r="http://schemas.openxmlformats.org/officeDocument/2006/relationships" xmlns:p="http://schemas.openxmlformats.org/presentationml/2006/main">
+<p:handoutMaster xmlns:a="http://schemas.openxmlformats.org/drawingml/2006/main" xmlns:r="http://schemas.openxmlformats.org/officeDocument/2006/relationships" xmlns:mc="http://schemas.openxmlformats.org/markup-compatibility/2006" xmlns:mv="urn:schemas-microsoft-com:mac:vml" xmlns:p="http://schemas.openxmlformats.org/presentationml/2006/main" mc:Ignorable="mv" mc:PreserveAttributes="mv:*">
   <p:cSld>
     <p:bg>
       <p:bgRef idx="1001">
@@ -238,7 +238,7 @@
             <a:fld id="{9A6AC4B2-6F12-454D-8DA7-7B9C78843B81}" type="datetimeFigureOut">
               <a:rPr lang="en-US" smtClean="0"/>
               <a:pPr/>
-              <a:t>11/27/2010</a:t>
+              <a:t>11/27/10</a:t>
             </a:fld>
             <a:endParaRPr lang="en-US"/>
           </a:p>
@@ -314,7 +314,7 @@
     </p:spTree>
     <p:extLst>
       <p:ext uri="{BB962C8B-B14F-4D97-AF65-F5344CB8AC3E}">
-        <p14:creationId xmlns:p14="http://schemas.microsoft.com/office/powerpoint/2010/main" val="1850353593"/>
+        <p14:creationId xmlns:p14="http://schemas.microsoft.com/office/powerpoint/2010/main" xmlns:p="http://schemas.openxmlformats.org/presentationml/2006/main" xmlns:r="http://schemas.openxmlformats.org/officeDocument/2006/relationships" xmlns:a="http://schemas.openxmlformats.org/drawingml/2006/main" xmlns="" val="1850353593"/>
       </p:ext>
     </p:extLst>
   </p:cSld>
@@ -324,7 +324,7 @@
 </file>
 
 <file path=ppt/notesMasters/notesMaster1.xml><?xml version="1.0" encoding="utf-8"?>
-<p:notesMaster xmlns:a="http://schemas.openxmlformats.org/drawingml/2006/main" xmlns:r="http://schemas.openxmlformats.org/officeDocument/2006/relationships" xmlns:p="http://schemas.openxmlformats.org/presentationml/2006/main">
+<p:notesMaster xmlns:a="http://schemas.openxmlformats.org/drawingml/2006/main" xmlns:r="http://schemas.openxmlformats.org/officeDocument/2006/relationships" xmlns:mc="http://schemas.openxmlformats.org/markup-compatibility/2006" xmlns:mv="urn:schemas-microsoft-com:mac:vml" xmlns:p="http://schemas.openxmlformats.org/presentationml/2006/main" mc:Ignorable="mv" mc:PreserveAttributes="mv:*">
   <p:cSld>
     <p:bg>
       <p:bgRef idx="1001">
@@ -406,7 +406,7 @@
             <a:fld id="{19F24AD4-A78B-B645-8B43-825B1EB2901C}" type="datetimeFigureOut">
               <a:rPr lang="en-US" smtClean="0"/>
               <a:pPr/>
-              <a:t>11/27/2010</a:t>
+              <a:t>11/27/10</a:t>
             </a:fld>
             <a:endParaRPr lang="en-US"/>
           </a:p>
@@ -577,7 +577,7 @@
     </p:spTree>
     <p:extLst>
       <p:ext uri="{BB962C8B-B14F-4D97-AF65-F5344CB8AC3E}">
-        <p14:creationId xmlns:p14="http://schemas.microsoft.com/office/powerpoint/2010/main" val="1953130109"/>
+        <p14:creationId xmlns:p14="http://schemas.microsoft.com/office/powerpoint/2010/main" xmlns:p="http://schemas.openxmlformats.org/presentationml/2006/main" xmlns:r="http://schemas.openxmlformats.org/officeDocument/2006/relationships" xmlns:a="http://schemas.openxmlformats.org/drawingml/2006/main" xmlns="" val="1953130109"/>
       </p:ext>
     </p:extLst>
   </p:cSld>
@@ -679,7 +679,7 @@
 </file>
 
 <file path=ppt/notesSlides/notesSlide1.xml><?xml version="1.0" encoding="utf-8"?>
-<p:notes xmlns:a="http://schemas.openxmlformats.org/drawingml/2006/main" xmlns:r="http://schemas.openxmlformats.org/officeDocument/2006/relationships" xmlns:p="http://schemas.openxmlformats.org/presentationml/2006/main">
+<p:notes xmlns:a="http://schemas.openxmlformats.org/drawingml/2006/main" xmlns:r="http://schemas.openxmlformats.org/officeDocument/2006/relationships" xmlns:mc="http://schemas.openxmlformats.org/markup-compatibility/2006" xmlns:mv="urn:schemas-microsoft-com:mac:vml" xmlns:p="http://schemas.openxmlformats.org/presentationml/2006/main" mc:Ignorable="mv" mc:PreserveAttributes="mv:*">
   <p:cSld>
     <p:spTree>
       <p:nvGrpSpPr>
@@ -761,7 +761,7 @@
 </file>
 
 <file path=ppt/slideLayouts/slideLayout1.xml><?xml version="1.0" encoding="utf-8"?>
-<p:sldLayout xmlns:a="http://schemas.openxmlformats.org/drawingml/2006/main" xmlns:r="http://schemas.openxmlformats.org/officeDocument/2006/relationships" xmlns:p="http://schemas.openxmlformats.org/presentationml/2006/main" preserve="1" userDrawn="1">
+<p:sldLayout xmlns:a="http://schemas.openxmlformats.org/drawingml/2006/main" xmlns:r="http://schemas.openxmlformats.org/officeDocument/2006/relationships" xmlns:mc="http://schemas.openxmlformats.org/markup-compatibility/2006" xmlns:mv="urn:schemas-microsoft-com:mac:vml" xmlns:p="http://schemas.openxmlformats.org/presentationml/2006/main" mc:Ignorable="mv" mc:PreserveAttributes="mv:*" preserve="1" userDrawn="1">
   <p:cSld name="Title Slide">
     <p:spTree>
       <p:nvGrpSpPr>
@@ -947,7 +947,7 @@
             <a:fld id="{ADB8239A-D789-5443-937F-338E3AE3D41C}" type="datetime1">
               <a:rPr lang="en-US" smtClean="0"/>
               <a:pPr/>
-              <a:t>11/27/2010</a:t>
+              <a:t>11/27/10</a:t>
             </a:fld>
             <a:endParaRPr lang="en-US"/>
           </a:p>
@@ -986,7 +986,7 @@
 </file>
 
 <file path=ppt/slideLayouts/slideLayout10.xml><?xml version="1.0" encoding="utf-8"?>
-<p:sldLayout xmlns:a="http://schemas.openxmlformats.org/drawingml/2006/main" xmlns:r="http://schemas.openxmlformats.org/officeDocument/2006/relationships" xmlns:p="http://schemas.openxmlformats.org/presentationml/2006/main" type="picTx" preserve="1">
+<p:sldLayout xmlns:a="http://schemas.openxmlformats.org/drawingml/2006/main" xmlns:r="http://schemas.openxmlformats.org/officeDocument/2006/relationships" xmlns:mc="http://schemas.openxmlformats.org/markup-compatibility/2006" xmlns:mv="urn:schemas-microsoft-com:mac:vml" xmlns:p="http://schemas.openxmlformats.org/presentationml/2006/main" mc:Ignorable="mv" mc:PreserveAttributes="mv:*" type="picTx" preserve="1">
   <p:cSld name="Picture with Caption">
     <p:spTree>
       <p:nvGrpSpPr>
@@ -1251,7 +1251,7 @@
             <a:fld id="{459EC1CE-E98D-704D-AD6F-6E3323A36483}" type="datetime1">
               <a:rPr lang="en-US" smtClean="0"/>
               <a:pPr/>
-              <a:t>11/27/2010</a:t>
+              <a:t>11/27/10</a:t>
             </a:fld>
             <a:endParaRPr lang="en-US"/>
           </a:p>
@@ -1309,7 +1309,7 @@
 </file>
 
 <file path=ppt/slideLayouts/slideLayout11.xml><?xml version="1.0" encoding="utf-8"?>
-<p:sldLayout xmlns:a="http://schemas.openxmlformats.org/drawingml/2006/main" xmlns:r="http://schemas.openxmlformats.org/officeDocument/2006/relationships" xmlns:p="http://schemas.openxmlformats.org/presentationml/2006/main" preserve="1">
+<p:sldLayout xmlns:a="http://schemas.openxmlformats.org/drawingml/2006/main" xmlns:r="http://schemas.openxmlformats.org/officeDocument/2006/relationships" xmlns:mc="http://schemas.openxmlformats.org/markup-compatibility/2006" xmlns:mv="urn:schemas-microsoft-com:mac:vml" xmlns:p="http://schemas.openxmlformats.org/presentationml/2006/main" mc:Ignorable="mv" mc:PreserveAttributes="mv:*" preserve="1">
   <p:cSld name="Picture above Caption">
     <p:spTree>
       <p:nvGrpSpPr>
@@ -1527,7 +1527,7 @@
             <a:fld id="{23E692A5-8B3E-1949-B0CC-6F0593ACFA8E}" type="datetime1">
               <a:rPr lang="en-US" smtClean="0"/>
               <a:pPr/>
-              <a:t>11/27/2010</a:t>
+              <a:t>11/27/10</a:t>
             </a:fld>
             <a:endParaRPr lang="en-US"/>
           </a:p>
@@ -1596,7 +1596,7 @@
 </file>
 
 <file path=ppt/slideLayouts/slideLayout12.xml><?xml version="1.0" encoding="utf-8"?>
-<p:sldLayout xmlns:a="http://schemas.openxmlformats.org/drawingml/2006/main" xmlns:r="http://schemas.openxmlformats.org/officeDocument/2006/relationships" xmlns:p="http://schemas.openxmlformats.org/presentationml/2006/main" preserve="1">
+<p:sldLayout xmlns:a="http://schemas.openxmlformats.org/drawingml/2006/main" xmlns:r="http://schemas.openxmlformats.org/officeDocument/2006/relationships" xmlns:mc="http://schemas.openxmlformats.org/markup-compatibility/2006" xmlns:mv="urn:schemas-microsoft-com:mac:vml" xmlns:p="http://schemas.openxmlformats.org/presentationml/2006/main" mc:Ignorable="mv" mc:PreserveAttributes="mv:*" preserve="1">
   <p:cSld name="2 Pictures with Caption">
     <p:spTree>
       <p:nvGrpSpPr>
@@ -1819,7 +1819,7 @@
             <a:fld id="{C381DA14-A3C0-9C42-96F2-BEE3D5DE963D}" type="datetime1">
               <a:rPr lang="en-US" smtClean="0"/>
               <a:pPr/>
-              <a:t>11/27/2010</a:t>
+              <a:t>11/27/10</a:t>
             </a:fld>
             <a:endParaRPr lang="en-US"/>
           </a:p>
@@ -1923,7 +1923,7 @@
 </file>
 
 <file path=ppt/slideLayouts/slideLayout13.xml><?xml version="1.0" encoding="utf-8"?>
-<p:sldLayout xmlns:a="http://schemas.openxmlformats.org/drawingml/2006/main" xmlns:r="http://schemas.openxmlformats.org/officeDocument/2006/relationships" xmlns:p="http://schemas.openxmlformats.org/presentationml/2006/main" preserve="1">
+<p:sldLayout xmlns:a="http://schemas.openxmlformats.org/drawingml/2006/main" xmlns:r="http://schemas.openxmlformats.org/officeDocument/2006/relationships" xmlns:mc="http://schemas.openxmlformats.org/markup-compatibility/2006" xmlns:mv="urn:schemas-microsoft-com:mac:vml" xmlns:p="http://schemas.openxmlformats.org/presentationml/2006/main" mc:Ignorable="mv" mc:PreserveAttributes="mv:*" preserve="1">
   <p:cSld name="3 Pictures with Caption">
     <p:spTree>
       <p:nvGrpSpPr>
@@ -2146,7 +2146,7 @@
             <a:fld id="{33319320-9A5F-694B-B7B5-C734EC93AAA2}" type="datetime1">
               <a:rPr lang="en-US" smtClean="0"/>
               <a:pPr/>
-              <a:t>11/27/2010</a:t>
+              <a:t>11/27/10</a:t>
             </a:fld>
             <a:endParaRPr lang="en-US"/>
           </a:p>
@@ -2285,7 +2285,7 @@
 </file>
 
 <file path=ppt/slideLayouts/slideLayout14.xml><?xml version="1.0" encoding="utf-8"?>
-<p:sldLayout xmlns:a="http://schemas.openxmlformats.org/drawingml/2006/main" xmlns:r="http://schemas.openxmlformats.org/officeDocument/2006/relationships" xmlns:p="http://schemas.openxmlformats.org/presentationml/2006/main" type="vertTx" preserve="1">
+<p:sldLayout xmlns:a="http://schemas.openxmlformats.org/drawingml/2006/main" xmlns:r="http://schemas.openxmlformats.org/officeDocument/2006/relationships" xmlns:mc="http://schemas.openxmlformats.org/markup-compatibility/2006" xmlns:mv="urn:schemas-microsoft-com:mac:vml" xmlns:p="http://schemas.openxmlformats.org/presentationml/2006/main" mc:Ignorable="mv" mc:PreserveAttributes="mv:*" type="vertTx" preserve="1">
   <p:cSld name="Title and Vertical Text">
     <p:spTree>
       <p:nvGrpSpPr>
@@ -2394,7 +2394,7 @@
             <a:fld id="{CF6CE397-A6E6-7547-B24A-92BB5049E0F2}" type="datetime1">
               <a:rPr lang="en-US" smtClean="0"/>
               <a:pPr/>
-              <a:t>11/27/2010</a:t>
+              <a:t>11/27/10</a:t>
             </a:fld>
             <a:endParaRPr lang="en-US"/>
           </a:p>
@@ -2452,7 +2452,7 @@
 </file>
 
 <file path=ppt/slideLayouts/slideLayout15.xml><?xml version="1.0" encoding="utf-8"?>
-<p:sldLayout xmlns:a="http://schemas.openxmlformats.org/drawingml/2006/main" xmlns:r="http://schemas.openxmlformats.org/officeDocument/2006/relationships" xmlns:p="http://schemas.openxmlformats.org/presentationml/2006/main" type="vertTitleAndTx" preserve="1">
+<p:sldLayout xmlns:a="http://schemas.openxmlformats.org/drawingml/2006/main" xmlns:r="http://schemas.openxmlformats.org/officeDocument/2006/relationships" xmlns:mc="http://schemas.openxmlformats.org/markup-compatibility/2006" xmlns:mv="urn:schemas-microsoft-com:mac:vml" xmlns:p="http://schemas.openxmlformats.org/presentationml/2006/main" mc:Ignorable="mv" mc:PreserveAttributes="mv:*" type="vertTitleAndTx" preserve="1">
   <p:cSld name="Vertical Title and Text">
     <p:spTree>
       <p:nvGrpSpPr>
@@ -2571,7 +2571,7 @@
             <a:fld id="{27AB7D46-BD5E-E641-9118-DCE28F3B83FA}" type="datetime1">
               <a:rPr lang="en-US" smtClean="0"/>
               <a:pPr/>
-              <a:t>11/27/2010</a:t>
+              <a:t>11/27/10</a:t>
             </a:fld>
             <a:endParaRPr lang="en-US"/>
           </a:p>
@@ -2629,7 +2629,7 @@
 </file>
 
 <file path=ppt/slideLayouts/slideLayout2.xml><?xml version="1.0" encoding="utf-8"?>
-<p:sldLayout xmlns:a="http://schemas.openxmlformats.org/drawingml/2006/main" xmlns:r="http://schemas.openxmlformats.org/officeDocument/2006/relationships" xmlns:p="http://schemas.openxmlformats.org/presentationml/2006/main" type="obj" preserve="1">
+<p:sldLayout xmlns:a="http://schemas.openxmlformats.org/drawingml/2006/main" xmlns:r="http://schemas.openxmlformats.org/officeDocument/2006/relationships" xmlns:mc="http://schemas.openxmlformats.org/markup-compatibility/2006" xmlns:mv="urn:schemas-microsoft-com:mac:vml" xmlns:p="http://schemas.openxmlformats.org/presentationml/2006/main" mc:Ignorable="mv" mc:PreserveAttributes="mv:*" type="obj" preserve="1">
   <p:cSld name="Title and Content">
     <p:spTree>
       <p:nvGrpSpPr>
@@ -2823,7 +2823,7 @@
             <a:fld id="{BC26097E-015C-3B4D-86C1-CD2AD30F0B81}" type="datetime1">
               <a:rPr lang="en-US" smtClean="0"/>
               <a:pPr/>
-              <a:t>11/27/2010</a:t>
+              <a:t>11/27/10</a:t>
             </a:fld>
             <a:endParaRPr lang="en-US"/>
           </a:p>
@@ -2886,7 +2886,7 @@
 </file>
 
 <file path=ppt/slideLayouts/slideLayout3.xml><?xml version="1.0" encoding="utf-8"?>
-<p:sldLayout xmlns:a="http://schemas.openxmlformats.org/drawingml/2006/main" xmlns:r="http://schemas.openxmlformats.org/officeDocument/2006/relationships" xmlns:p="http://schemas.openxmlformats.org/presentationml/2006/main" preserve="1">
+<p:sldLayout xmlns:a="http://schemas.openxmlformats.org/drawingml/2006/main" xmlns:r="http://schemas.openxmlformats.org/officeDocument/2006/relationships" xmlns:mc="http://schemas.openxmlformats.org/markup-compatibility/2006" xmlns:mv="urn:schemas-microsoft-com:mac:vml" xmlns:p="http://schemas.openxmlformats.org/presentationml/2006/main" mc:Ignorable="mv" mc:PreserveAttributes="mv:*" preserve="1">
   <p:cSld name="Title Slide with Picture">
     <p:spTree>
       <p:nvGrpSpPr>
@@ -3099,7 +3099,7 @@
             <a:fld id="{ED6649F4-2545-3040-B7BD-803CA59D50C7}" type="datetime1">
               <a:rPr lang="en-US" smtClean="0"/>
               <a:pPr/>
-              <a:t>11/27/2010</a:t>
+              <a:t>11/27/10</a:t>
             </a:fld>
             <a:endParaRPr lang="en-US"/>
           </a:p>
@@ -3168,7 +3168,7 @@
 </file>
 
 <file path=ppt/slideLayouts/slideLayout4.xml><?xml version="1.0" encoding="utf-8"?>
-<p:sldLayout xmlns:a="http://schemas.openxmlformats.org/drawingml/2006/main" xmlns:r="http://schemas.openxmlformats.org/officeDocument/2006/relationships" xmlns:p="http://schemas.openxmlformats.org/presentationml/2006/main" type="secHead" preserve="1">
+<p:sldLayout xmlns:a="http://schemas.openxmlformats.org/drawingml/2006/main" xmlns:r="http://schemas.openxmlformats.org/officeDocument/2006/relationships" xmlns:mc="http://schemas.openxmlformats.org/markup-compatibility/2006" xmlns:mv="urn:schemas-microsoft-com:mac:vml" xmlns:p="http://schemas.openxmlformats.org/presentationml/2006/main" mc:Ignorable="mv" mc:PreserveAttributes="mv:*" type="secHead" preserve="1">
   <p:cSld name="Section Header">
     <p:spTree>
       <p:nvGrpSpPr>
@@ -3407,7 +3407,7 @@
             <a:fld id="{833A9088-CEDD-2F48-A9A0-611A3CC03FE9}" type="datetime1">
               <a:rPr lang="en-US" smtClean="0"/>
               <a:pPr/>
-              <a:t>11/27/2010</a:t>
+              <a:t>11/27/10</a:t>
             </a:fld>
             <a:endParaRPr lang="en-US"/>
           </a:p>
@@ -3465,7 +3465,7 @@
 </file>
 
 <file path=ppt/slideLayouts/slideLayout5.xml><?xml version="1.0" encoding="utf-8"?>
-<p:sldLayout xmlns:a="http://schemas.openxmlformats.org/drawingml/2006/main" xmlns:r="http://schemas.openxmlformats.org/officeDocument/2006/relationships" xmlns:p="http://schemas.openxmlformats.org/presentationml/2006/main" type="twoObj" preserve="1">
+<p:sldLayout xmlns:a="http://schemas.openxmlformats.org/drawingml/2006/main" xmlns:r="http://schemas.openxmlformats.org/officeDocument/2006/relationships" xmlns:mc="http://schemas.openxmlformats.org/markup-compatibility/2006" xmlns:mv="urn:schemas-microsoft-com:mac:vml" xmlns:p="http://schemas.openxmlformats.org/presentationml/2006/main" mc:Ignorable="mv" mc:PreserveAttributes="mv:*" type="twoObj" preserve="1">
   <p:cSld name="Two Content">
     <p:spTree>
       <p:nvGrpSpPr>
@@ -3701,7 +3701,7 @@
             <a:fld id="{AED87ACF-EB3C-EA42-8610-542FB50388EB}" type="datetime1">
               <a:rPr lang="en-US" smtClean="0"/>
               <a:pPr/>
-              <a:t>11/27/2010</a:t>
+              <a:t>11/27/10</a:t>
             </a:fld>
             <a:endParaRPr lang="en-US"/>
           </a:p>
@@ -3759,7 +3759,7 @@
 </file>
 
 <file path=ppt/slideLayouts/slideLayout6.xml><?xml version="1.0" encoding="utf-8"?>
-<p:sldLayout xmlns:a="http://schemas.openxmlformats.org/drawingml/2006/main" xmlns:r="http://schemas.openxmlformats.org/officeDocument/2006/relationships" xmlns:p="http://schemas.openxmlformats.org/presentationml/2006/main" type="twoTxTwoObj" preserve="1">
+<p:sldLayout xmlns:a="http://schemas.openxmlformats.org/drawingml/2006/main" xmlns:r="http://schemas.openxmlformats.org/officeDocument/2006/relationships" xmlns:mc="http://schemas.openxmlformats.org/markup-compatibility/2006" xmlns:mv="urn:schemas-microsoft-com:mac:vml" xmlns:p="http://schemas.openxmlformats.org/presentationml/2006/main" mc:Ignorable="mv" mc:PreserveAttributes="mv:*" type="twoTxTwoObj" preserve="1">
   <p:cSld name="Comparison">
     <p:spTree>
       <p:nvGrpSpPr>
@@ -4133,7 +4133,7 @@
             <a:fld id="{0E0DC31B-692F-774E-A937-DA560DE61DA8}" type="datetime1">
               <a:rPr lang="en-US" smtClean="0"/>
               <a:pPr/>
-              <a:t>11/27/2010</a:t>
+              <a:t>11/27/10</a:t>
             </a:fld>
             <a:endParaRPr lang="en-US"/>
           </a:p>
@@ -4424,7 +4424,7 @@
 </file>
 
 <file path=ppt/slideLayouts/slideLayout7.xml><?xml version="1.0" encoding="utf-8"?>
-<p:sldLayout xmlns:a="http://schemas.openxmlformats.org/drawingml/2006/main" xmlns:r="http://schemas.openxmlformats.org/officeDocument/2006/relationships" xmlns:p="http://schemas.openxmlformats.org/presentationml/2006/main" type="titleOnly" preserve="1">
+<p:sldLayout xmlns:a="http://schemas.openxmlformats.org/drawingml/2006/main" xmlns:r="http://schemas.openxmlformats.org/officeDocument/2006/relationships" xmlns:mc="http://schemas.openxmlformats.org/markup-compatibility/2006" xmlns:mv="urn:schemas-microsoft-com:mac:vml" xmlns:p="http://schemas.openxmlformats.org/presentationml/2006/main" mc:Ignorable="mv" mc:PreserveAttributes="mv:*" type="titleOnly" preserve="1">
   <p:cSld name="Title Only">
     <p:spTree>
       <p:nvGrpSpPr>
@@ -4481,7 +4481,7 @@
             <a:fld id="{95DEFDAE-5BDC-1B4F-BC4C-23C867CEBC21}" type="datetime1">
               <a:rPr lang="en-US" smtClean="0"/>
               <a:pPr/>
-              <a:t>11/27/2010</a:t>
+              <a:t>11/27/10</a:t>
             </a:fld>
             <a:endParaRPr lang="en-US"/>
           </a:p>
@@ -4539,7 +4539,7 @@
 </file>
 
 <file path=ppt/slideLayouts/slideLayout8.xml><?xml version="1.0" encoding="utf-8"?>
-<p:sldLayout xmlns:a="http://schemas.openxmlformats.org/drawingml/2006/main" xmlns:r="http://schemas.openxmlformats.org/officeDocument/2006/relationships" xmlns:p="http://schemas.openxmlformats.org/presentationml/2006/main" type="blank" preserve="1">
+<p:sldLayout xmlns:a="http://schemas.openxmlformats.org/drawingml/2006/main" xmlns:r="http://schemas.openxmlformats.org/officeDocument/2006/relationships" xmlns:mc="http://schemas.openxmlformats.org/markup-compatibility/2006" xmlns:mv="urn:schemas-microsoft-com:mac:vml" xmlns:p="http://schemas.openxmlformats.org/presentationml/2006/main" mc:Ignorable="mv" mc:PreserveAttributes="mv:*" type="blank" preserve="1">
   <p:cSld name="Blank">
     <p:spTree>
       <p:nvGrpSpPr>
@@ -4573,7 +4573,7 @@
             <a:fld id="{9F53C516-787B-9A45-AFCF-5D75DD78DEBE}" type="datetime1">
               <a:rPr lang="en-US" smtClean="0"/>
               <a:pPr/>
-              <a:t>11/27/2010</a:t>
+              <a:t>11/27/10</a:t>
             </a:fld>
             <a:endParaRPr lang="en-US"/>
           </a:p>
@@ -4631,7 +4631,7 @@
 </file>
 
 <file path=ppt/slideLayouts/slideLayout9.xml><?xml version="1.0" encoding="utf-8"?>
-<p:sldLayout xmlns:a="http://schemas.openxmlformats.org/drawingml/2006/main" xmlns:r="http://schemas.openxmlformats.org/officeDocument/2006/relationships" xmlns:p="http://schemas.openxmlformats.org/presentationml/2006/main" type="objTx" preserve="1">
+<p:sldLayout xmlns:a="http://schemas.openxmlformats.org/drawingml/2006/main" xmlns:r="http://schemas.openxmlformats.org/officeDocument/2006/relationships" xmlns:mc="http://schemas.openxmlformats.org/markup-compatibility/2006" xmlns:mv="urn:schemas-microsoft-com:mac:vml" xmlns:p="http://schemas.openxmlformats.org/presentationml/2006/main" mc:Ignorable="mv" mc:PreserveAttributes="mv:*" type="objTx" preserve="1">
   <p:cSld name="Content with Caption">
     <p:spTree>
       <p:nvGrpSpPr>
@@ -4912,7 +4912,7 @@
             <a:fld id="{F19CAA94-9393-BB4A-8CB6-008B1351A132}" type="datetime1">
               <a:rPr lang="en-US" smtClean="0"/>
               <a:pPr/>
-              <a:t>11/27/2010</a:t>
+              <a:t>11/27/10</a:t>
             </a:fld>
             <a:endParaRPr lang="en-US"/>
           </a:p>
@@ -4970,7 +4970,7 @@
 </file>
 
 <file path=ppt/slideMasters/slideMaster1.xml><?xml version="1.0" encoding="utf-8"?>
-<p:sldMaster xmlns:a="http://schemas.openxmlformats.org/drawingml/2006/main" xmlns:r="http://schemas.openxmlformats.org/officeDocument/2006/relationships" xmlns:p="http://schemas.openxmlformats.org/presentationml/2006/main">
+<p:sldMaster xmlns:a="http://schemas.openxmlformats.org/drawingml/2006/main" xmlns:r="http://schemas.openxmlformats.org/officeDocument/2006/relationships" xmlns:mc="http://schemas.openxmlformats.org/markup-compatibility/2006" xmlns:mv="urn:schemas-microsoft-com:mac:vml" xmlns:p="http://schemas.openxmlformats.org/presentationml/2006/main" mc:Ignorable="mv" mc:PreserveAttributes="mv:*">
   <p:cSld>
     <p:bg>
       <p:bgRef idx="1001">
@@ -5126,7 +5126,7 @@
             <a:fld id="{A3476A5E-2ED6-7749-A8C1-D0B1EEEB97E0}" type="datetime1">
               <a:rPr lang="en-US" smtClean="0"/>
               <a:pPr/>
-              <a:t>11/27/2010</a:t>
+              <a:t>11/27/10</a:t>
             </a:fld>
             <a:endParaRPr lang="en-US"/>
           </a:p>
@@ -5620,7 +5620,7 @@
 </file>
 
 <file path=ppt/slides/slide1.xml><?xml version="1.0" encoding="utf-8"?>
-<p:sld xmlns:a="http://schemas.openxmlformats.org/drawingml/2006/main" xmlns:r="http://schemas.openxmlformats.org/officeDocument/2006/relationships" xmlns:p="http://schemas.openxmlformats.org/presentationml/2006/main">
+<p:sld xmlns:a="http://schemas.openxmlformats.org/drawingml/2006/main" xmlns:r="http://schemas.openxmlformats.org/officeDocument/2006/relationships" xmlns:mc="http://schemas.openxmlformats.org/markup-compatibility/2006" xmlns:mv="urn:schemas-microsoft-com:mac:vml" xmlns:p="http://schemas.openxmlformats.org/presentationml/2006/main" mc:Ignorable="mv" mc:PreserveAttributes="mv:*">
   <p:cSld>
     <p:spTree>
       <p:nvGrpSpPr>
@@ -5769,7 +5769,7 @@
 </file>
 
 <file path=ppt/slides/slide10.xml><?xml version="1.0" encoding="utf-8"?>
-<p:sld xmlns:a="http://schemas.openxmlformats.org/drawingml/2006/main" xmlns:r="http://schemas.openxmlformats.org/officeDocument/2006/relationships" xmlns:p="http://schemas.openxmlformats.org/presentationml/2006/main">
+<p:sld xmlns:a="http://schemas.openxmlformats.org/drawingml/2006/main" xmlns:r="http://schemas.openxmlformats.org/officeDocument/2006/relationships" xmlns:mc="http://schemas.openxmlformats.org/markup-compatibility/2006" xmlns:mv="urn:schemas-microsoft-com:mac:vml" xmlns:p="http://schemas.openxmlformats.org/presentationml/2006/main" mc:Ignorable="mv" mc:PreserveAttributes="mv:*">
   <p:cSld>
     <p:spTree>
       <p:nvGrpSpPr>
@@ -5818,8 +5818,8 @@
             <p:ph idx="1"/>
           </p:nvPr>
         </p:nvPicPr>
-        <mc:AlternateContent xmlns:mc="http://schemas.openxmlformats.org/markup-compatibility/2006">
-          <mc:Choice xmlns:ma="http://schemas.microsoft.com/office/mac/drawingml/2008/main" xmlns:mv="urn:schemas-microsoft-com:mac:vml" xmlns="" Requires="ma">
+        <mc:AlternateContent xmlns:ma="http://schemas.microsoft.com/office/mac/drawingml/2008/main">
+          <mc:Choice Requires="ma">
             <p:blipFill>
               <a:blip r:embed="rId2"/>
               <a:stretch>
@@ -5827,7 +5827,7 @@
               </a:stretch>
             </p:blipFill>
           </mc:Choice>
-          <mc:Fallback>
+          <mc:Fallback xmlns:mc="http://schemas.openxmlformats.org/markup-compatibility/2006" xmlns:p="http://schemas.openxmlformats.org/presentationml/2006/main" xmlns:r="http://schemas.openxmlformats.org/officeDocument/2006/relationships" xmlns:a="http://schemas.openxmlformats.org/drawingml/2006/main" xmlns="">
             <p:blipFill>
               <a:blip r:embed="rId3"/>
               <a:stretch>
@@ -5852,7 +5852,7 @@
 </file>
 
 <file path=ppt/slides/slide11.xml><?xml version="1.0" encoding="utf-8"?>
-<p:sld xmlns:a="http://schemas.openxmlformats.org/drawingml/2006/main" xmlns:r="http://schemas.openxmlformats.org/officeDocument/2006/relationships" xmlns:p="http://schemas.openxmlformats.org/presentationml/2006/main">
+<p:sld xmlns:a="http://schemas.openxmlformats.org/drawingml/2006/main" xmlns:r="http://schemas.openxmlformats.org/officeDocument/2006/relationships" xmlns:mc="http://schemas.openxmlformats.org/markup-compatibility/2006" xmlns:mv="urn:schemas-microsoft-com:mac:vml" xmlns:p="http://schemas.openxmlformats.org/presentationml/2006/main" mc:Ignorable="mv" mc:PreserveAttributes="mv:*">
   <p:cSld>
     <p:spTree>
       <p:nvGrpSpPr>
@@ -5916,7 +5916,7 @@
     </p:spTree>
     <p:extLst>
       <p:ext uri="{BB962C8B-B14F-4D97-AF65-F5344CB8AC3E}">
-        <p14:creationId xmlns:p14="http://schemas.microsoft.com/office/powerpoint/2010/main" val="738217468"/>
+        <p14:creationId xmlns:p14="http://schemas.microsoft.com/office/powerpoint/2010/main" xmlns:p="http://schemas.openxmlformats.org/presentationml/2006/main" xmlns:r="http://schemas.openxmlformats.org/officeDocument/2006/relationships" xmlns:a="http://schemas.openxmlformats.org/drawingml/2006/main" xmlns="" val="738217468"/>
       </p:ext>
     </p:extLst>
   </p:cSld>
@@ -5927,7 +5927,7 @@
 </file>
 
 <file path=ppt/slides/slide12.xml><?xml version="1.0" encoding="utf-8"?>
-<p:sld xmlns:a="http://schemas.openxmlformats.org/drawingml/2006/main" xmlns:r="http://schemas.openxmlformats.org/officeDocument/2006/relationships" xmlns:p="http://schemas.openxmlformats.org/presentationml/2006/main">
+<p:sld xmlns:a="http://schemas.openxmlformats.org/drawingml/2006/main" xmlns:r="http://schemas.openxmlformats.org/officeDocument/2006/relationships" xmlns:mc="http://schemas.openxmlformats.org/markup-compatibility/2006" xmlns:mv="urn:schemas-microsoft-com:mac:vml" xmlns:p="http://schemas.openxmlformats.org/presentationml/2006/main" mc:Ignorable="mv" mc:PreserveAttributes="mv:*">
   <p:cSld>
     <p:spTree>
       <p:nvGrpSpPr>
@@ -5976,8 +5976,8 @@
             <p:ph idx="1"/>
           </p:nvPr>
         </p:nvPicPr>
-        <mc:AlternateContent xmlns:mc="http://schemas.openxmlformats.org/markup-compatibility/2006">
-          <mc:Choice xmlns:ma="http://schemas.microsoft.com/office/mac/drawingml/2008/main" xmlns:mv="urn:schemas-microsoft-com:mac:vml" xmlns="" Requires="ma">
+        <mc:AlternateContent xmlns:ma="http://schemas.microsoft.com/office/mac/drawingml/2008/main">
+          <mc:Choice Requires="ma">
             <p:blipFill>
               <a:blip r:embed="rId2"/>
               <a:stretch>
@@ -5985,7 +5985,7 @@
               </a:stretch>
             </p:blipFill>
           </mc:Choice>
-          <mc:Fallback>
+          <mc:Fallback xmlns:mc="http://schemas.openxmlformats.org/markup-compatibility/2006" xmlns:p="http://schemas.openxmlformats.org/presentationml/2006/main" xmlns:r="http://schemas.openxmlformats.org/officeDocument/2006/relationships" xmlns:a="http://schemas.openxmlformats.org/drawingml/2006/main" xmlns="">
             <p:blipFill>
               <a:blip r:embed="rId3"/>
               <a:stretch>
@@ -6006,11 +6006,18 @@
   <p:clrMapOvr>
     <a:masterClrMapping/>
   </p:clrMapOvr>
+  <p:timing>
+    <p:tnLst>
+      <p:par>
+        <p:cTn id="1" dur="indefinite" restart="never" nodeType="tmRoot"/>
+      </p:par>
+    </p:tnLst>
+  </p:timing>
 </p:sld>
 </file>
 
 <file path=ppt/slides/slide13.xml><?xml version="1.0" encoding="utf-8"?>
-<p:sld xmlns:a="http://schemas.openxmlformats.org/drawingml/2006/main" xmlns:r="http://schemas.openxmlformats.org/officeDocument/2006/relationships" xmlns:p="http://schemas.openxmlformats.org/presentationml/2006/main">
+<p:sld xmlns:a="http://schemas.openxmlformats.org/drawingml/2006/main" xmlns:r="http://schemas.openxmlformats.org/officeDocument/2006/relationships" xmlns:mc="http://schemas.openxmlformats.org/markup-compatibility/2006" xmlns:mv="urn:schemas-microsoft-com:mac:vml" xmlns:p="http://schemas.openxmlformats.org/presentationml/2006/main" mc:Ignorable="mv" mc:PreserveAttributes="mv:*">
   <p:cSld>
     <p:spTree>
       <p:nvGrpSpPr>
@@ -6043,7 +6050,11 @@
           <a:p>
             <a:r>
               <a:rPr lang="en-US" dirty="0" smtClean="0"/>
-              <a:t>SAGA: Class hierarchy</a:t>
+              <a:t>SAGA: Class</a:t>
+            </a:r>
+            <a:r>
+              <a:rPr lang="en-US" dirty="0" smtClean="0"/>
+              <a:t> Hierarchy</a:t>
             </a:r>
             <a:endParaRPr lang="en-US" dirty="0"/>
           </a:p>
@@ -6077,11 +6088,18 @@
   <p:clrMapOvr>
     <a:masterClrMapping/>
   </p:clrMapOvr>
+  <p:timing>
+    <p:tnLst>
+      <p:par>
+        <p:cTn id="1" dur="indefinite" restart="never" nodeType="tmRoot"/>
+      </p:par>
+    </p:tnLst>
+  </p:timing>
 </p:sld>
 </file>
 
 <file path=ppt/slides/slide14.xml><?xml version="1.0" encoding="utf-8"?>
-<p:sld xmlns:a="http://schemas.openxmlformats.org/drawingml/2006/main" xmlns:r="http://schemas.openxmlformats.org/officeDocument/2006/relationships" xmlns:p="http://schemas.openxmlformats.org/presentationml/2006/main">
+<p:sld xmlns:a="http://schemas.openxmlformats.org/drawingml/2006/main" xmlns:r="http://schemas.openxmlformats.org/officeDocument/2006/relationships" xmlns:mc="http://schemas.openxmlformats.org/markup-compatibility/2006" xmlns:mv="urn:schemas-microsoft-com:mac:vml" xmlns:p="http://schemas.openxmlformats.org/presentationml/2006/main" mc:Ignorable="mv" mc:PreserveAttributes="mv:*">
   <p:cSld>
     <p:spTree>
       <p:nvGrpSpPr>
@@ -6552,7 +6570,7 @@
 </file>
 
 <file path=ppt/slides/slide15.xml><?xml version="1.0" encoding="utf-8"?>
-<p:sld xmlns:a="http://schemas.openxmlformats.org/drawingml/2006/main" xmlns:r="http://schemas.openxmlformats.org/officeDocument/2006/relationships" xmlns:p="http://schemas.openxmlformats.org/presentationml/2006/main">
+<p:sld xmlns:a="http://schemas.openxmlformats.org/drawingml/2006/main" xmlns:r="http://schemas.openxmlformats.org/officeDocument/2006/relationships" xmlns:mc="http://schemas.openxmlformats.org/markup-compatibility/2006" xmlns:mv="urn:schemas-microsoft-com:mac:vml" xmlns:p="http://schemas.openxmlformats.org/presentationml/2006/main" mc:Ignorable="mv" mc:PreserveAttributes="mv:*">
   <p:cSld>
     <p:spTree>
       <p:nvGrpSpPr>
@@ -6605,7 +6623,7 @@
           <a:blip r:embed="rId2">
             <a:extLst>
               <a:ext uri="{28A0092B-C50C-407E-A947-70E740481C1C}">
-                <a14:useLocalDpi xmlns:a14="http://schemas.microsoft.com/office/drawing/2010/main" val="0"/>
+                <a14:useLocalDpi xmlns:a14="http://schemas.microsoft.com/office/drawing/2010/main" xmlns:p="http://schemas.openxmlformats.org/presentationml/2006/main" xmlns:r="http://schemas.openxmlformats.org/officeDocument/2006/relationships" xmlns:a="http://schemas.openxmlformats.org/drawingml/2006/main" xmlns="" val="0"/>
               </a:ext>
             </a:extLst>
           </a:blip>
@@ -6623,7 +6641,7 @@
     </p:spTree>
     <p:extLst>
       <p:ext uri="{BB962C8B-B14F-4D97-AF65-F5344CB8AC3E}">
-        <p14:creationId xmlns:p14="http://schemas.microsoft.com/office/powerpoint/2010/main" val="3604452974"/>
+        <p14:creationId xmlns:p14="http://schemas.microsoft.com/office/powerpoint/2010/main" xmlns:p="http://schemas.openxmlformats.org/presentationml/2006/main" xmlns:r="http://schemas.openxmlformats.org/officeDocument/2006/relationships" xmlns:a="http://schemas.openxmlformats.org/drawingml/2006/main" xmlns="" val="3604452974"/>
       </p:ext>
     </p:extLst>
   </p:cSld>
@@ -6641,7 +6659,7 @@
 </file>
 
 <file path=ppt/slides/slide16.xml><?xml version="1.0" encoding="utf-8"?>
-<p:sld xmlns:a="http://schemas.openxmlformats.org/drawingml/2006/main" xmlns:r="http://schemas.openxmlformats.org/officeDocument/2006/relationships" xmlns:p="http://schemas.openxmlformats.org/presentationml/2006/main">
+<p:sld xmlns:a="http://schemas.openxmlformats.org/drawingml/2006/main" xmlns:r="http://schemas.openxmlformats.org/officeDocument/2006/relationships" xmlns:mc="http://schemas.openxmlformats.org/markup-compatibility/2006" xmlns:mv="urn:schemas-microsoft-com:mac:vml" xmlns:p="http://schemas.openxmlformats.org/presentationml/2006/main" mc:Ignorable="mv" mc:PreserveAttributes="mv:*">
   <p:cSld>
     <p:spTree>
       <p:nvGrpSpPr>
@@ -7002,7 +7020,7 @@
     </p:spTree>
     <p:extLst>
       <p:ext uri="{BB962C8B-B14F-4D97-AF65-F5344CB8AC3E}">
-        <p14:creationId xmlns:p14="http://schemas.microsoft.com/office/powerpoint/2010/main" val="249318202"/>
+        <p14:creationId xmlns:p14="http://schemas.microsoft.com/office/powerpoint/2010/main" xmlns:p="http://schemas.openxmlformats.org/presentationml/2006/main" xmlns:r="http://schemas.openxmlformats.org/officeDocument/2006/relationships" xmlns:a="http://schemas.openxmlformats.org/drawingml/2006/main" xmlns="" val="249318202"/>
       </p:ext>
     </p:extLst>
   </p:cSld>
@@ -7020,7 +7038,7 @@
 </file>
 
 <file path=ppt/slides/slide17.xml><?xml version="1.0" encoding="utf-8"?>
-<p:sld xmlns:a="http://schemas.openxmlformats.org/drawingml/2006/main" xmlns:r="http://schemas.openxmlformats.org/officeDocument/2006/relationships" xmlns:p="http://schemas.openxmlformats.org/presentationml/2006/main">
+<p:sld xmlns:a="http://schemas.openxmlformats.org/drawingml/2006/main" xmlns:r="http://schemas.openxmlformats.org/officeDocument/2006/relationships" xmlns:mc="http://schemas.openxmlformats.org/markup-compatibility/2006" xmlns:mv="urn:schemas-microsoft-com:mac:vml" xmlns:p="http://schemas.openxmlformats.org/presentationml/2006/main" mc:Ignorable="mv" mc:PreserveAttributes="mv:*">
   <p:cSld>
     <p:spTree>
       <p:nvGrpSpPr>
@@ -7454,7 +7472,7 @@
     </p:spTree>
     <p:extLst>
       <p:ext uri="{BB962C8B-B14F-4D97-AF65-F5344CB8AC3E}">
-        <p14:creationId xmlns:p14="http://schemas.microsoft.com/office/powerpoint/2010/main" val="2506735757"/>
+        <p14:creationId xmlns:p14="http://schemas.microsoft.com/office/powerpoint/2010/main" xmlns:p="http://schemas.openxmlformats.org/presentationml/2006/main" xmlns:r="http://schemas.openxmlformats.org/officeDocument/2006/relationships" xmlns:a="http://schemas.openxmlformats.org/drawingml/2006/main" xmlns="" val="2506735757"/>
       </p:ext>
     </p:extLst>
   </p:cSld>
@@ -7472,7 +7490,7 @@
 </file>
 
 <file path=ppt/slides/slide18.xml><?xml version="1.0" encoding="utf-8"?>
-<p:sld xmlns:a="http://schemas.openxmlformats.org/drawingml/2006/main" xmlns:r="http://schemas.openxmlformats.org/officeDocument/2006/relationships" xmlns:p="http://schemas.openxmlformats.org/presentationml/2006/main">
+<p:sld xmlns:a="http://schemas.openxmlformats.org/drawingml/2006/main" xmlns:r="http://schemas.openxmlformats.org/officeDocument/2006/relationships" xmlns:mc="http://schemas.openxmlformats.org/markup-compatibility/2006" xmlns:mv="urn:schemas-microsoft-com:mac:vml" xmlns:p="http://schemas.openxmlformats.org/presentationml/2006/main" mc:Ignorable="mv" mc:PreserveAttributes="mv:*">
   <p:cSld>
     <p:spTree>
       <p:nvGrpSpPr>
@@ -7961,7 +7979,7 @@
     </p:spTree>
     <p:extLst>
       <p:ext uri="{BB962C8B-B14F-4D97-AF65-F5344CB8AC3E}">
-        <p14:creationId xmlns:p14="http://schemas.microsoft.com/office/powerpoint/2010/main" val="3921534399"/>
+        <p14:creationId xmlns:p14="http://schemas.microsoft.com/office/powerpoint/2010/main" xmlns:p="http://schemas.openxmlformats.org/presentationml/2006/main" xmlns:r="http://schemas.openxmlformats.org/officeDocument/2006/relationships" xmlns:a="http://schemas.openxmlformats.org/drawingml/2006/main" xmlns="" val="3921534399"/>
       </p:ext>
     </p:extLst>
   </p:cSld>
@@ -7972,7 +7990,7 @@
 </file>
 
 <file path=ppt/slides/slide19.xml><?xml version="1.0" encoding="utf-8"?>
-<p:sld xmlns:a="http://schemas.openxmlformats.org/drawingml/2006/main" xmlns:r="http://schemas.openxmlformats.org/officeDocument/2006/relationships" xmlns:p="http://schemas.openxmlformats.org/presentationml/2006/main">
+<p:sld xmlns:a="http://schemas.openxmlformats.org/drawingml/2006/main" xmlns:r="http://schemas.openxmlformats.org/officeDocument/2006/relationships" xmlns:mc="http://schemas.openxmlformats.org/markup-compatibility/2006" xmlns:mv="urn:schemas-microsoft-com:mac:vml" xmlns:p="http://schemas.openxmlformats.org/presentationml/2006/main" mc:Ignorable="mv" mc:PreserveAttributes="mv:*">
   <p:cSld>
     <p:bg>
       <p:bgRef idx="1001">
@@ -8171,7 +8189,7 @@
     </p:spTree>
     <p:extLst>
       <p:ext uri="{BB962C8B-B14F-4D97-AF65-F5344CB8AC3E}">
-        <p14:creationId xmlns:p14="http://schemas.microsoft.com/office/powerpoint/2010/main" val="1279084256"/>
+        <p14:creationId xmlns:p14="http://schemas.microsoft.com/office/powerpoint/2010/main" xmlns:p="http://schemas.openxmlformats.org/presentationml/2006/main" xmlns:r="http://schemas.openxmlformats.org/officeDocument/2006/relationships" xmlns:a="http://schemas.openxmlformats.org/drawingml/2006/main" xmlns="" val="1279084256"/>
       </p:ext>
     </p:extLst>
   </p:cSld>
@@ -8182,7 +8200,7 @@
 </file>
 
 <file path=ppt/slides/slide2.xml><?xml version="1.0" encoding="utf-8"?>
-<p:sld xmlns:a="http://schemas.openxmlformats.org/drawingml/2006/main" xmlns:r="http://schemas.openxmlformats.org/officeDocument/2006/relationships" xmlns:p="http://schemas.openxmlformats.org/presentationml/2006/main">
+<p:sld xmlns:a="http://schemas.openxmlformats.org/drawingml/2006/main" xmlns:r="http://schemas.openxmlformats.org/officeDocument/2006/relationships" xmlns:mc="http://schemas.openxmlformats.org/markup-compatibility/2006" xmlns:mv="urn:schemas-microsoft-com:mac:vml" xmlns:p="http://schemas.openxmlformats.org/presentationml/2006/main" mc:Ignorable="mv" mc:PreserveAttributes="mv:*">
   <p:cSld>
     <p:spTree>
       <p:nvGrpSpPr>
@@ -8215,7 +8233,7 @@
           <a:p>
             <a:r>
               <a:rPr lang="en-US" dirty="0" smtClean="0"/>
-              <a:t>Agenda</a:t>
+              <a:t>Outline</a:t>
             </a:r>
             <a:endParaRPr lang="en-US" dirty="0"/>
           </a:p>
@@ -8243,11 +8261,7 @@
           <a:p>
             <a:r>
               <a:rPr lang="en-US" dirty="0" smtClean="0"/>
-              <a:t>API </a:t>
-            </a:r>
-            <a:r>
-              <a:rPr lang="en-US" dirty="0" smtClean="0"/>
-              <a:t>structure and scope</a:t>
+              <a:t>API structure and scope</a:t>
             </a:r>
           </a:p>
           <a:p>
@@ -8287,7 +8301,7 @@
 </file>
 
 <file path=ppt/slides/slide20.xml><?xml version="1.0" encoding="utf-8"?>
-<p:sld xmlns:a="http://schemas.openxmlformats.org/drawingml/2006/main" xmlns:r="http://schemas.openxmlformats.org/officeDocument/2006/relationships" xmlns:p="http://schemas.openxmlformats.org/presentationml/2006/main">
+<p:sld xmlns:a="http://schemas.openxmlformats.org/drawingml/2006/main" xmlns:r="http://schemas.openxmlformats.org/officeDocument/2006/relationships" xmlns:mc="http://schemas.openxmlformats.org/markup-compatibility/2006" xmlns:mv="urn:schemas-microsoft-com:mac:vml" xmlns:p="http://schemas.openxmlformats.org/presentationml/2006/main" mc:Ignorable="mv" mc:PreserveAttributes="mv:*">
   <p:cSld>
     <p:spTree>
       <p:nvGrpSpPr>
@@ -8688,7 +8702,7 @@
     </p:spTree>
     <p:extLst>
       <p:ext uri="{BB962C8B-B14F-4D97-AF65-F5344CB8AC3E}">
-        <p14:creationId xmlns:p14="http://schemas.microsoft.com/office/powerpoint/2010/main" val="393658979"/>
+        <p14:creationId xmlns:p14="http://schemas.microsoft.com/office/powerpoint/2010/main" xmlns:p="http://schemas.openxmlformats.org/presentationml/2006/main" xmlns:r="http://schemas.openxmlformats.org/officeDocument/2006/relationships" xmlns:a="http://schemas.openxmlformats.org/drawingml/2006/main" xmlns="" val="393658979"/>
       </p:ext>
     </p:extLst>
   </p:cSld>
@@ -8699,7 +8713,7 @@
 </file>
 
 <file path=ppt/slides/slide21.xml><?xml version="1.0" encoding="utf-8"?>
-<p:sld xmlns:a="http://schemas.openxmlformats.org/drawingml/2006/main" xmlns:r="http://schemas.openxmlformats.org/officeDocument/2006/relationships" xmlns:p="http://schemas.openxmlformats.org/presentationml/2006/main">
+<p:sld xmlns:a="http://schemas.openxmlformats.org/drawingml/2006/main" xmlns:r="http://schemas.openxmlformats.org/officeDocument/2006/relationships" xmlns:mc="http://schemas.openxmlformats.org/markup-compatibility/2006" xmlns:mv="urn:schemas-microsoft-com:mac:vml" xmlns:p="http://schemas.openxmlformats.org/presentationml/2006/main" mc:Ignorable="mv" mc:PreserveAttributes="mv:*">
   <p:cSld>
     <p:spTree>
       <p:nvGrpSpPr>
@@ -8843,7 +8857,7 @@
     </p:spTree>
     <p:extLst>
       <p:ext uri="{BB962C8B-B14F-4D97-AF65-F5344CB8AC3E}">
-        <p14:creationId xmlns:p14="http://schemas.microsoft.com/office/powerpoint/2010/main" val="2936737826"/>
+        <p14:creationId xmlns:p14="http://schemas.microsoft.com/office/powerpoint/2010/main" xmlns:p="http://schemas.openxmlformats.org/presentationml/2006/main" xmlns:r="http://schemas.openxmlformats.org/officeDocument/2006/relationships" xmlns:a="http://schemas.openxmlformats.org/drawingml/2006/main" xmlns="" val="2936737826"/>
       </p:ext>
     </p:extLst>
   </p:cSld>
@@ -8854,7 +8868,7 @@
 </file>
 
 <file path=ppt/slides/slide22.xml><?xml version="1.0" encoding="utf-8"?>
-<p:sld xmlns:a="http://schemas.openxmlformats.org/drawingml/2006/main" xmlns:r="http://schemas.openxmlformats.org/officeDocument/2006/relationships" xmlns:p="http://schemas.openxmlformats.org/presentationml/2006/main">
+<p:sld xmlns:a="http://schemas.openxmlformats.org/drawingml/2006/main" xmlns:r="http://schemas.openxmlformats.org/officeDocument/2006/relationships" xmlns:mc="http://schemas.openxmlformats.org/markup-compatibility/2006" xmlns:mv="urn:schemas-microsoft-com:mac:vml" xmlns:p="http://schemas.openxmlformats.org/presentationml/2006/main" mc:Ignorable="mv" mc:PreserveAttributes="mv:*">
   <p:cSld>
     <p:spTree>
       <p:nvGrpSpPr>
@@ -8983,7 +8997,11 @@
             <a:pPr marL="285750" indent="-285750"/>
             <a:r>
               <a:rPr lang="en-US" dirty="0" smtClean="0"/>
-              <a:t>entries are assume opaque </a:t>
+              <a:t>entries are </a:t>
+            </a:r>
+            <a:r>
+              <a:rPr lang="en-US" dirty="0" smtClean="0"/>
+              <a:t>assumed to be opaque </a:t>
             </a:r>
             <a:r>
               <a:rPr lang="en-US" dirty="0"/>
@@ -9000,7 +9018,7 @@
     </p:spTree>
     <p:extLst>
       <p:ext uri="{BB962C8B-B14F-4D97-AF65-F5344CB8AC3E}">
-        <p14:creationId xmlns:p14="http://schemas.microsoft.com/office/powerpoint/2010/main" val="3657352639"/>
+        <p14:creationId xmlns:p14="http://schemas.microsoft.com/office/powerpoint/2010/main" xmlns:p="http://schemas.openxmlformats.org/presentationml/2006/main" xmlns:r="http://schemas.openxmlformats.org/officeDocument/2006/relationships" xmlns:a="http://schemas.openxmlformats.org/drawingml/2006/main" xmlns="" val="3657352639"/>
       </p:ext>
     </p:extLst>
   </p:cSld>
@@ -9011,7 +9029,7 @@
 </file>
 
 <file path=ppt/slides/slide23.xml><?xml version="1.0" encoding="utf-8"?>
-<p:sld xmlns:a="http://schemas.openxmlformats.org/drawingml/2006/main" xmlns:r="http://schemas.openxmlformats.org/officeDocument/2006/relationships" xmlns:p="http://schemas.openxmlformats.org/presentationml/2006/main">
+<p:sld xmlns:a="http://schemas.openxmlformats.org/drawingml/2006/main" xmlns:r="http://schemas.openxmlformats.org/officeDocument/2006/relationships" xmlns:mc="http://schemas.openxmlformats.org/markup-compatibility/2006" xmlns:mv="urn:schemas-microsoft-com:mac:vml" xmlns:p="http://schemas.openxmlformats.org/presentationml/2006/main" mc:Ignorable="mv" mc:PreserveAttributes="mv:*">
   <p:cSld>
     <p:spTree>
       <p:nvGrpSpPr>
@@ -9618,7 +9636,7 @@
     </p:spTree>
     <p:extLst>
       <p:ext uri="{BB962C8B-B14F-4D97-AF65-F5344CB8AC3E}">
-        <p14:creationId xmlns:p14="http://schemas.microsoft.com/office/powerpoint/2010/main" val="1668556561"/>
+        <p14:creationId xmlns:p14="http://schemas.microsoft.com/office/powerpoint/2010/main" xmlns:p="http://schemas.openxmlformats.org/presentationml/2006/main" xmlns:r="http://schemas.openxmlformats.org/officeDocument/2006/relationships" xmlns:a="http://schemas.openxmlformats.org/drawingml/2006/main" xmlns="" val="1668556561"/>
       </p:ext>
     </p:extLst>
   </p:cSld>
@@ -9629,7 +9647,7 @@
 </file>
 
 <file path=ppt/slides/slide24.xml><?xml version="1.0" encoding="utf-8"?>
-<p:sld xmlns:a="http://schemas.openxmlformats.org/drawingml/2006/main" xmlns:r="http://schemas.openxmlformats.org/officeDocument/2006/relationships" xmlns:p="http://schemas.openxmlformats.org/presentationml/2006/main">
+<p:sld xmlns:a="http://schemas.openxmlformats.org/drawingml/2006/main" xmlns:r="http://schemas.openxmlformats.org/officeDocument/2006/relationships" xmlns:mc="http://schemas.openxmlformats.org/markup-compatibility/2006" xmlns:mv="urn:schemas-microsoft-com:mac:vml" xmlns:p="http://schemas.openxmlformats.org/presentationml/2006/main" mc:Ignorable="mv" mc:PreserveAttributes="mv:*">
   <p:cSld>
     <p:spTree>
       <p:nvGrpSpPr>
@@ -9913,7 +9931,7 @@
     </p:spTree>
     <p:extLst>
       <p:ext uri="{BB962C8B-B14F-4D97-AF65-F5344CB8AC3E}">
-        <p14:creationId xmlns:p14="http://schemas.microsoft.com/office/powerpoint/2010/main" val="3427845436"/>
+        <p14:creationId xmlns:p14="http://schemas.microsoft.com/office/powerpoint/2010/main" xmlns:p="http://schemas.openxmlformats.org/presentationml/2006/main" xmlns:r="http://schemas.openxmlformats.org/officeDocument/2006/relationships" xmlns:a="http://schemas.openxmlformats.org/drawingml/2006/main" xmlns="" val="3427845436"/>
       </p:ext>
     </p:extLst>
   </p:cSld>
@@ -9924,7 +9942,7 @@
 </file>
 
 <file path=ppt/slides/slide25.xml><?xml version="1.0" encoding="utf-8"?>
-<p:sld xmlns:a="http://schemas.openxmlformats.org/drawingml/2006/main" xmlns:r="http://schemas.openxmlformats.org/officeDocument/2006/relationships" xmlns:p="http://schemas.openxmlformats.org/presentationml/2006/main">
+<p:sld xmlns:a="http://schemas.openxmlformats.org/drawingml/2006/main" xmlns:r="http://schemas.openxmlformats.org/officeDocument/2006/relationships" xmlns:mc="http://schemas.openxmlformats.org/markup-compatibility/2006" xmlns:mv="urn:schemas-microsoft-com:mac:vml" xmlns:p="http://schemas.openxmlformats.org/presentationml/2006/main" mc:Ignorable="mv" mc:PreserveAttributes="mv:*">
   <p:cSld>
     <p:spTree>
       <p:nvGrpSpPr>
@@ -10109,7 +10127,7 @@
     </p:spTree>
     <p:extLst>
       <p:ext uri="{BB962C8B-B14F-4D97-AF65-F5344CB8AC3E}">
-        <p14:creationId xmlns:p14="http://schemas.microsoft.com/office/powerpoint/2010/main" val="3493384740"/>
+        <p14:creationId xmlns:p14="http://schemas.microsoft.com/office/powerpoint/2010/main" xmlns:p="http://schemas.openxmlformats.org/presentationml/2006/main" xmlns:r="http://schemas.openxmlformats.org/officeDocument/2006/relationships" xmlns:a="http://schemas.openxmlformats.org/drawingml/2006/main" xmlns="" val="3493384740"/>
       </p:ext>
     </p:extLst>
   </p:cSld>
@@ -10120,7 +10138,7 @@
 </file>
 
 <file path=ppt/slides/slide26.xml><?xml version="1.0" encoding="utf-8"?>
-<p:sld xmlns:a="http://schemas.openxmlformats.org/drawingml/2006/main" xmlns:r="http://schemas.openxmlformats.org/officeDocument/2006/relationships" xmlns:p="http://schemas.openxmlformats.org/presentationml/2006/main">
+<p:sld xmlns:a="http://schemas.openxmlformats.org/drawingml/2006/main" xmlns:r="http://schemas.openxmlformats.org/officeDocument/2006/relationships" xmlns:mc="http://schemas.openxmlformats.org/markup-compatibility/2006" xmlns:mv="urn:schemas-microsoft-com:mac:vml" xmlns:p="http://schemas.openxmlformats.org/presentationml/2006/main" mc:Ignorable="mv" mc:PreserveAttributes="mv:*">
   <p:cSld>
     <p:spTree>
       <p:nvGrpSpPr>
@@ -10739,7 +10757,7 @@
     </p:spTree>
     <p:extLst>
       <p:ext uri="{BB962C8B-B14F-4D97-AF65-F5344CB8AC3E}">
-        <p14:creationId xmlns:p14="http://schemas.microsoft.com/office/powerpoint/2010/main" val="3124065083"/>
+        <p14:creationId xmlns:p14="http://schemas.microsoft.com/office/powerpoint/2010/main" xmlns:p="http://schemas.openxmlformats.org/presentationml/2006/main" xmlns:r="http://schemas.openxmlformats.org/officeDocument/2006/relationships" xmlns:a="http://schemas.openxmlformats.org/drawingml/2006/main" xmlns="" val="3124065083"/>
       </p:ext>
     </p:extLst>
   </p:cSld>
@@ -10750,7 +10768,7 @@
 </file>
 
 <file path=ppt/slides/slide27.xml><?xml version="1.0" encoding="utf-8"?>
-<p:sld xmlns:a="http://schemas.openxmlformats.org/drawingml/2006/main" xmlns:r="http://schemas.openxmlformats.org/officeDocument/2006/relationships" xmlns:p="http://schemas.openxmlformats.org/presentationml/2006/main">
+<p:sld xmlns:a="http://schemas.openxmlformats.org/drawingml/2006/main" xmlns:r="http://schemas.openxmlformats.org/officeDocument/2006/relationships" xmlns:mc="http://schemas.openxmlformats.org/markup-compatibility/2006" xmlns:mv="urn:schemas-microsoft-com:mac:vml" xmlns:p="http://schemas.openxmlformats.org/presentationml/2006/main" mc:Ignorable="mv" mc:PreserveAttributes="mv:*">
   <p:cSld>
     <p:spTree>
       <p:nvGrpSpPr>
@@ -10911,7 +10929,7 @@
     </p:spTree>
     <p:extLst>
       <p:ext uri="{BB962C8B-B14F-4D97-AF65-F5344CB8AC3E}">
-        <p14:creationId xmlns:p14="http://schemas.microsoft.com/office/powerpoint/2010/main" val="3394878304"/>
+        <p14:creationId xmlns:p14="http://schemas.microsoft.com/office/powerpoint/2010/main" xmlns:p="http://schemas.openxmlformats.org/presentationml/2006/main" xmlns:r="http://schemas.openxmlformats.org/officeDocument/2006/relationships" xmlns:a="http://schemas.openxmlformats.org/drawingml/2006/main" xmlns="" val="3394878304"/>
       </p:ext>
     </p:extLst>
   </p:cSld>
@@ -10922,7 +10940,7 @@
 </file>
 
 <file path=ppt/slides/slide28.xml><?xml version="1.0" encoding="utf-8"?>
-<p:sld xmlns:a="http://schemas.openxmlformats.org/drawingml/2006/main" xmlns:r="http://schemas.openxmlformats.org/officeDocument/2006/relationships" xmlns:p="http://schemas.openxmlformats.org/presentationml/2006/main">
+<p:sld xmlns:a="http://schemas.openxmlformats.org/drawingml/2006/main" xmlns:r="http://schemas.openxmlformats.org/officeDocument/2006/relationships" xmlns:mc="http://schemas.openxmlformats.org/markup-compatibility/2006" xmlns:mv="urn:schemas-microsoft-com:mac:vml" xmlns:p="http://schemas.openxmlformats.org/presentationml/2006/main" mc:Ignorable="mv" mc:PreserveAttributes="mv:*">
   <p:cSld>
     <p:spTree>
       <p:nvGrpSpPr>
@@ -11355,7 +11373,7 @@
     </p:spTree>
     <p:extLst>
       <p:ext uri="{BB962C8B-B14F-4D97-AF65-F5344CB8AC3E}">
-        <p14:creationId xmlns:p14="http://schemas.microsoft.com/office/powerpoint/2010/main" val="3419220388"/>
+        <p14:creationId xmlns:p14="http://schemas.microsoft.com/office/powerpoint/2010/main" xmlns:p="http://schemas.openxmlformats.org/presentationml/2006/main" xmlns:r="http://schemas.openxmlformats.org/officeDocument/2006/relationships" xmlns:a="http://schemas.openxmlformats.org/drawingml/2006/main" xmlns="" val="3419220388"/>
       </p:ext>
     </p:extLst>
   </p:cSld>
@@ -11366,7 +11384,7 @@
 </file>
 
 <file path=ppt/slides/slide29.xml><?xml version="1.0" encoding="utf-8"?>
-<p:sld xmlns:a="http://schemas.openxmlformats.org/drawingml/2006/main" xmlns:r="http://schemas.openxmlformats.org/officeDocument/2006/relationships" xmlns:p="http://schemas.openxmlformats.org/presentationml/2006/main">
+<p:sld xmlns:a="http://schemas.openxmlformats.org/drawingml/2006/main" xmlns:r="http://schemas.openxmlformats.org/officeDocument/2006/relationships" xmlns:mc="http://schemas.openxmlformats.org/markup-compatibility/2006" xmlns:mv="urn:schemas-microsoft-com:mac:vml" xmlns:p="http://schemas.openxmlformats.org/presentationml/2006/main" mc:Ignorable="mv" mc:PreserveAttributes="mv:*">
   <p:cSld>
     <p:spTree>
       <p:nvGrpSpPr>
@@ -11480,7 +11498,7 @@
     </p:spTree>
     <p:extLst>
       <p:ext uri="{BB962C8B-B14F-4D97-AF65-F5344CB8AC3E}">
-        <p14:creationId xmlns:p14="http://schemas.microsoft.com/office/powerpoint/2010/main" val="1782586087"/>
+        <p14:creationId xmlns:p14="http://schemas.microsoft.com/office/powerpoint/2010/main" xmlns:p="http://schemas.openxmlformats.org/presentationml/2006/main" xmlns:r="http://schemas.openxmlformats.org/officeDocument/2006/relationships" xmlns:a="http://schemas.openxmlformats.org/drawingml/2006/main" xmlns="" val="1782586087"/>
       </p:ext>
     </p:extLst>
   </p:cSld>
@@ -11491,7 +11509,7 @@
 </file>
 
 <file path=ppt/slides/slide3.xml><?xml version="1.0" encoding="utf-8"?>
-<p:sld xmlns:a="http://schemas.openxmlformats.org/drawingml/2006/main" xmlns:r="http://schemas.openxmlformats.org/officeDocument/2006/relationships" xmlns:p="http://schemas.openxmlformats.org/presentationml/2006/main">
+<p:sld xmlns:a="http://schemas.openxmlformats.org/drawingml/2006/main" xmlns:r="http://schemas.openxmlformats.org/officeDocument/2006/relationships" xmlns:mc="http://schemas.openxmlformats.org/markup-compatibility/2006" xmlns:mv="urn:schemas-microsoft-com:mac:vml" xmlns:p="http://schemas.openxmlformats.org/presentationml/2006/main" mc:Ignorable="mv" mc:PreserveAttributes="mv:*">
   <p:cSld>
     <p:spTree>
       <p:nvGrpSpPr>
@@ -11649,7 +11667,7 @@
 </file>
 
 <file path=ppt/slides/slide30.xml><?xml version="1.0" encoding="utf-8"?>
-<p:sld xmlns:a="http://schemas.openxmlformats.org/drawingml/2006/main" xmlns:r="http://schemas.openxmlformats.org/officeDocument/2006/relationships" xmlns:p="http://schemas.openxmlformats.org/presentationml/2006/main">
+<p:sld xmlns:a="http://schemas.openxmlformats.org/drawingml/2006/main" xmlns:r="http://schemas.openxmlformats.org/officeDocument/2006/relationships" xmlns:mc="http://schemas.openxmlformats.org/markup-compatibility/2006" xmlns:mv="urn:schemas-microsoft-com:mac:vml" xmlns:p="http://schemas.openxmlformats.org/presentationml/2006/main" mc:Ignorable="mv" mc:PreserveAttributes="mv:*">
   <p:cSld>
     <p:spTree>
       <p:nvGrpSpPr>
@@ -12316,7 +12334,7 @@
     </p:spTree>
     <p:extLst>
       <p:ext uri="{BB962C8B-B14F-4D97-AF65-F5344CB8AC3E}">
-        <p14:creationId xmlns:p14="http://schemas.microsoft.com/office/powerpoint/2010/main" val="2979891476"/>
+        <p14:creationId xmlns:p14="http://schemas.microsoft.com/office/powerpoint/2010/main" xmlns:p="http://schemas.openxmlformats.org/presentationml/2006/main" xmlns:r="http://schemas.openxmlformats.org/officeDocument/2006/relationships" xmlns:a="http://schemas.openxmlformats.org/drawingml/2006/main" xmlns="" val="2979891476"/>
       </p:ext>
     </p:extLst>
   </p:cSld>
@@ -12327,7 +12345,7 @@
 </file>
 
 <file path=ppt/slides/slide31.xml><?xml version="1.0" encoding="utf-8"?>
-<p:sld xmlns:a="http://schemas.openxmlformats.org/drawingml/2006/main" xmlns:r="http://schemas.openxmlformats.org/officeDocument/2006/relationships" xmlns:p="http://schemas.openxmlformats.org/presentationml/2006/main">
+<p:sld xmlns:a="http://schemas.openxmlformats.org/drawingml/2006/main" xmlns:r="http://schemas.openxmlformats.org/officeDocument/2006/relationships" xmlns:mc="http://schemas.openxmlformats.org/markup-compatibility/2006" xmlns:mv="urn:schemas-microsoft-com:mac:vml" xmlns:p="http://schemas.openxmlformats.org/presentationml/2006/main" mc:Ignorable="mv" mc:PreserveAttributes="mv:*">
   <p:cSld>
     <p:spTree>
       <p:nvGrpSpPr>
@@ -12715,7 +12733,7 @@
     </p:spTree>
     <p:extLst>
       <p:ext uri="{BB962C8B-B14F-4D97-AF65-F5344CB8AC3E}">
-        <p14:creationId xmlns:p14="http://schemas.microsoft.com/office/powerpoint/2010/main" val="1920102061"/>
+        <p14:creationId xmlns:p14="http://schemas.microsoft.com/office/powerpoint/2010/main" xmlns:p="http://schemas.openxmlformats.org/presentationml/2006/main" xmlns:r="http://schemas.openxmlformats.org/officeDocument/2006/relationships" xmlns:a="http://schemas.openxmlformats.org/drawingml/2006/main" xmlns="" val="1920102061"/>
       </p:ext>
     </p:extLst>
   </p:cSld>
@@ -12726,7 +12744,7 @@
 </file>
 
 <file path=ppt/slides/slide32.xml><?xml version="1.0" encoding="utf-8"?>
-<p:sld xmlns:a="http://schemas.openxmlformats.org/drawingml/2006/main" xmlns:r="http://schemas.openxmlformats.org/officeDocument/2006/relationships" xmlns:p="http://schemas.openxmlformats.org/presentationml/2006/main">
+<p:sld xmlns:a="http://schemas.openxmlformats.org/drawingml/2006/main" xmlns:r="http://schemas.openxmlformats.org/officeDocument/2006/relationships" xmlns:mc="http://schemas.openxmlformats.org/markup-compatibility/2006" xmlns:mv="urn:schemas-microsoft-com:mac:vml" xmlns:p="http://schemas.openxmlformats.org/presentationml/2006/main" mc:Ignorable="mv" mc:PreserveAttributes="mv:*">
   <p:cSld>
     <p:spTree>
       <p:nvGrpSpPr>
@@ -12791,7 +12809,7 @@
     </p:spTree>
     <p:extLst>
       <p:ext uri="{BB962C8B-B14F-4D97-AF65-F5344CB8AC3E}">
-        <p14:creationId xmlns:p14="http://schemas.microsoft.com/office/powerpoint/2010/main" val="379548810"/>
+        <p14:creationId xmlns:p14="http://schemas.microsoft.com/office/powerpoint/2010/main" xmlns:p="http://schemas.openxmlformats.org/presentationml/2006/main" xmlns:r="http://schemas.openxmlformats.org/officeDocument/2006/relationships" xmlns:a="http://schemas.openxmlformats.org/drawingml/2006/main" xmlns="" val="379548810"/>
       </p:ext>
     </p:extLst>
   </p:cSld>
@@ -12802,7 +12820,7 @@
 </file>
 
 <file path=ppt/slides/slide33.xml><?xml version="1.0" encoding="utf-8"?>
-<p:sld xmlns:a="http://schemas.openxmlformats.org/drawingml/2006/main" xmlns:r="http://schemas.openxmlformats.org/officeDocument/2006/relationships" xmlns:p="http://schemas.openxmlformats.org/presentationml/2006/main">
+<p:sld xmlns:a="http://schemas.openxmlformats.org/drawingml/2006/main" xmlns:r="http://schemas.openxmlformats.org/officeDocument/2006/relationships" xmlns:mc="http://schemas.openxmlformats.org/markup-compatibility/2006" xmlns:mv="urn:schemas-microsoft-com:mac:vml" xmlns:p="http://schemas.openxmlformats.org/presentationml/2006/main" mc:Ignorable="mv" mc:PreserveAttributes="mv:*">
   <p:cSld>
     <p:spTree>
       <p:nvGrpSpPr>
@@ -13374,7 +13392,7 @@
     </p:spTree>
     <p:extLst>
       <p:ext uri="{BB962C8B-B14F-4D97-AF65-F5344CB8AC3E}">
-        <p14:creationId xmlns:p14="http://schemas.microsoft.com/office/powerpoint/2010/main" val="2115472614"/>
+        <p14:creationId xmlns:p14="http://schemas.microsoft.com/office/powerpoint/2010/main" xmlns:p="http://schemas.openxmlformats.org/presentationml/2006/main" xmlns:r="http://schemas.openxmlformats.org/officeDocument/2006/relationships" xmlns:a="http://schemas.openxmlformats.org/drawingml/2006/main" xmlns="" val="2115472614"/>
       </p:ext>
     </p:extLst>
   </p:cSld>
@@ -13385,7 +13403,7 @@
 </file>
 
 <file path=ppt/slides/slide34.xml><?xml version="1.0" encoding="utf-8"?>
-<p:sld xmlns:a="http://schemas.openxmlformats.org/drawingml/2006/main" xmlns:r="http://schemas.openxmlformats.org/officeDocument/2006/relationships" xmlns:p="http://schemas.openxmlformats.org/presentationml/2006/main">
+<p:sld xmlns:a="http://schemas.openxmlformats.org/drawingml/2006/main" xmlns:r="http://schemas.openxmlformats.org/officeDocument/2006/relationships" xmlns:mc="http://schemas.openxmlformats.org/markup-compatibility/2006" xmlns:mv="urn:schemas-microsoft-com:mac:vml" xmlns:p="http://schemas.openxmlformats.org/presentationml/2006/main" mc:Ignorable="mv" mc:PreserveAttributes="mv:*">
   <p:cSld>
     <p:spTree>
       <p:nvGrpSpPr>
@@ -13731,7 +13749,7 @@
     </p:spTree>
     <p:extLst>
       <p:ext uri="{BB962C8B-B14F-4D97-AF65-F5344CB8AC3E}">
-        <p14:creationId xmlns:p14="http://schemas.microsoft.com/office/powerpoint/2010/main" val="2065531179"/>
+        <p14:creationId xmlns:p14="http://schemas.microsoft.com/office/powerpoint/2010/main" xmlns:p="http://schemas.openxmlformats.org/presentationml/2006/main" xmlns:r="http://schemas.openxmlformats.org/officeDocument/2006/relationships" xmlns:a="http://schemas.openxmlformats.org/drawingml/2006/main" xmlns="" val="2065531179"/>
       </p:ext>
     </p:extLst>
   </p:cSld>
@@ -13742,7 +13760,7 @@
 </file>
 
 <file path=ppt/slides/slide35.xml><?xml version="1.0" encoding="utf-8"?>
-<p:sld xmlns:a="http://schemas.openxmlformats.org/drawingml/2006/main" xmlns:r="http://schemas.openxmlformats.org/officeDocument/2006/relationships" xmlns:p="http://schemas.openxmlformats.org/presentationml/2006/main">
+<p:sld xmlns:a="http://schemas.openxmlformats.org/drawingml/2006/main" xmlns:r="http://schemas.openxmlformats.org/officeDocument/2006/relationships" xmlns:mc="http://schemas.openxmlformats.org/markup-compatibility/2006" xmlns:mv="urn:schemas-microsoft-com:mac:vml" xmlns:p="http://schemas.openxmlformats.org/presentationml/2006/main" mc:Ignorable="mv" mc:PreserveAttributes="mv:*">
   <p:cSld>
     <p:spTree>
       <p:nvGrpSpPr>
@@ -13885,7 +13903,7 @@
     </p:spTree>
     <p:extLst>
       <p:ext uri="{BB962C8B-B14F-4D97-AF65-F5344CB8AC3E}">
-        <p14:creationId xmlns:p14="http://schemas.microsoft.com/office/powerpoint/2010/main" val="709120760"/>
+        <p14:creationId xmlns:p14="http://schemas.microsoft.com/office/powerpoint/2010/main" xmlns:p="http://schemas.openxmlformats.org/presentationml/2006/main" xmlns:r="http://schemas.openxmlformats.org/officeDocument/2006/relationships" xmlns:a="http://schemas.openxmlformats.org/drawingml/2006/main" xmlns="" val="709120760"/>
       </p:ext>
     </p:extLst>
   </p:cSld>
@@ -13896,7 +13914,7 @@
 </file>
 
 <file path=ppt/slides/slide36.xml><?xml version="1.0" encoding="utf-8"?>
-<p:sld xmlns:a="http://schemas.openxmlformats.org/drawingml/2006/main" xmlns:r="http://schemas.openxmlformats.org/officeDocument/2006/relationships" xmlns:p="http://schemas.openxmlformats.org/presentationml/2006/main">
+<p:sld xmlns:a="http://schemas.openxmlformats.org/drawingml/2006/main" xmlns:r="http://schemas.openxmlformats.org/officeDocument/2006/relationships" xmlns:mc="http://schemas.openxmlformats.org/markup-compatibility/2006" xmlns:mv="urn:schemas-microsoft-com:mac:vml" xmlns:p="http://schemas.openxmlformats.org/presentationml/2006/main" mc:Ignorable="mv" mc:PreserveAttributes="mv:*">
   <p:cSld>
     <p:spTree>
       <p:nvGrpSpPr>
@@ -14278,7 +14296,7 @@
     </p:spTree>
     <p:extLst>
       <p:ext uri="{BB962C8B-B14F-4D97-AF65-F5344CB8AC3E}">
-        <p14:creationId xmlns:p14="http://schemas.microsoft.com/office/powerpoint/2010/main" val="3629655379"/>
+        <p14:creationId xmlns:p14="http://schemas.microsoft.com/office/powerpoint/2010/main" xmlns:p="http://schemas.openxmlformats.org/presentationml/2006/main" xmlns:r="http://schemas.openxmlformats.org/officeDocument/2006/relationships" xmlns:a="http://schemas.openxmlformats.org/drawingml/2006/main" xmlns="" val="3629655379"/>
       </p:ext>
     </p:extLst>
   </p:cSld>
@@ -14289,7 +14307,7 @@
 </file>
 
 <file path=ppt/slides/slide37.xml><?xml version="1.0" encoding="utf-8"?>
-<p:sld xmlns:a="http://schemas.openxmlformats.org/drawingml/2006/main" xmlns:r="http://schemas.openxmlformats.org/officeDocument/2006/relationships" xmlns:p="http://schemas.openxmlformats.org/presentationml/2006/main">
+<p:sld xmlns:a="http://schemas.openxmlformats.org/drawingml/2006/main" xmlns:r="http://schemas.openxmlformats.org/officeDocument/2006/relationships" xmlns:mc="http://schemas.openxmlformats.org/markup-compatibility/2006" xmlns:mv="urn:schemas-microsoft-com:mac:vml" xmlns:p="http://schemas.openxmlformats.org/presentationml/2006/main" mc:Ignorable="mv" mc:PreserveAttributes="mv:*">
   <p:cSld>
     <p:spTree>
       <p:nvGrpSpPr>
@@ -14490,7 +14508,7 @@
     </p:spTree>
     <p:extLst>
       <p:ext uri="{BB962C8B-B14F-4D97-AF65-F5344CB8AC3E}">
-        <p14:creationId xmlns:p14="http://schemas.microsoft.com/office/powerpoint/2010/main" val="2400555662"/>
+        <p14:creationId xmlns:p14="http://schemas.microsoft.com/office/powerpoint/2010/main" xmlns:p="http://schemas.openxmlformats.org/presentationml/2006/main" xmlns:r="http://schemas.openxmlformats.org/officeDocument/2006/relationships" xmlns:a="http://schemas.openxmlformats.org/drawingml/2006/main" xmlns="" val="2400555662"/>
       </p:ext>
     </p:extLst>
   </p:cSld>
@@ -14501,7 +14519,7 @@
 </file>
 
 <file path=ppt/slides/slide38.xml><?xml version="1.0" encoding="utf-8"?>
-<p:sld xmlns:a="http://schemas.openxmlformats.org/drawingml/2006/main" xmlns:r="http://schemas.openxmlformats.org/officeDocument/2006/relationships" xmlns:p="http://schemas.openxmlformats.org/presentationml/2006/main">
+<p:sld xmlns:a="http://schemas.openxmlformats.org/drawingml/2006/main" xmlns:r="http://schemas.openxmlformats.org/officeDocument/2006/relationships" xmlns:mc="http://schemas.openxmlformats.org/markup-compatibility/2006" xmlns:mv="urn:schemas-microsoft-com:mac:vml" xmlns:p="http://schemas.openxmlformats.org/presentationml/2006/main" mc:Ignorable="mv" mc:PreserveAttributes="mv:*">
   <p:cSld>
     <p:spTree>
       <p:nvGrpSpPr>
@@ -14554,7 +14572,7 @@
           <a:blip r:embed="rId2">
             <a:extLst>
               <a:ext uri="{28A0092B-C50C-407E-A947-70E740481C1C}">
-                <a14:useLocalDpi xmlns:a14="http://schemas.microsoft.com/office/drawing/2010/main" val="0"/>
+                <a14:useLocalDpi xmlns:a14="http://schemas.microsoft.com/office/drawing/2010/main" xmlns:p="http://schemas.openxmlformats.org/presentationml/2006/main" xmlns:r="http://schemas.openxmlformats.org/officeDocument/2006/relationships" xmlns:a="http://schemas.openxmlformats.org/drawingml/2006/main" xmlns="" val="0"/>
               </a:ext>
             </a:extLst>
           </a:blip>
@@ -14572,7 +14590,7 @@
     </p:spTree>
     <p:extLst>
       <p:ext uri="{BB962C8B-B14F-4D97-AF65-F5344CB8AC3E}">
-        <p14:creationId xmlns:p14="http://schemas.microsoft.com/office/powerpoint/2010/main" val="2314353703"/>
+        <p14:creationId xmlns:p14="http://schemas.microsoft.com/office/powerpoint/2010/main" xmlns:p="http://schemas.openxmlformats.org/presentationml/2006/main" xmlns:r="http://schemas.openxmlformats.org/officeDocument/2006/relationships" xmlns:a="http://schemas.openxmlformats.org/drawingml/2006/main" xmlns="" val="2314353703"/>
       </p:ext>
     </p:extLst>
   </p:cSld>
@@ -14583,7 +14601,7 @@
 </file>
 
 <file path=ppt/slides/slide39.xml><?xml version="1.0" encoding="utf-8"?>
-<p:sld xmlns:a="http://schemas.openxmlformats.org/drawingml/2006/main" xmlns:r="http://schemas.openxmlformats.org/officeDocument/2006/relationships" xmlns:p="http://schemas.openxmlformats.org/presentationml/2006/main">
+<p:sld xmlns:a="http://schemas.openxmlformats.org/drawingml/2006/main" xmlns:r="http://schemas.openxmlformats.org/officeDocument/2006/relationships" xmlns:mc="http://schemas.openxmlformats.org/markup-compatibility/2006" xmlns:mv="urn:schemas-microsoft-com:mac:vml" xmlns:p="http://schemas.openxmlformats.org/presentationml/2006/main" mc:Ignorable="mv" mc:PreserveAttributes="mv:*">
   <p:cSld>
     <p:spTree>
       <p:nvGrpSpPr>
@@ -14933,7 +14951,7 @@
     </p:spTree>
     <p:extLst>
       <p:ext uri="{BB962C8B-B14F-4D97-AF65-F5344CB8AC3E}">
-        <p14:creationId xmlns:p14="http://schemas.microsoft.com/office/powerpoint/2010/main" val="847814926"/>
+        <p14:creationId xmlns:p14="http://schemas.microsoft.com/office/powerpoint/2010/main" xmlns:p="http://schemas.openxmlformats.org/presentationml/2006/main" xmlns:r="http://schemas.openxmlformats.org/officeDocument/2006/relationships" xmlns:a="http://schemas.openxmlformats.org/drawingml/2006/main" xmlns="" val="847814926"/>
       </p:ext>
     </p:extLst>
   </p:cSld>
@@ -14944,7 +14962,7 @@
 </file>
 
 <file path=ppt/slides/slide4.xml><?xml version="1.0" encoding="utf-8"?>
-<p:sld xmlns:a="http://schemas.openxmlformats.org/drawingml/2006/main" xmlns:r="http://schemas.openxmlformats.org/officeDocument/2006/relationships" xmlns:p="http://schemas.openxmlformats.org/presentationml/2006/main">
+<p:sld xmlns:a="http://schemas.openxmlformats.org/drawingml/2006/main" xmlns:r="http://schemas.openxmlformats.org/officeDocument/2006/relationships" xmlns:mc="http://schemas.openxmlformats.org/markup-compatibility/2006" xmlns:mv="urn:schemas-microsoft-com:mac:vml" xmlns:p="http://schemas.openxmlformats.org/presentationml/2006/main" mc:Ignorable="mv" mc:PreserveAttributes="mv:*">
   <p:cSld>
     <p:spTree>
       <p:nvGrpSpPr>
@@ -15342,7 +15360,7 @@
 </file>
 
 <file path=ppt/slides/slide40.xml><?xml version="1.0" encoding="utf-8"?>
-<p:sld xmlns:a="http://schemas.openxmlformats.org/drawingml/2006/main" xmlns:r="http://schemas.openxmlformats.org/officeDocument/2006/relationships" xmlns:p="http://schemas.openxmlformats.org/presentationml/2006/main">
+<p:sld xmlns:a="http://schemas.openxmlformats.org/drawingml/2006/main" xmlns:r="http://schemas.openxmlformats.org/officeDocument/2006/relationships" xmlns:mc="http://schemas.openxmlformats.org/markup-compatibility/2006" xmlns:mv="urn:schemas-microsoft-com:mac:vml" xmlns:p="http://schemas.openxmlformats.org/presentationml/2006/main" mc:Ignorable="mv" mc:PreserveAttributes="mv:*">
   <p:cSld>
     <p:spTree>
       <p:nvGrpSpPr>
@@ -15892,7 +15910,7 @@
     </p:spTree>
     <p:extLst>
       <p:ext uri="{BB962C8B-B14F-4D97-AF65-F5344CB8AC3E}">
-        <p14:creationId xmlns:p14="http://schemas.microsoft.com/office/powerpoint/2010/main" val="2958372846"/>
+        <p14:creationId xmlns:p14="http://schemas.microsoft.com/office/powerpoint/2010/main" xmlns:p="http://schemas.openxmlformats.org/presentationml/2006/main" xmlns:r="http://schemas.openxmlformats.org/officeDocument/2006/relationships" xmlns:a="http://schemas.openxmlformats.org/drawingml/2006/main" xmlns="" val="2958372846"/>
       </p:ext>
     </p:extLst>
   </p:cSld>
@@ -15903,7 +15921,7 @@
 </file>
 
 <file path=ppt/slides/slide41.xml><?xml version="1.0" encoding="utf-8"?>
-<p:sld xmlns:a="http://schemas.openxmlformats.org/drawingml/2006/main" xmlns:r="http://schemas.openxmlformats.org/officeDocument/2006/relationships" xmlns:p="http://schemas.openxmlformats.org/presentationml/2006/main">
+<p:sld xmlns:a="http://schemas.openxmlformats.org/drawingml/2006/main" xmlns:r="http://schemas.openxmlformats.org/officeDocument/2006/relationships" xmlns:mc="http://schemas.openxmlformats.org/markup-compatibility/2006" xmlns:mv="urn:schemas-microsoft-com:mac:vml" xmlns:p="http://schemas.openxmlformats.org/presentationml/2006/main" mc:Ignorable="mv" mc:PreserveAttributes="mv:*">
   <p:cSld>
     <p:spTree>
       <p:nvGrpSpPr>
@@ -16479,7 +16497,7 @@
     </p:spTree>
     <p:extLst>
       <p:ext uri="{BB962C8B-B14F-4D97-AF65-F5344CB8AC3E}">
-        <p14:creationId xmlns:p14="http://schemas.microsoft.com/office/powerpoint/2010/main" val="2570867600"/>
+        <p14:creationId xmlns:p14="http://schemas.microsoft.com/office/powerpoint/2010/main" xmlns:p="http://schemas.openxmlformats.org/presentationml/2006/main" xmlns:r="http://schemas.openxmlformats.org/officeDocument/2006/relationships" xmlns:a="http://schemas.openxmlformats.org/drawingml/2006/main" xmlns="" val="2570867600"/>
       </p:ext>
     </p:extLst>
   </p:cSld>
@@ -16490,7 +16508,7 @@
 </file>
 
 <file path=ppt/slides/slide42.xml><?xml version="1.0" encoding="utf-8"?>
-<p:sld xmlns:a="http://schemas.openxmlformats.org/drawingml/2006/main" xmlns:r="http://schemas.openxmlformats.org/officeDocument/2006/relationships" xmlns:p="http://schemas.openxmlformats.org/presentationml/2006/main">
+<p:sld xmlns:a="http://schemas.openxmlformats.org/drawingml/2006/main" xmlns:r="http://schemas.openxmlformats.org/officeDocument/2006/relationships" xmlns:mc="http://schemas.openxmlformats.org/markup-compatibility/2006" xmlns:mv="urn:schemas-microsoft-com:mac:vml" xmlns:p="http://schemas.openxmlformats.org/presentationml/2006/main" mc:Ignorable="mv" mc:PreserveAttributes="mv:*">
   <p:cSld>
     <p:spTree>
       <p:nvGrpSpPr>
@@ -16913,7 +16931,7 @@
     </p:spTree>
     <p:extLst>
       <p:ext uri="{BB962C8B-B14F-4D97-AF65-F5344CB8AC3E}">
-        <p14:creationId xmlns:p14="http://schemas.microsoft.com/office/powerpoint/2010/main" val="2697782710"/>
+        <p14:creationId xmlns:p14="http://schemas.microsoft.com/office/powerpoint/2010/main" xmlns:p="http://schemas.openxmlformats.org/presentationml/2006/main" xmlns:r="http://schemas.openxmlformats.org/officeDocument/2006/relationships" xmlns:a="http://schemas.openxmlformats.org/drawingml/2006/main" xmlns="" val="2697782710"/>
       </p:ext>
     </p:extLst>
   </p:cSld>
@@ -16924,7 +16942,7 @@
 </file>
 
 <file path=ppt/slides/slide43.xml><?xml version="1.0" encoding="utf-8"?>
-<p:sld xmlns:a="http://schemas.openxmlformats.org/drawingml/2006/main" xmlns:r="http://schemas.openxmlformats.org/officeDocument/2006/relationships" xmlns:p="http://schemas.openxmlformats.org/presentationml/2006/main">
+<p:sld xmlns:a="http://schemas.openxmlformats.org/drawingml/2006/main" xmlns:r="http://schemas.openxmlformats.org/officeDocument/2006/relationships" xmlns:mc="http://schemas.openxmlformats.org/markup-compatibility/2006" xmlns:mv="urn:schemas-microsoft-com:mac:vml" xmlns:p="http://schemas.openxmlformats.org/presentationml/2006/main" mc:Ignorable="mv" mc:PreserveAttributes="mv:*">
   <p:cSld>
     <p:spTree>
       <p:nvGrpSpPr>
@@ -17333,7 +17351,7 @@
     </p:spTree>
     <p:extLst>
       <p:ext uri="{BB962C8B-B14F-4D97-AF65-F5344CB8AC3E}">
-        <p14:creationId xmlns:p14="http://schemas.microsoft.com/office/powerpoint/2010/main" val="3573218890"/>
+        <p14:creationId xmlns:p14="http://schemas.microsoft.com/office/powerpoint/2010/main" xmlns:p="http://schemas.openxmlformats.org/presentationml/2006/main" xmlns:r="http://schemas.openxmlformats.org/officeDocument/2006/relationships" xmlns:a="http://schemas.openxmlformats.org/drawingml/2006/main" xmlns="" val="3573218890"/>
       </p:ext>
     </p:extLst>
   </p:cSld>
@@ -17344,7 +17362,7 @@
 </file>
 
 <file path=ppt/slides/slide5.xml><?xml version="1.0" encoding="utf-8"?>
-<p:sld xmlns:a="http://schemas.openxmlformats.org/drawingml/2006/main" xmlns:r="http://schemas.openxmlformats.org/officeDocument/2006/relationships" xmlns:p="http://schemas.openxmlformats.org/presentationml/2006/main">
+<p:sld xmlns:a="http://schemas.openxmlformats.org/drawingml/2006/main" xmlns:r="http://schemas.openxmlformats.org/officeDocument/2006/relationships" xmlns:mc="http://schemas.openxmlformats.org/markup-compatibility/2006" xmlns:mv="urn:schemas-microsoft-com:mac:vml" xmlns:p="http://schemas.openxmlformats.org/presentationml/2006/main" mc:Ignorable="mv" mc:PreserveAttributes="mv:*">
   <p:cSld>
     <p:spTree>
       <p:nvGrpSpPr>
@@ -17420,11 +17438,7 @@
           <a:p>
             <a:r>
               <a:rPr lang="en-US" dirty="0" smtClean="0"/>
-              <a:t>what is ’any://’ </a:t>
-            </a:r>
-            <a:r>
-              <a:rPr lang="en-US" dirty="0" smtClean="0"/>
-              <a:t>???</a:t>
+              <a:t>what is ’any://’ ???</a:t>
             </a:r>
           </a:p>
           <a:p>
@@ -17434,11 +17448,7 @@
             </a:r>
             <a:r>
               <a:rPr lang="en-US" dirty="0" smtClean="0"/>
-              <a:t>sage should be intuitive (hopefully)</a:t>
-            </a:r>
-            <a:r>
-              <a:rPr lang="en-US" dirty="0" smtClean="0"/>
-              <a:t> </a:t>
+              <a:t>sage should be intuitive (hopefully) </a:t>
             </a:r>
             <a:endParaRPr lang="en-US" dirty="0"/>
           </a:p>
@@ -17453,7 +17463,7 @@
 </file>
 
 <file path=ppt/slides/slide6.xml><?xml version="1.0" encoding="utf-8"?>
-<p:sld xmlns:a="http://schemas.openxmlformats.org/drawingml/2006/main" xmlns:r="http://schemas.openxmlformats.org/officeDocument/2006/relationships" xmlns:p="http://schemas.openxmlformats.org/presentationml/2006/main">
+<p:sld xmlns:a="http://schemas.openxmlformats.org/drawingml/2006/main" xmlns:r="http://schemas.openxmlformats.org/officeDocument/2006/relationships" xmlns:mc="http://schemas.openxmlformats.org/markup-compatibility/2006" xmlns:mv="urn:schemas-microsoft-com:mac:vml" xmlns:p="http://schemas.openxmlformats.org/presentationml/2006/main" mc:Ignorable="mv" mc:PreserveAttributes="mv:*">
   <p:cSld>
     <p:spTree>
       <p:nvGrpSpPr>
@@ -17870,7 +17880,7 @@
 </file>
 
 <file path=ppt/slides/slide7.xml><?xml version="1.0" encoding="utf-8"?>
-<p:sld xmlns:a="http://schemas.openxmlformats.org/drawingml/2006/main" xmlns:r="http://schemas.openxmlformats.org/officeDocument/2006/relationships" xmlns:p="http://schemas.openxmlformats.org/presentationml/2006/main">
+<p:sld xmlns:a="http://schemas.openxmlformats.org/drawingml/2006/main" xmlns:r="http://schemas.openxmlformats.org/officeDocument/2006/relationships" xmlns:mc="http://schemas.openxmlformats.org/markup-compatibility/2006" xmlns:mv="urn:schemas-microsoft-com:mac:vml" xmlns:p="http://schemas.openxmlformats.org/presentationml/2006/main" mc:Ignorable="mv" mc:PreserveAttributes="mv:*">
   <p:cSld>
     <p:spTree>
       <p:nvGrpSpPr>
@@ -18274,7 +18284,7 @@
 </file>
 
 <file path=ppt/slides/slide8.xml><?xml version="1.0" encoding="utf-8"?>
-<p:sld xmlns:a="http://schemas.openxmlformats.org/drawingml/2006/main" xmlns:r="http://schemas.openxmlformats.org/officeDocument/2006/relationships" xmlns:p="http://schemas.openxmlformats.org/presentationml/2006/main">
+<p:sld xmlns:a="http://schemas.openxmlformats.org/drawingml/2006/main" xmlns:r="http://schemas.openxmlformats.org/officeDocument/2006/relationships" xmlns:mc="http://schemas.openxmlformats.org/markup-compatibility/2006" xmlns:mv="urn:schemas-microsoft-com:mac:vml" xmlns:p="http://schemas.openxmlformats.org/presentationml/2006/main" mc:Ignorable="mv" mc:PreserveAttributes="mv:*">
   <p:cSld>
     <p:spTree>
       <p:nvGrpSpPr>
@@ -18380,7 +18390,7 @@
 </file>
 
 <file path=ppt/slides/slide9.xml><?xml version="1.0" encoding="utf-8"?>
-<p:sld xmlns:a="http://schemas.openxmlformats.org/drawingml/2006/main" xmlns:r="http://schemas.openxmlformats.org/officeDocument/2006/relationships" xmlns:p="http://schemas.openxmlformats.org/presentationml/2006/main">
+<p:sld xmlns:a="http://schemas.openxmlformats.org/drawingml/2006/main" xmlns:r="http://schemas.openxmlformats.org/officeDocument/2006/relationships" xmlns:mc="http://schemas.openxmlformats.org/markup-compatibility/2006" xmlns:mv="urn:schemas-microsoft-com:mac:vml" xmlns:p="http://schemas.openxmlformats.org/presentationml/2006/main" mc:Ignorable="mv" mc:PreserveAttributes="mv:*">
   <p:cSld>
     <p:bg>
       <p:bgRef idx="1001">
@@ -18445,7 +18455,6 @@
               <a:rPr lang="en-US" dirty="0" smtClean="0"/>
               <a:t>object oriented: </a:t>
             </a:r>
-            <a:endParaRPr lang="en-US" dirty="0" smtClean="0"/>
           </a:p>
           <a:p>
             <a:pPr lvl="1"/>
@@ -18459,27 +18468,14 @@
             </a:r>
             <a:r>
               <a:rPr lang="en-US" dirty="0" smtClean="0"/>
-              <a:t>and</a:t>
-            </a:r>
+              <a:t>and interfaces </a:t>
+            </a:r>
+          </a:p>
+          <a:p>
+            <a:pPr lvl="1"/>
             <a:r>
               <a:rPr lang="en-US" dirty="0" smtClean="0"/>
-              <a:t> </a:t>
-            </a:r>
-            <a:r>
-              <a:rPr lang="en-US" dirty="0" smtClean="0"/>
-              <a:t>interfaces </a:t>
-            </a:r>
-            <a:endParaRPr lang="en-US" dirty="0" smtClean="0"/>
-          </a:p>
-          <a:p>
-            <a:pPr lvl="1"/>
-            <a:r>
-              <a:rPr lang="en-US" dirty="0" smtClean="0"/>
-              <a:t>very </a:t>
-            </a:r>
-            <a:r>
-              <a:rPr lang="en-US" dirty="0" smtClean="0"/>
-              <a:t>moderate use of templates though! </a:t>
+              <a:t>very moderate use of templates though! </a:t>
             </a:r>
           </a:p>
           <a:p>
@@ -18509,7 +18505,6 @@
               <a:rPr lang="en-US" dirty="0" smtClean="0"/>
               <a:t> to remote operations </a:t>
             </a:r>
-            <a:endParaRPr lang="en-US" dirty="0" smtClean="0"/>
           </a:p>
           <a:p>
             <a:pPr lvl="2"/>
@@ -18575,7 +18570,6 @@
               <a:rPr lang="en-US" dirty="0" smtClean="0"/>
               <a:t>security, asynchronous ops, notifications, ...</a:t>
             </a:r>
-            <a:endParaRPr lang="en-US" dirty="0" smtClean="0"/>
           </a:p>
           <a:p>
             <a:r>

</xml_diff>

<commit_message>
update according to Shantenus suggestions. A
git-svn-id: file://localhost/tmp/svn2git/svn@3246 defb5e50-622e-49ec-a68e-d72c7db87b45
</commit_message>
<xml_diff>
--- a/tutorial/general_tutorial/API-Intro-short.pptx
+++ b/tutorial/general_tutorial/API-Intro-short.pptx
@@ -1,14 +1,14 @@
 
 <file path=ppt/presentation.xml><?xml version="1.0" encoding="utf-8"?>
-<p:presentation xmlns:a="http://schemas.openxmlformats.org/drawingml/2006/main" xmlns:r="http://schemas.openxmlformats.org/officeDocument/2006/relationships" xmlns:mc="http://schemas.openxmlformats.org/markup-compatibility/2006" xmlns:mv="urn:schemas-microsoft-com:mac:vml" xmlns:p="http://schemas.openxmlformats.org/presentationml/2006/main" mc:Ignorable="mv" mc:PreserveAttributes="mv:*" saveSubsetFonts="1" autoCompressPictures="0">
+<p:presentation xmlns:a="http://schemas.openxmlformats.org/drawingml/2006/main" xmlns:r="http://schemas.openxmlformats.org/officeDocument/2006/relationships" xmlns:p="http://schemas.openxmlformats.org/presentationml/2006/main" saveSubsetFonts="1" autoCompressPictures="0">
   <p:sldMasterIdLst>
     <p:sldMasterId id="2147483648" r:id="rId1"/>
   </p:sldMasterIdLst>
   <p:notesMasterIdLst>
-    <p:notesMasterId r:id="rId45"/>
+    <p:notesMasterId r:id="rId46"/>
   </p:notesMasterIdLst>
   <p:handoutMasterIdLst>
-    <p:handoutMasterId r:id="rId46"/>
+    <p:handoutMasterId r:id="rId47"/>
   </p:handoutMasterIdLst>
   <p:sldIdLst>
     <p:sldId id="256" r:id="rId2"/>
@@ -24,36 +24,37 @@
     <p:sldId id="295" r:id="rId12"/>
     <p:sldId id="280" r:id="rId13"/>
     <p:sldId id="293" r:id="rId14"/>
-    <p:sldId id="294" r:id="rId15"/>
-    <p:sldId id="323" r:id="rId16"/>
-    <p:sldId id="296" r:id="rId17"/>
-    <p:sldId id="297" r:id="rId18"/>
-    <p:sldId id="298" r:id="rId19"/>
-    <p:sldId id="299" r:id="rId20"/>
-    <p:sldId id="300" r:id="rId21"/>
-    <p:sldId id="301" r:id="rId22"/>
-    <p:sldId id="304" r:id="rId23"/>
-    <p:sldId id="306" r:id="rId24"/>
-    <p:sldId id="307" r:id="rId25"/>
-    <p:sldId id="305" r:id="rId26"/>
-    <p:sldId id="308" r:id="rId27"/>
-    <p:sldId id="309" r:id="rId28"/>
-    <p:sldId id="311" r:id="rId29"/>
-    <p:sldId id="312" r:id="rId30"/>
-    <p:sldId id="313" r:id="rId31"/>
-    <p:sldId id="314" r:id="rId32"/>
-    <p:sldId id="315" r:id="rId33"/>
-    <p:sldId id="317" r:id="rId34"/>
-    <p:sldId id="318" r:id="rId35"/>
+    <p:sldId id="329" r:id="rId15"/>
+    <p:sldId id="294" r:id="rId16"/>
+    <p:sldId id="323" r:id="rId17"/>
+    <p:sldId id="296" r:id="rId18"/>
+    <p:sldId id="297" r:id="rId19"/>
+    <p:sldId id="298" r:id="rId20"/>
+    <p:sldId id="299" r:id="rId21"/>
+    <p:sldId id="300" r:id="rId22"/>
+    <p:sldId id="301" r:id="rId23"/>
+    <p:sldId id="304" r:id="rId24"/>
+    <p:sldId id="306" r:id="rId25"/>
+    <p:sldId id="307" r:id="rId26"/>
+    <p:sldId id="305" r:id="rId27"/>
+    <p:sldId id="308" r:id="rId28"/>
+    <p:sldId id="309" r:id="rId29"/>
+    <p:sldId id="311" r:id="rId30"/>
+    <p:sldId id="312" r:id="rId31"/>
+    <p:sldId id="313" r:id="rId32"/>
+    <p:sldId id="314" r:id="rId33"/>
+    <p:sldId id="315" r:id="rId34"/>
+    <p:sldId id="317" r:id="rId35"/>
     <p:sldId id="319" r:id="rId36"/>
-    <p:sldId id="320" r:id="rId37"/>
-    <p:sldId id="321" r:id="rId38"/>
-    <p:sldId id="322" r:id="rId39"/>
-    <p:sldId id="324" r:id="rId40"/>
-    <p:sldId id="325" r:id="rId41"/>
-    <p:sldId id="326" r:id="rId42"/>
-    <p:sldId id="327" r:id="rId43"/>
-    <p:sldId id="328" r:id="rId44"/>
+    <p:sldId id="318" r:id="rId37"/>
+    <p:sldId id="320" r:id="rId38"/>
+    <p:sldId id="321" r:id="rId39"/>
+    <p:sldId id="322" r:id="rId40"/>
+    <p:sldId id="324" r:id="rId41"/>
+    <p:sldId id="325" r:id="rId42"/>
+    <p:sldId id="326" r:id="rId43"/>
+    <p:sldId id="327" r:id="rId44"/>
+    <p:sldId id="328" r:id="rId45"/>
   </p:sldIdLst>
   <p:sldSz cx="9144000" cy="6858000" type="screen4x3"/>
   <p:notesSz cx="6858000" cy="9144000"/>
@@ -156,7 +157,7 @@
 </file>
 
 <file path=ppt/handoutMasters/handoutMaster1.xml><?xml version="1.0" encoding="utf-8"?>
-<p:handoutMaster xmlns:a="http://schemas.openxmlformats.org/drawingml/2006/main" xmlns:r="http://schemas.openxmlformats.org/officeDocument/2006/relationships" xmlns:mc="http://schemas.openxmlformats.org/markup-compatibility/2006" xmlns:mv="urn:schemas-microsoft-com:mac:vml" xmlns:p="http://schemas.openxmlformats.org/presentationml/2006/main" mc:Ignorable="mv" mc:PreserveAttributes="mv:*">
+<p:handoutMaster xmlns:a="http://schemas.openxmlformats.org/drawingml/2006/main" xmlns:r="http://schemas.openxmlformats.org/officeDocument/2006/relationships" xmlns:p="http://schemas.openxmlformats.org/presentationml/2006/main">
   <p:cSld>
     <p:bg>
       <p:bgRef idx="1001">
@@ -238,7 +239,7 @@
             <a:fld id="{9A6AC4B2-6F12-454D-8DA7-7B9C78843B81}" type="datetimeFigureOut">
               <a:rPr lang="en-US" smtClean="0"/>
               <a:pPr/>
-              <a:t>11/27/10</a:t>
+              <a:t>11/28/2010</a:t>
             </a:fld>
             <a:endParaRPr lang="en-US"/>
           </a:p>
@@ -314,7 +315,7 @@
     </p:spTree>
     <p:extLst>
       <p:ext uri="{BB962C8B-B14F-4D97-AF65-F5344CB8AC3E}">
-        <p14:creationId xmlns:p14="http://schemas.microsoft.com/office/powerpoint/2010/main" xmlns:p="http://schemas.openxmlformats.org/presentationml/2006/main" xmlns:r="http://schemas.openxmlformats.org/officeDocument/2006/relationships" xmlns:a="http://schemas.openxmlformats.org/drawingml/2006/main" xmlns="" val="1850353593"/>
+        <p14:creationId xmlns:p14="http://schemas.microsoft.com/office/powerpoint/2010/main" val="1850353593"/>
       </p:ext>
     </p:extLst>
   </p:cSld>
@@ -324,7 +325,7 @@
 </file>
 
 <file path=ppt/notesMasters/notesMaster1.xml><?xml version="1.0" encoding="utf-8"?>
-<p:notesMaster xmlns:a="http://schemas.openxmlformats.org/drawingml/2006/main" xmlns:r="http://schemas.openxmlformats.org/officeDocument/2006/relationships" xmlns:mc="http://schemas.openxmlformats.org/markup-compatibility/2006" xmlns:mv="urn:schemas-microsoft-com:mac:vml" xmlns:p="http://schemas.openxmlformats.org/presentationml/2006/main" mc:Ignorable="mv" mc:PreserveAttributes="mv:*">
+<p:notesMaster xmlns:a="http://schemas.openxmlformats.org/drawingml/2006/main" xmlns:r="http://schemas.openxmlformats.org/officeDocument/2006/relationships" xmlns:p="http://schemas.openxmlformats.org/presentationml/2006/main">
   <p:cSld>
     <p:bg>
       <p:bgRef idx="1001">
@@ -406,7 +407,7 @@
             <a:fld id="{19F24AD4-A78B-B645-8B43-825B1EB2901C}" type="datetimeFigureOut">
               <a:rPr lang="en-US" smtClean="0"/>
               <a:pPr/>
-              <a:t>11/27/10</a:t>
+              <a:t>11/28/2010</a:t>
             </a:fld>
             <a:endParaRPr lang="en-US"/>
           </a:p>
@@ -577,7 +578,7 @@
     </p:spTree>
     <p:extLst>
       <p:ext uri="{BB962C8B-B14F-4D97-AF65-F5344CB8AC3E}">
-        <p14:creationId xmlns:p14="http://schemas.microsoft.com/office/powerpoint/2010/main" xmlns:p="http://schemas.openxmlformats.org/presentationml/2006/main" xmlns:r="http://schemas.openxmlformats.org/officeDocument/2006/relationships" xmlns:a="http://schemas.openxmlformats.org/drawingml/2006/main" xmlns="" val="1953130109"/>
+        <p14:creationId xmlns:p14="http://schemas.microsoft.com/office/powerpoint/2010/main" val="1953130109"/>
       </p:ext>
     </p:extLst>
   </p:cSld>
@@ -679,7 +680,7 @@
 </file>
 
 <file path=ppt/notesSlides/notesSlide1.xml><?xml version="1.0" encoding="utf-8"?>
-<p:notes xmlns:a="http://schemas.openxmlformats.org/drawingml/2006/main" xmlns:r="http://schemas.openxmlformats.org/officeDocument/2006/relationships" xmlns:mc="http://schemas.openxmlformats.org/markup-compatibility/2006" xmlns:mv="urn:schemas-microsoft-com:mac:vml" xmlns:p="http://schemas.openxmlformats.org/presentationml/2006/main" mc:Ignorable="mv" mc:PreserveAttributes="mv:*">
+<p:notes xmlns:a="http://schemas.openxmlformats.org/drawingml/2006/main" xmlns:r="http://schemas.openxmlformats.org/officeDocument/2006/relationships" xmlns:p="http://schemas.openxmlformats.org/presentationml/2006/main">
   <p:cSld>
     <p:spTree>
       <p:nvGrpSpPr>
@@ -761,7 +762,7 @@
 </file>
 
 <file path=ppt/slideLayouts/slideLayout1.xml><?xml version="1.0" encoding="utf-8"?>
-<p:sldLayout xmlns:a="http://schemas.openxmlformats.org/drawingml/2006/main" xmlns:r="http://schemas.openxmlformats.org/officeDocument/2006/relationships" xmlns:mc="http://schemas.openxmlformats.org/markup-compatibility/2006" xmlns:mv="urn:schemas-microsoft-com:mac:vml" xmlns:p="http://schemas.openxmlformats.org/presentationml/2006/main" mc:Ignorable="mv" mc:PreserveAttributes="mv:*" preserve="1" userDrawn="1">
+<p:sldLayout xmlns:a="http://schemas.openxmlformats.org/drawingml/2006/main" xmlns:r="http://schemas.openxmlformats.org/officeDocument/2006/relationships" xmlns:p="http://schemas.openxmlformats.org/presentationml/2006/main" preserve="1" userDrawn="1">
   <p:cSld name="Title Slide">
     <p:spTree>
       <p:nvGrpSpPr>
@@ -947,7 +948,7 @@
             <a:fld id="{ADB8239A-D789-5443-937F-338E3AE3D41C}" type="datetime1">
               <a:rPr lang="en-US" smtClean="0"/>
               <a:pPr/>
-              <a:t>11/27/10</a:t>
+              <a:t>11/28/2010</a:t>
             </a:fld>
             <a:endParaRPr lang="en-US"/>
           </a:p>
@@ -986,7 +987,7 @@
 </file>
 
 <file path=ppt/slideLayouts/slideLayout10.xml><?xml version="1.0" encoding="utf-8"?>
-<p:sldLayout xmlns:a="http://schemas.openxmlformats.org/drawingml/2006/main" xmlns:r="http://schemas.openxmlformats.org/officeDocument/2006/relationships" xmlns:mc="http://schemas.openxmlformats.org/markup-compatibility/2006" xmlns:mv="urn:schemas-microsoft-com:mac:vml" xmlns:p="http://schemas.openxmlformats.org/presentationml/2006/main" mc:Ignorable="mv" mc:PreserveAttributes="mv:*" type="picTx" preserve="1">
+<p:sldLayout xmlns:a="http://schemas.openxmlformats.org/drawingml/2006/main" xmlns:r="http://schemas.openxmlformats.org/officeDocument/2006/relationships" xmlns:p="http://schemas.openxmlformats.org/presentationml/2006/main" type="picTx" preserve="1">
   <p:cSld name="Picture with Caption">
     <p:spTree>
       <p:nvGrpSpPr>
@@ -1251,7 +1252,7 @@
             <a:fld id="{459EC1CE-E98D-704D-AD6F-6E3323A36483}" type="datetime1">
               <a:rPr lang="en-US" smtClean="0"/>
               <a:pPr/>
-              <a:t>11/27/10</a:t>
+              <a:t>11/28/2010</a:t>
             </a:fld>
             <a:endParaRPr lang="en-US"/>
           </a:p>
@@ -1309,7 +1310,7 @@
 </file>
 
 <file path=ppt/slideLayouts/slideLayout11.xml><?xml version="1.0" encoding="utf-8"?>
-<p:sldLayout xmlns:a="http://schemas.openxmlformats.org/drawingml/2006/main" xmlns:r="http://schemas.openxmlformats.org/officeDocument/2006/relationships" xmlns:mc="http://schemas.openxmlformats.org/markup-compatibility/2006" xmlns:mv="urn:schemas-microsoft-com:mac:vml" xmlns:p="http://schemas.openxmlformats.org/presentationml/2006/main" mc:Ignorable="mv" mc:PreserveAttributes="mv:*" preserve="1">
+<p:sldLayout xmlns:a="http://schemas.openxmlformats.org/drawingml/2006/main" xmlns:r="http://schemas.openxmlformats.org/officeDocument/2006/relationships" xmlns:p="http://schemas.openxmlformats.org/presentationml/2006/main" preserve="1">
   <p:cSld name="Picture above Caption">
     <p:spTree>
       <p:nvGrpSpPr>
@@ -1527,7 +1528,7 @@
             <a:fld id="{23E692A5-8B3E-1949-B0CC-6F0593ACFA8E}" type="datetime1">
               <a:rPr lang="en-US" smtClean="0"/>
               <a:pPr/>
-              <a:t>11/27/10</a:t>
+              <a:t>11/28/2010</a:t>
             </a:fld>
             <a:endParaRPr lang="en-US"/>
           </a:p>
@@ -1596,7 +1597,7 @@
 </file>
 
 <file path=ppt/slideLayouts/slideLayout12.xml><?xml version="1.0" encoding="utf-8"?>
-<p:sldLayout xmlns:a="http://schemas.openxmlformats.org/drawingml/2006/main" xmlns:r="http://schemas.openxmlformats.org/officeDocument/2006/relationships" xmlns:mc="http://schemas.openxmlformats.org/markup-compatibility/2006" xmlns:mv="urn:schemas-microsoft-com:mac:vml" xmlns:p="http://schemas.openxmlformats.org/presentationml/2006/main" mc:Ignorable="mv" mc:PreserveAttributes="mv:*" preserve="1">
+<p:sldLayout xmlns:a="http://schemas.openxmlformats.org/drawingml/2006/main" xmlns:r="http://schemas.openxmlformats.org/officeDocument/2006/relationships" xmlns:p="http://schemas.openxmlformats.org/presentationml/2006/main" preserve="1">
   <p:cSld name="2 Pictures with Caption">
     <p:spTree>
       <p:nvGrpSpPr>
@@ -1819,7 +1820,7 @@
             <a:fld id="{C381DA14-A3C0-9C42-96F2-BEE3D5DE963D}" type="datetime1">
               <a:rPr lang="en-US" smtClean="0"/>
               <a:pPr/>
-              <a:t>11/27/10</a:t>
+              <a:t>11/28/2010</a:t>
             </a:fld>
             <a:endParaRPr lang="en-US"/>
           </a:p>
@@ -1923,7 +1924,7 @@
 </file>
 
 <file path=ppt/slideLayouts/slideLayout13.xml><?xml version="1.0" encoding="utf-8"?>
-<p:sldLayout xmlns:a="http://schemas.openxmlformats.org/drawingml/2006/main" xmlns:r="http://schemas.openxmlformats.org/officeDocument/2006/relationships" xmlns:mc="http://schemas.openxmlformats.org/markup-compatibility/2006" xmlns:mv="urn:schemas-microsoft-com:mac:vml" xmlns:p="http://schemas.openxmlformats.org/presentationml/2006/main" mc:Ignorable="mv" mc:PreserveAttributes="mv:*" preserve="1">
+<p:sldLayout xmlns:a="http://schemas.openxmlformats.org/drawingml/2006/main" xmlns:r="http://schemas.openxmlformats.org/officeDocument/2006/relationships" xmlns:p="http://schemas.openxmlformats.org/presentationml/2006/main" preserve="1">
   <p:cSld name="3 Pictures with Caption">
     <p:spTree>
       <p:nvGrpSpPr>
@@ -2146,7 +2147,7 @@
             <a:fld id="{33319320-9A5F-694B-B7B5-C734EC93AAA2}" type="datetime1">
               <a:rPr lang="en-US" smtClean="0"/>
               <a:pPr/>
-              <a:t>11/27/10</a:t>
+              <a:t>11/28/2010</a:t>
             </a:fld>
             <a:endParaRPr lang="en-US"/>
           </a:p>
@@ -2285,7 +2286,7 @@
 </file>
 
 <file path=ppt/slideLayouts/slideLayout14.xml><?xml version="1.0" encoding="utf-8"?>
-<p:sldLayout xmlns:a="http://schemas.openxmlformats.org/drawingml/2006/main" xmlns:r="http://schemas.openxmlformats.org/officeDocument/2006/relationships" xmlns:mc="http://schemas.openxmlformats.org/markup-compatibility/2006" xmlns:mv="urn:schemas-microsoft-com:mac:vml" xmlns:p="http://schemas.openxmlformats.org/presentationml/2006/main" mc:Ignorable="mv" mc:PreserveAttributes="mv:*" type="vertTx" preserve="1">
+<p:sldLayout xmlns:a="http://schemas.openxmlformats.org/drawingml/2006/main" xmlns:r="http://schemas.openxmlformats.org/officeDocument/2006/relationships" xmlns:p="http://schemas.openxmlformats.org/presentationml/2006/main" type="vertTx" preserve="1">
   <p:cSld name="Title and Vertical Text">
     <p:spTree>
       <p:nvGrpSpPr>
@@ -2394,7 +2395,7 @@
             <a:fld id="{CF6CE397-A6E6-7547-B24A-92BB5049E0F2}" type="datetime1">
               <a:rPr lang="en-US" smtClean="0"/>
               <a:pPr/>
-              <a:t>11/27/10</a:t>
+              <a:t>11/28/2010</a:t>
             </a:fld>
             <a:endParaRPr lang="en-US"/>
           </a:p>
@@ -2452,7 +2453,7 @@
 </file>
 
 <file path=ppt/slideLayouts/slideLayout15.xml><?xml version="1.0" encoding="utf-8"?>
-<p:sldLayout xmlns:a="http://schemas.openxmlformats.org/drawingml/2006/main" xmlns:r="http://schemas.openxmlformats.org/officeDocument/2006/relationships" xmlns:mc="http://schemas.openxmlformats.org/markup-compatibility/2006" xmlns:mv="urn:schemas-microsoft-com:mac:vml" xmlns:p="http://schemas.openxmlformats.org/presentationml/2006/main" mc:Ignorable="mv" mc:PreserveAttributes="mv:*" type="vertTitleAndTx" preserve="1">
+<p:sldLayout xmlns:a="http://schemas.openxmlformats.org/drawingml/2006/main" xmlns:r="http://schemas.openxmlformats.org/officeDocument/2006/relationships" xmlns:p="http://schemas.openxmlformats.org/presentationml/2006/main" type="vertTitleAndTx" preserve="1">
   <p:cSld name="Vertical Title and Text">
     <p:spTree>
       <p:nvGrpSpPr>
@@ -2571,7 +2572,7 @@
             <a:fld id="{27AB7D46-BD5E-E641-9118-DCE28F3B83FA}" type="datetime1">
               <a:rPr lang="en-US" smtClean="0"/>
               <a:pPr/>
-              <a:t>11/27/10</a:t>
+              <a:t>11/28/2010</a:t>
             </a:fld>
             <a:endParaRPr lang="en-US"/>
           </a:p>
@@ -2629,7 +2630,7 @@
 </file>
 
 <file path=ppt/slideLayouts/slideLayout2.xml><?xml version="1.0" encoding="utf-8"?>
-<p:sldLayout xmlns:a="http://schemas.openxmlformats.org/drawingml/2006/main" xmlns:r="http://schemas.openxmlformats.org/officeDocument/2006/relationships" xmlns:mc="http://schemas.openxmlformats.org/markup-compatibility/2006" xmlns:mv="urn:schemas-microsoft-com:mac:vml" xmlns:p="http://schemas.openxmlformats.org/presentationml/2006/main" mc:Ignorable="mv" mc:PreserveAttributes="mv:*" type="obj" preserve="1">
+<p:sldLayout xmlns:a="http://schemas.openxmlformats.org/drawingml/2006/main" xmlns:r="http://schemas.openxmlformats.org/officeDocument/2006/relationships" xmlns:p="http://schemas.openxmlformats.org/presentationml/2006/main" type="obj" preserve="1">
   <p:cSld name="Title and Content">
     <p:spTree>
       <p:nvGrpSpPr>
@@ -2823,7 +2824,7 @@
             <a:fld id="{BC26097E-015C-3B4D-86C1-CD2AD30F0B81}" type="datetime1">
               <a:rPr lang="en-US" smtClean="0"/>
               <a:pPr/>
-              <a:t>11/27/10</a:t>
+              <a:t>11/28/2010</a:t>
             </a:fld>
             <a:endParaRPr lang="en-US"/>
           </a:p>
@@ -2886,7 +2887,7 @@
 </file>
 
 <file path=ppt/slideLayouts/slideLayout3.xml><?xml version="1.0" encoding="utf-8"?>
-<p:sldLayout xmlns:a="http://schemas.openxmlformats.org/drawingml/2006/main" xmlns:r="http://schemas.openxmlformats.org/officeDocument/2006/relationships" xmlns:mc="http://schemas.openxmlformats.org/markup-compatibility/2006" xmlns:mv="urn:schemas-microsoft-com:mac:vml" xmlns:p="http://schemas.openxmlformats.org/presentationml/2006/main" mc:Ignorable="mv" mc:PreserveAttributes="mv:*" preserve="1">
+<p:sldLayout xmlns:a="http://schemas.openxmlformats.org/drawingml/2006/main" xmlns:r="http://schemas.openxmlformats.org/officeDocument/2006/relationships" xmlns:p="http://schemas.openxmlformats.org/presentationml/2006/main" preserve="1">
   <p:cSld name="Title Slide with Picture">
     <p:spTree>
       <p:nvGrpSpPr>
@@ -3099,7 +3100,7 @@
             <a:fld id="{ED6649F4-2545-3040-B7BD-803CA59D50C7}" type="datetime1">
               <a:rPr lang="en-US" smtClean="0"/>
               <a:pPr/>
-              <a:t>11/27/10</a:t>
+              <a:t>11/28/2010</a:t>
             </a:fld>
             <a:endParaRPr lang="en-US"/>
           </a:p>
@@ -3168,7 +3169,7 @@
 </file>
 
 <file path=ppt/slideLayouts/slideLayout4.xml><?xml version="1.0" encoding="utf-8"?>
-<p:sldLayout xmlns:a="http://schemas.openxmlformats.org/drawingml/2006/main" xmlns:r="http://schemas.openxmlformats.org/officeDocument/2006/relationships" xmlns:mc="http://schemas.openxmlformats.org/markup-compatibility/2006" xmlns:mv="urn:schemas-microsoft-com:mac:vml" xmlns:p="http://schemas.openxmlformats.org/presentationml/2006/main" mc:Ignorable="mv" mc:PreserveAttributes="mv:*" type="secHead" preserve="1">
+<p:sldLayout xmlns:a="http://schemas.openxmlformats.org/drawingml/2006/main" xmlns:r="http://schemas.openxmlformats.org/officeDocument/2006/relationships" xmlns:p="http://schemas.openxmlformats.org/presentationml/2006/main" type="secHead" preserve="1">
   <p:cSld name="Section Header">
     <p:spTree>
       <p:nvGrpSpPr>
@@ -3407,7 +3408,7 @@
             <a:fld id="{833A9088-CEDD-2F48-A9A0-611A3CC03FE9}" type="datetime1">
               <a:rPr lang="en-US" smtClean="0"/>
               <a:pPr/>
-              <a:t>11/27/10</a:t>
+              <a:t>11/28/2010</a:t>
             </a:fld>
             <a:endParaRPr lang="en-US"/>
           </a:p>
@@ -3465,7 +3466,7 @@
 </file>
 
 <file path=ppt/slideLayouts/slideLayout5.xml><?xml version="1.0" encoding="utf-8"?>
-<p:sldLayout xmlns:a="http://schemas.openxmlformats.org/drawingml/2006/main" xmlns:r="http://schemas.openxmlformats.org/officeDocument/2006/relationships" xmlns:mc="http://schemas.openxmlformats.org/markup-compatibility/2006" xmlns:mv="urn:schemas-microsoft-com:mac:vml" xmlns:p="http://schemas.openxmlformats.org/presentationml/2006/main" mc:Ignorable="mv" mc:PreserveAttributes="mv:*" type="twoObj" preserve="1">
+<p:sldLayout xmlns:a="http://schemas.openxmlformats.org/drawingml/2006/main" xmlns:r="http://schemas.openxmlformats.org/officeDocument/2006/relationships" xmlns:p="http://schemas.openxmlformats.org/presentationml/2006/main" type="twoObj" preserve="1">
   <p:cSld name="Two Content">
     <p:spTree>
       <p:nvGrpSpPr>
@@ -3701,7 +3702,7 @@
             <a:fld id="{AED87ACF-EB3C-EA42-8610-542FB50388EB}" type="datetime1">
               <a:rPr lang="en-US" smtClean="0"/>
               <a:pPr/>
-              <a:t>11/27/10</a:t>
+              <a:t>11/28/2010</a:t>
             </a:fld>
             <a:endParaRPr lang="en-US"/>
           </a:p>
@@ -3759,7 +3760,7 @@
 </file>
 
 <file path=ppt/slideLayouts/slideLayout6.xml><?xml version="1.0" encoding="utf-8"?>
-<p:sldLayout xmlns:a="http://schemas.openxmlformats.org/drawingml/2006/main" xmlns:r="http://schemas.openxmlformats.org/officeDocument/2006/relationships" xmlns:mc="http://schemas.openxmlformats.org/markup-compatibility/2006" xmlns:mv="urn:schemas-microsoft-com:mac:vml" xmlns:p="http://schemas.openxmlformats.org/presentationml/2006/main" mc:Ignorable="mv" mc:PreserveAttributes="mv:*" type="twoTxTwoObj" preserve="1">
+<p:sldLayout xmlns:a="http://schemas.openxmlformats.org/drawingml/2006/main" xmlns:r="http://schemas.openxmlformats.org/officeDocument/2006/relationships" xmlns:p="http://schemas.openxmlformats.org/presentationml/2006/main" type="twoTxTwoObj" preserve="1">
   <p:cSld name="Comparison">
     <p:spTree>
       <p:nvGrpSpPr>
@@ -4133,7 +4134,7 @@
             <a:fld id="{0E0DC31B-692F-774E-A937-DA560DE61DA8}" type="datetime1">
               <a:rPr lang="en-US" smtClean="0"/>
               <a:pPr/>
-              <a:t>11/27/10</a:t>
+              <a:t>11/28/2010</a:t>
             </a:fld>
             <a:endParaRPr lang="en-US"/>
           </a:p>
@@ -4424,7 +4425,7 @@
 </file>
 
 <file path=ppt/slideLayouts/slideLayout7.xml><?xml version="1.0" encoding="utf-8"?>
-<p:sldLayout xmlns:a="http://schemas.openxmlformats.org/drawingml/2006/main" xmlns:r="http://schemas.openxmlformats.org/officeDocument/2006/relationships" xmlns:mc="http://schemas.openxmlformats.org/markup-compatibility/2006" xmlns:mv="urn:schemas-microsoft-com:mac:vml" xmlns:p="http://schemas.openxmlformats.org/presentationml/2006/main" mc:Ignorable="mv" mc:PreserveAttributes="mv:*" type="titleOnly" preserve="1">
+<p:sldLayout xmlns:a="http://schemas.openxmlformats.org/drawingml/2006/main" xmlns:r="http://schemas.openxmlformats.org/officeDocument/2006/relationships" xmlns:p="http://schemas.openxmlformats.org/presentationml/2006/main" type="titleOnly" preserve="1">
   <p:cSld name="Title Only">
     <p:spTree>
       <p:nvGrpSpPr>
@@ -4481,7 +4482,7 @@
             <a:fld id="{95DEFDAE-5BDC-1B4F-BC4C-23C867CEBC21}" type="datetime1">
               <a:rPr lang="en-US" smtClean="0"/>
               <a:pPr/>
-              <a:t>11/27/10</a:t>
+              <a:t>11/28/2010</a:t>
             </a:fld>
             <a:endParaRPr lang="en-US"/>
           </a:p>
@@ -4539,7 +4540,7 @@
 </file>
 
 <file path=ppt/slideLayouts/slideLayout8.xml><?xml version="1.0" encoding="utf-8"?>
-<p:sldLayout xmlns:a="http://schemas.openxmlformats.org/drawingml/2006/main" xmlns:r="http://schemas.openxmlformats.org/officeDocument/2006/relationships" xmlns:mc="http://schemas.openxmlformats.org/markup-compatibility/2006" xmlns:mv="urn:schemas-microsoft-com:mac:vml" xmlns:p="http://schemas.openxmlformats.org/presentationml/2006/main" mc:Ignorable="mv" mc:PreserveAttributes="mv:*" type="blank" preserve="1">
+<p:sldLayout xmlns:a="http://schemas.openxmlformats.org/drawingml/2006/main" xmlns:r="http://schemas.openxmlformats.org/officeDocument/2006/relationships" xmlns:p="http://schemas.openxmlformats.org/presentationml/2006/main" type="blank" preserve="1">
   <p:cSld name="Blank">
     <p:spTree>
       <p:nvGrpSpPr>
@@ -4573,7 +4574,7 @@
             <a:fld id="{9F53C516-787B-9A45-AFCF-5D75DD78DEBE}" type="datetime1">
               <a:rPr lang="en-US" smtClean="0"/>
               <a:pPr/>
-              <a:t>11/27/10</a:t>
+              <a:t>11/28/2010</a:t>
             </a:fld>
             <a:endParaRPr lang="en-US"/>
           </a:p>
@@ -4631,7 +4632,7 @@
 </file>
 
 <file path=ppt/slideLayouts/slideLayout9.xml><?xml version="1.0" encoding="utf-8"?>
-<p:sldLayout xmlns:a="http://schemas.openxmlformats.org/drawingml/2006/main" xmlns:r="http://schemas.openxmlformats.org/officeDocument/2006/relationships" xmlns:mc="http://schemas.openxmlformats.org/markup-compatibility/2006" xmlns:mv="urn:schemas-microsoft-com:mac:vml" xmlns:p="http://schemas.openxmlformats.org/presentationml/2006/main" mc:Ignorable="mv" mc:PreserveAttributes="mv:*" type="objTx" preserve="1">
+<p:sldLayout xmlns:a="http://schemas.openxmlformats.org/drawingml/2006/main" xmlns:r="http://schemas.openxmlformats.org/officeDocument/2006/relationships" xmlns:p="http://schemas.openxmlformats.org/presentationml/2006/main" type="objTx" preserve="1">
   <p:cSld name="Content with Caption">
     <p:spTree>
       <p:nvGrpSpPr>
@@ -4912,7 +4913,7 @@
             <a:fld id="{F19CAA94-9393-BB4A-8CB6-008B1351A132}" type="datetime1">
               <a:rPr lang="en-US" smtClean="0"/>
               <a:pPr/>
-              <a:t>11/27/10</a:t>
+              <a:t>11/28/2010</a:t>
             </a:fld>
             <a:endParaRPr lang="en-US"/>
           </a:p>
@@ -4970,7 +4971,7 @@
 </file>
 
 <file path=ppt/slideMasters/slideMaster1.xml><?xml version="1.0" encoding="utf-8"?>
-<p:sldMaster xmlns:a="http://schemas.openxmlformats.org/drawingml/2006/main" xmlns:r="http://schemas.openxmlformats.org/officeDocument/2006/relationships" xmlns:mc="http://schemas.openxmlformats.org/markup-compatibility/2006" xmlns:mv="urn:schemas-microsoft-com:mac:vml" xmlns:p="http://schemas.openxmlformats.org/presentationml/2006/main" mc:Ignorable="mv" mc:PreserveAttributes="mv:*">
+<p:sldMaster xmlns:a="http://schemas.openxmlformats.org/drawingml/2006/main" xmlns:r="http://schemas.openxmlformats.org/officeDocument/2006/relationships" xmlns:p="http://schemas.openxmlformats.org/presentationml/2006/main">
   <p:cSld>
     <p:bg>
       <p:bgRef idx="1001">
@@ -5126,7 +5127,7 @@
             <a:fld id="{A3476A5E-2ED6-7749-A8C1-D0B1EEEB97E0}" type="datetime1">
               <a:rPr lang="en-US" smtClean="0"/>
               <a:pPr/>
-              <a:t>11/27/10</a:t>
+              <a:t>11/28/2010</a:t>
             </a:fld>
             <a:endParaRPr lang="en-US"/>
           </a:p>
@@ -5620,7 +5621,7 @@
 </file>
 
 <file path=ppt/slides/slide1.xml><?xml version="1.0" encoding="utf-8"?>
-<p:sld xmlns:a="http://schemas.openxmlformats.org/drawingml/2006/main" xmlns:r="http://schemas.openxmlformats.org/officeDocument/2006/relationships" xmlns:mc="http://schemas.openxmlformats.org/markup-compatibility/2006" xmlns:mv="urn:schemas-microsoft-com:mac:vml" xmlns:p="http://schemas.openxmlformats.org/presentationml/2006/main" mc:Ignorable="mv" mc:PreserveAttributes="mv:*">
+<p:sld xmlns:a="http://schemas.openxmlformats.org/drawingml/2006/main" xmlns:r="http://schemas.openxmlformats.org/officeDocument/2006/relationships" xmlns:p="http://schemas.openxmlformats.org/presentationml/2006/main">
   <p:cSld>
     <p:spTree>
       <p:nvGrpSpPr>
@@ -5769,7 +5770,7 @@
 </file>
 
 <file path=ppt/slides/slide10.xml><?xml version="1.0" encoding="utf-8"?>
-<p:sld xmlns:a="http://schemas.openxmlformats.org/drawingml/2006/main" xmlns:r="http://schemas.openxmlformats.org/officeDocument/2006/relationships" xmlns:mc="http://schemas.openxmlformats.org/markup-compatibility/2006" xmlns:mv="urn:schemas-microsoft-com:mac:vml" xmlns:p="http://schemas.openxmlformats.org/presentationml/2006/main" mc:Ignorable="mv" mc:PreserveAttributes="mv:*">
+<p:sld xmlns:a="http://schemas.openxmlformats.org/drawingml/2006/main" xmlns:r="http://schemas.openxmlformats.org/officeDocument/2006/relationships" xmlns:p="http://schemas.openxmlformats.org/presentationml/2006/main">
   <p:cSld>
     <p:spTree>
       <p:nvGrpSpPr>
@@ -5818,8 +5819,8 @@
             <p:ph idx="1"/>
           </p:nvPr>
         </p:nvPicPr>
-        <mc:AlternateContent xmlns:ma="http://schemas.microsoft.com/office/mac/drawingml/2008/main">
-          <mc:Choice Requires="ma">
+        <mc:AlternateContent xmlns:mc="http://schemas.openxmlformats.org/markup-compatibility/2006">
+          <mc:Choice xmlns="" xmlns:mv="urn:schemas-microsoft-com:mac:vml" xmlns:ma="http://schemas.microsoft.com/office/mac/drawingml/2008/main" Requires="ma">
             <p:blipFill>
               <a:blip r:embed="rId2"/>
               <a:stretch>
@@ -5827,7 +5828,7 @@
               </a:stretch>
             </p:blipFill>
           </mc:Choice>
-          <mc:Fallback xmlns:mc="http://schemas.openxmlformats.org/markup-compatibility/2006" xmlns:p="http://schemas.openxmlformats.org/presentationml/2006/main" xmlns:r="http://schemas.openxmlformats.org/officeDocument/2006/relationships" xmlns:a="http://schemas.openxmlformats.org/drawingml/2006/main" xmlns="">
+          <mc:Fallback>
             <p:blipFill>
               <a:blip r:embed="rId3"/>
               <a:stretch>
@@ -5852,7 +5853,7 @@
 </file>
 
 <file path=ppt/slides/slide11.xml><?xml version="1.0" encoding="utf-8"?>
-<p:sld xmlns:a="http://schemas.openxmlformats.org/drawingml/2006/main" xmlns:r="http://schemas.openxmlformats.org/officeDocument/2006/relationships" xmlns:mc="http://schemas.openxmlformats.org/markup-compatibility/2006" xmlns:mv="urn:schemas-microsoft-com:mac:vml" xmlns:p="http://schemas.openxmlformats.org/presentationml/2006/main" mc:Ignorable="mv" mc:PreserveAttributes="mv:*">
+<p:sld xmlns:a="http://schemas.openxmlformats.org/drawingml/2006/main" xmlns:r="http://schemas.openxmlformats.org/officeDocument/2006/relationships" xmlns:p="http://schemas.openxmlformats.org/presentationml/2006/main">
   <p:cSld>
     <p:spTree>
       <p:nvGrpSpPr>
@@ -5916,7 +5917,7 @@
     </p:spTree>
     <p:extLst>
       <p:ext uri="{BB962C8B-B14F-4D97-AF65-F5344CB8AC3E}">
-        <p14:creationId xmlns:p14="http://schemas.microsoft.com/office/powerpoint/2010/main" xmlns:p="http://schemas.openxmlformats.org/presentationml/2006/main" xmlns:r="http://schemas.openxmlformats.org/officeDocument/2006/relationships" xmlns:a="http://schemas.openxmlformats.org/drawingml/2006/main" xmlns="" val="738217468"/>
+        <p14:creationId xmlns:p14="http://schemas.microsoft.com/office/powerpoint/2010/main" val="738217468"/>
       </p:ext>
     </p:extLst>
   </p:cSld>
@@ -5927,7 +5928,7 @@
 </file>
 
 <file path=ppt/slides/slide12.xml><?xml version="1.0" encoding="utf-8"?>
-<p:sld xmlns:a="http://schemas.openxmlformats.org/drawingml/2006/main" xmlns:r="http://schemas.openxmlformats.org/officeDocument/2006/relationships" xmlns:mc="http://schemas.openxmlformats.org/markup-compatibility/2006" xmlns:mv="urn:schemas-microsoft-com:mac:vml" xmlns:p="http://schemas.openxmlformats.org/presentationml/2006/main" mc:Ignorable="mv" mc:PreserveAttributes="mv:*">
+<p:sld xmlns:a="http://schemas.openxmlformats.org/drawingml/2006/main" xmlns:r="http://schemas.openxmlformats.org/officeDocument/2006/relationships" xmlns:p="http://schemas.openxmlformats.org/presentationml/2006/main">
   <p:cSld>
     <p:spTree>
       <p:nvGrpSpPr>
@@ -5976,8 +5977,8 @@
             <p:ph idx="1"/>
           </p:nvPr>
         </p:nvPicPr>
-        <mc:AlternateContent xmlns:ma="http://schemas.microsoft.com/office/mac/drawingml/2008/main">
-          <mc:Choice Requires="ma">
+        <mc:AlternateContent xmlns:mc="http://schemas.openxmlformats.org/markup-compatibility/2006">
+          <mc:Choice xmlns="" xmlns:mv="urn:schemas-microsoft-com:mac:vml" xmlns:ma="http://schemas.microsoft.com/office/mac/drawingml/2008/main" Requires="ma">
             <p:blipFill>
               <a:blip r:embed="rId2"/>
               <a:stretch>
@@ -5985,7 +5986,7 @@
               </a:stretch>
             </p:blipFill>
           </mc:Choice>
-          <mc:Fallback xmlns:mc="http://schemas.openxmlformats.org/markup-compatibility/2006" xmlns:p="http://schemas.openxmlformats.org/presentationml/2006/main" xmlns:r="http://schemas.openxmlformats.org/officeDocument/2006/relationships" xmlns:a="http://schemas.openxmlformats.org/drawingml/2006/main" xmlns="">
+          <mc:Fallback>
             <p:blipFill>
               <a:blip r:embed="rId3"/>
               <a:stretch>
@@ -6006,18 +6007,11 @@
   <p:clrMapOvr>
     <a:masterClrMapping/>
   </p:clrMapOvr>
-  <p:timing>
-    <p:tnLst>
-      <p:par>
-        <p:cTn id="1" dur="indefinite" restart="never" nodeType="tmRoot"/>
-      </p:par>
-    </p:tnLst>
-  </p:timing>
 </p:sld>
 </file>
 
 <file path=ppt/slides/slide13.xml><?xml version="1.0" encoding="utf-8"?>
-<p:sld xmlns:a="http://schemas.openxmlformats.org/drawingml/2006/main" xmlns:r="http://schemas.openxmlformats.org/officeDocument/2006/relationships" xmlns:mc="http://schemas.openxmlformats.org/markup-compatibility/2006" xmlns:mv="urn:schemas-microsoft-com:mac:vml" xmlns:p="http://schemas.openxmlformats.org/presentationml/2006/main" mc:Ignorable="mv" mc:PreserveAttributes="mv:*">
+<p:sld xmlns:a="http://schemas.openxmlformats.org/drawingml/2006/main" xmlns:r="http://schemas.openxmlformats.org/officeDocument/2006/relationships" xmlns:p="http://schemas.openxmlformats.org/presentationml/2006/main">
   <p:cSld>
     <p:spTree>
       <p:nvGrpSpPr>
@@ -6050,11 +6044,7 @@
           <a:p>
             <a:r>
               <a:rPr lang="en-US" dirty="0" smtClean="0"/>
-              <a:t>SAGA: Class</a:t>
-            </a:r>
-            <a:r>
-              <a:rPr lang="en-US" dirty="0" smtClean="0"/>
-              <a:t> Hierarchy</a:t>
+              <a:t>SAGA: Class hierarchy</a:t>
             </a:r>
             <a:endParaRPr lang="en-US" dirty="0"/>
           </a:p>
@@ -6088,18 +6078,169 @@
   <p:clrMapOvr>
     <a:masterClrMapping/>
   </p:clrMapOvr>
-  <p:timing>
-    <p:tnLst>
-      <p:par>
-        <p:cTn id="1" dur="indefinite" restart="never" nodeType="tmRoot"/>
-      </p:par>
-    </p:tnLst>
-  </p:timing>
 </p:sld>
 </file>
 
 <file path=ppt/slides/slide14.xml><?xml version="1.0" encoding="utf-8"?>
-<p:sld xmlns:a="http://schemas.openxmlformats.org/drawingml/2006/main" xmlns:r="http://schemas.openxmlformats.org/officeDocument/2006/relationships" xmlns:mc="http://schemas.openxmlformats.org/markup-compatibility/2006" xmlns:mv="urn:schemas-microsoft-com:mac:vml" xmlns:p="http://schemas.openxmlformats.org/presentationml/2006/main" mc:Ignorable="mv" mc:PreserveAttributes="mv:*">
+<p:sld xmlns:a="http://schemas.openxmlformats.org/drawingml/2006/main" xmlns:r="http://schemas.openxmlformats.org/officeDocument/2006/relationships" xmlns:p="http://schemas.openxmlformats.org/presentationml/2006/main">
+  <p:cSld>
+    <p:spTree>
+      <p:nvGrpSpPr>
+        <p:cNvPr id="1" name=""/>
+        <p:cNvGrpSpPr/>
+        <p:nvPr/>
+      </p:nvGrpSpPr>
+      <p:grpSpPr>
+        <a:xfrm>
+          <a:off x="0" y="0"/>
+          <a:ext cx="0" cy="0"/>
+          <a:chOff x="0" y="0"/>
+          <a:chExt cx="0" cy="0"/>
+        </a:xfrm>
+      </p:grpSpPr>
+      <p:sp>
+        <p:nvSpPr>
+          <p:cNvPr id="2" name="Title 1"/>
+          <p:cNvSpPr>
+            <a:spLocks noGrp="1"/>
+          </p:cNvSpPr>
+          <p:nvPr>
+            <p:ph type="title"/>
+          </p:nvPr>
+        </p:nvSpPr>
+        <p:spPr/>
+        <p:txBody>
+          <a:bodyPr/>
+          <a:lstStyle/>
+          <a:p>
+            <a:r>
+              <a:rPr lang="en-US" dirty="0"/>
+              <a:t>SAGA Job </a:t>
+            </a:r>
+            <a:r>
+              <a:rPr lang="en-US" dirty="0" smtClean="0"/>
+              <a:t>Package</a:t>
+            </a:r>
+            <a:r>
+              <a:rPr lang="en-US" dirty="0" smtClean="0"/>
+              <a:t>: Overview</a:t>
+            </a:r>
+            <a:endParaRPr lang="en-US" dirty="0"/>
+          </a:p>
+        </p:txBody>
+      </p:sp>
+      <p:sp>
+        <p:nvSpPr>
+          <p:cNvPr id="3" name="Content Placeholder 2"/>
+          <p:cNvSpPr>
+            <a:spLocks noGrp="1"/>
+          </p:cNvSpPr>
+          <p:nvPr>
+            <p:ph idx="1"/>
+          </p:nvPr>
+        </p:nvSpPr>
+        <p:spPr>
+          <a:xfrm>
+            <a:off x="575067" y="2068618"/>
+            <a:ext cx="8155866" cy="4197711"/>
+          </a:xfrm>
+        </p:spPr>
+        <p:txBody>
+          <a:bodyPr numCol="1">
+            <a:noAutofit/>
+          </a:bodyPr>
+          <a:lstStyle/>
+          <a:p>
+            <a:pPr marL="285750" indent="-285750"/>
+            <a:r>
+              <a:rPr lang="en-US" dirty="0" smtClean="0"/>
+              <a:t>running jobs is </a:t>
+            </a:r>
+            <a:r>
+              <a:rPr lang="en-US" b="1" dirty="0" smtClean="0"/>
+              <a:t>use case #1</a:t>
+            </a:r>
+          </a:p>
+          <a:p>
+            <a:pPr marL="285750" indent="-285750"/>
+            <a:r>
+              <a:rPr lang="en-US" dirty="0" smtClean="0"/>
+              <a:t>all </a:t>
+            </a:r>
+            <a:r>
+              <a:rPr lang="en-US" dirty="0" err="1" smtClean="0"/>
+              <a:t>middlewares</a:t>
+            </a:r>
+            <a:r>
+              <a:rPr lang="en-US" dirty="0" smtClean="0"/>
+              <a:t> support it, one way or the other</a:t>
+            </a:r>
+          </a:p>
+          <a:p>
+            <a:pPr marL="285750" indent="-285750"/>
+            <a:r>
+              <a:rPr lang="en-US" dirty="0" smtClean="0"/>
+              <a:t>well </a:t>
+            </a:r>
+            <a:r>
+              <a:rPr lang="en-US" dirty="0" err="1" smtClean="0"/>
+              <a:t>stablished</a:t>
+            </a:r>
+            <a:r>
+              <a:rPr lang="en-US" dirty="0" smtClean="0"/>
+              <a:t> patterns exist</a:t>
+            </a:r>
+          </a:p>
+          <a:p>
+            <a:pPr marL="628650" lvl="1" indent="-285750"/>
+            <a:r>
+              <a:rPr lang="en-US" dirty="0" smtClean="0"/>
+              <a:t>job description</a:t>
+            </a:r>
+          </a:p>
+          <a:p>
+            <a:pPr marL="628650" lvl="1" indent="-285750"/>
+            <a:r>
+              <a:rPr lang="en-US" dirty="0" smtClean="0"/>
+              <a:t>job state</a:t>
+            </a:r>
+          </a:p>
+          <a:p>
+            <a:pPr marL="628650" lvl="1" indent="-285750"/>
+            <a:r>
+              <a:rPr lang="en-US" dirty="0" smtClean="0"/>
+              <a:t>submission endpoint</a:t>
+            </a:r>
+          </a:p>
+          <a:p>
+            <a:pPr marL="628650" lvl="1" indent="-285750"/>
+            <a:r>
+              <a:rPr lang="en-US" dirty="0" smtClean="0"/>
+              <a:t>...</a:t>
+            </a:r>
+            <a:endParaRPr lang="en-US" dirty="0"/>
+          </a:p>
+          <a:p>
+            <a:pPr marL="285750" indent="-285750"/>
+            <a:endParaRPr lang="en-US" dirty="0"/>
+          </a:p>
+        </p:txBody>
+      </p:sp>
+    </p:spTree>
+    <p:extLst>
+      <p:ext uri="{BB962C8B-B14F-4D97-AF65-F5344CB8AC3E}">
+        <p14:creationId xmlns:p14="http://schemas.microsoft.com/office/powerpoint/2010/main" val="2862049404"/>
+      </p:ext>
+    </p:extLst>
+  </p:cSld>
+  <p:clrMapOvr>
+    <a:masterClrMapping/>
+  </p:clrMapOvr>
+</p:sld>
+</file>
+
+<file path=ppt/slides/slide15.xml><?xml version="1.0" encoding="utf-8"?>
+<p:sld xmlns:a="http://schemas.openxmlformats.org/drawingml/2006/main" xmlns:r="http://schemas.openxmlformats.org/officeDocument/2006/relationships" xmlns:p="http://schemas.openxmlformats.org/presentationml/2006/main">
   <p:cSld>
     <p:spTree>
       <p:nvGrpSpPr>
@@ -6569,8 +6710,8 @@
 </p:sld>
 </file>
 
-<file path=ppt/slides/slide15.xml><?xml version="1.0" encoding="utf-8"?>
-<p:sld xmlns:a="http://schemas.openxmlformats.org/drawingml/2006/main" xmlns:r="http://schemas.openxmlformats.org/officeDocument/2006/relationships" xmlns:mc="http://schemas.openxmlformats.org/markup-compatibility/2006" xmlns:mv="urn:schemas-microsoft-com:mac:vml" xmlns:p="http://schemas.openxmlformats.org/presentationml/2006/main" mc:Ignorable="mv" mc:PreserveAttributes="mv:*">
+<file path=ppt/slides/slide16.xml><?xml version="1.0" encoding="utf-8"?>
+<p:sld xmlns:a="http://schemas.openxmlformats.org/drawingml/2006/main" xmlns:r="http://schemas.openxmlformats.org/officeDocument/2006/relationships" xmlns:p="http://schemas.openxmlformats.org/presentationml/2006/main">
   <p:cSld>
     <p:spTree>
       <p:nvGrpSpPr>
@@ -6623,7 +6764,7 @@
           <a:blip r:embed="rId2">
             <a:extLst>
               <a:ext uri="{28A0092B-C50C-407E-A947-70E740481C1C}">
-                <a14:useLocalDpi xmlns:a14="http://schemas.microsoft.com/office/drawing/2010/main" xmlns:p="http://schemas.openxmlformats.org/presentationml/2006/main" xmlns:r="http://schemas.openxmlformats.org/officeDocument/2006/relationships" xmlns:a="http://schemas.openxmlformats.org/drawingml/2006/main" xmlns="" val="0"/>
+                <a14:useLocalDpi xmlns:a14="http://schemas.microsoft.com/office/drawing/2010/main" val="0"/>
               </a:ext>
             </a:extLst>
           </a:blip>
@@ -6641,7 +6782,7 @@
     </p:spTree>
     <p:extLst>
       <p:ext uri="{BB962C8B-B14F-4D97-AF65-F5344CB8AC3E}">
-        <p14:creationId xmlns:p14="http://schemas.microsoft.com/office/powerpoint/2010/main" xmlns:p="http://schemas.openxmlformats.org/presentationml/2006/main" xmlns:r="http://schemas.openxmlformats.org/officeDocument/2006/relationships" xmlns:a="http://schemas.openxmlformats.org/drawingml/2006/main" xmlns="" val="3604452974"/>
+        <p14:creationId xmlns:p14="http://schemas.microsoft.com/office/powerpoint/2010/main" val="3604452974"/>
       </p:ext>
     </p:extLst>
   </p:cSld>
@@ -6658,8 +6799,8 @@
 </p:sld>
 </file>
 
-<file path=ppt/slides/slide16.xml><?xml version="1.0" encoding="utf-8"?>
-<p:sld xmlns:a="http://schemas.openxmlformats.org/drawingml/2006/main" xmlns:r="http://schemas.openxmlformats.org/officeDocument/2006/relationships" xmlns:mc="http://schemas.openxmlformats.org/markup-compatibility/2006" xmlns:mv="urn:schemas-microsoft-com:mac:vml" xmlns:p="http://schemas.openxmlformats.org/presentationml/2006/main" mc:Ignorable="mv" mc:PreserveAttributes="mv:*">
+<file path=ppt/slides/slide17.xml><?xml version="1.0" encoding="utf-8"?>
+<p:sld xmlns:a="http://schemas.openxmlformats.org/drawingml/2006/main" xmlns:r="http://schemas.openxmlformats.org/officeDocument/2006/relationships" xmlns:p="http://schemas.openxmlformats.org/presentationml/2006/main">
   <p:cSld>
     <p:spTree>
       <p:nvGrpSpPr>
@@ -7020,7 +7161,7 @@
     </p:spTree>
     <p:extLst>
       <p:ext uri="{BB962C8B-B14F-4D97-AF65-F5344CB8AC3E}">
-        <p14:creationId xmlns:p14="http://schemas.microsoft.com/office/powerpoint/2010/main" xmlns:p="http://schemas.openxmlformats.org/presentationml/2006/main" xmlns:r="http://schemas.openxmlformats.org/officeDocument/2006/relationships" xmlns:a="http://schemas.openxmlformats.org/drawingml/2006/main" xmlns="" val="249318202"/>
+        <p14:creationId xmlns:p14="http://schemas.microsoft.com/office/powerpoint/2010/main" val="249318202"/>
       </p:ext>
     </p:extLst>
   </p:cSld>
@@ -7037,8 +7178,8 @@
 </p:sld>
 </file>
 
-<file path=ppt/slides/slide17.xml><?xml version="1.0" encoding="utf-8"?>
-<p:sld xmlns:a="http://schemas.openxmlformats.org/drawingml/2006/main" xmlns:r="http://schemas.openxmlformats.org/officeDocument/2006/relationships" xmlns:mc="http://schemas.openxmlformats.org/markup-compatibility/2006" xmlns:mv="urn:schemas-microsoft-com:mac:vml" xmlns:p="http://schemas.openxmlformats.org/presentationml/2006/main" mc:Ignorable="mv" mc:PreserveAttributes="mv:*">
+<file path=ppt/slides/slide18.xml><?xml version="1.0" encoding="utf-8"?>
+<p:sld xmlns:a="http://schemas.openxmlformats.org/drawingml/2006/main" xmlns:r="http://schemas.openxmlformats.org/officeDocument/2006/relationships" xmlns:p="http://schemas.openxmlformats.org/presentationml/2006/main">
   <p:cSld>
     <p:spTree>
       <p:nvGrpSpPr>
@@ -7472,7 +7613,7 @@
     </p:spTree>
     <p:extLst>
       <p:ext uri="{BB962C8B-B14F-4D97-AF65-F5344CB8AC3E}">
-        <p14:creationId xmlns:p14="http://schemas.microsoft.com/office/powerpoint/2010/main" xmlns:p="http://schemas.openxmlformats.org/presentationml/2006/main" xmlns:r="http://schemas.openxmlformats.org/officeDocument/2006/relationships" xmlns:a="http://schemas.openxmlformats.org/drawingml/2006/main" xmlns="" val="2506735757"/>
+        <p14:creationId xmlns:p14="http://schemas.microsoft.com/office/powerpoint/2010/main" val="2506735757"/>
       </p:ext>
     </p:extLst>
   </p:cSld>
@@ -7489,8 +7630,8 @@
 </p:sld>
 </file>
 
-<file path=ppt/slides/slide18.xml><?xml version="1.0" encoding="utf-8"?>
-<p:sld xmlns:a="http://schemas.openxmlformats.org/drawingml/2006/main" xmlns:r="http://schemas.openxmlformats.org/officeDocument/2006/relationships" xmlns:mc="http://schemas.openxmlformats.org/markup-compatibility/2006" xmlns:mv="urn:schemas-microsoft-com:mac:vml" xmlns:p="http://schemas.openxmlformats.org/presentationml/2006/main" mc:Ignorable="mv" mc:PreserveAttributes="mv:*">
+<file path=ppt/slides/slide19.xml><?xml version="1.0" encoding="utf-8"?>
+<p:sld xmlns:a="http://schemas.openxmlformats.org/drawingml/2006/main" xmlns:r="http://schemas.openxmlformats.org/officeDocument/2006/relationships" xmlns:p="http://schemas.openxmlformats.org/presentationml/2006/main">
   <p:cSld>
     <p:spTree>
       <p:nvGrpSpPr>
@@ -7979,7 +8120,7 @@
     </p:spTree>
     <p:extLst>
       <p:ext uri="{BB962C8B-B14F-4D97-AF65-F5344CB8AC3E}">
-        <p14:creationId xmlns:p14="http://schemas.microsoft.com/office/powerpoint/2010/main" xmlns:p="http://schemas.openxmlformats.org/presentationml/2006/main" xmlns:r="http://schemas.openxmlformats.org/officeDocument/2006/relationships" xmlns:a="http://schemas.openxmlformats.org/drawingml/2006/main" xmlns="" val="3921534399"/>
+        <p14:creationId xmlns:p14="http://schemas.microsoft.com/office/powerpoint/2010/main" val="3921534399"/>
       </p:ext>
     </p:extLst>
   </p:cSld>
@@ -7989,8 +8130,109 @@
 </p:sld>
 </file>
 
-<file path=ppt/slides/slide19.xml><?xml version="1.0" encoding="utf-8"?>
-<p:sld xmlns:a="http://schemas.openxmlformats.org/drawingml/2006/main" xmlns:r="http://schemas.openxmlformats.org/officeDocument/2006/relationships" xmlns:mc="http://schemas.openxmlformats.org/markup-compatibility/2006" xmlns:mv="urn:schemas-microsoft-com:mac:vml" xmlns:p="http://schemas.openxmlformats.org/presentationml/2006/main" mc:Ignorable="mv" mc:PreserveAttributes="mv:*">
+<file path=ppt/slides/slide2.xml><?xml version="1.0" encoding="utf-8"?>
+<p:sld xmlns:a="http://schemas.openxmlformats.org/drawingml/2006/main" xmlns:r="http://schemas.openxmlformats.org/officeDocument/2006/relationships" xmlns:p="http://schemas.openxmlformats.org/presentationml/2006/main">
+  <p:cSld>
+    <p:spTree>
+      <p:nvGrpSpPr>
+        <p:cNvPr id="1" name=""/>
+        <p:cNvGrpSpPr/>
+        <p:nvPr/>
+      </p:nvGrpSpPr>
+      <p:grpSpPr>
+        <a:xfrm>
+          <a:off x="0" y="0"/>
+          <a:ext cx="0" cy="0"/>
+          <a:chOff x="0" y="0"/>
+          <a:chExt cx="0" cy="0"/>
+        </a:xfrm>
+      </p:grpSpPr>
+      <p:sp>
+        <p:nvSpPr>
+          <p:cNvPr id="2" name="Title 1"/>
+          <p:cNvSpPr>
+            <a:spLocks noGrp="1"/>
+          </p:cNvSpPr>
+          <p:nvPr>
+            <p:ph type="title"/>
+          </p:nvPr>
+        </p:nvSpPr>
+        <p:spPr/>
+        <p:txBody>
+          <a:bodyPr/>
+          <a:lstStyle/>
+          <a:p>
+            <a:r>
+              <a:rPr lang="en-US" dirty="0" smtClean="0"/>
+              <a:t>Outline</a:t>
+            </a:r>
+            <a:endParaRPr lang="en-US" dirty="0"/>
+          </a:p>
+        </p:txBody>
+      </p:sp>
+      <p:sp>
+        <p:nvSpPr>
+          <p:cNvPr id="3" name="Content Placeholder 2"/>
+          <p:cNvSpPr>
+            <a:spLocks noGrp="1"/>
+          </p:cNvSpPr>
+          <p:nvPr>
+            <p:ph idx="1"/>
+          </p:nvPr>
+        </p:nvSpPr>
+        <p:spPr>
+          <a:xfrm>
+            <a:off x="1107129" y="2068618"/>
+            <a:ext cx="7617771" cy="4197711"/>
+          </a:xfrm>
+        </p:spPr>
+        <p:txBody>
+          <a:bodyPr/>
+          <a:lstStyle/>
+          <a:p>
+            <a:r>
+              <a:rPr lang="en-US" dirty="0" smtClean="0"/>
+              <a:t>API structure and scope</a:t>
+            </a:r>
+          </a:p>
+          <a:p>
+            <a:r>
+              <a:rPr lang="en-US" dirty="0" smtClean="0"/>
+              <a:t>API walkthrough</a:t>
+            </a:r>
+          </a:p>
+          <a:p>
+            <a:r>
+              <a:rPr lang="en-US" dirty="0" smtClean="0"/>
+              <a:t>implementation details</a:t>
+            </a:r>
+          </a:p>
+          <a:p>
+            <a:r>
+              <a:rPr lang="en-US" dirty="0" smtClean="0"/>
+              <a:t>API extensions</a:t>
+            </a:r>
+            <a:endParaRPr lang="en-US" dirty="0"/>
+          </a:p>
+        </p:txBody>
+      </p:sp>
+    </p:spTree>
+  </p:cSld>
+  <p:clrMapOvr>
+    <a:masterClrMapping/>
+  </p:clrMapOvr>
+  <p:timing>
+    <p:tnLst>
+      <p:par>
+        <p:cTn id="1" dur="indefinite" restart="never" nodeType="tmRoot"/>
+      </p:par>
+    </p:tnLst>
+  </p:timing>
+</p:sld>
+</file>
+
+<file path=ppt/slides/slide20.xml><?xml version="1.0" encoding="utf-8"?>
+<p:sld xmlns:a="http://schemas.openxmlformats.org/drawingml/2006/main" xmlns:r="http://schemas.openxmlformats.org/officeDocument/2006/relationships" xmlns:p="http://schemas.openxmlformats.org/presentationml/2006/main">
   <p:cSld>
     <p:bg>
       <p:bgRef idx="1001">
@@ -8189,7 +8431,7 @@
     </p:spTree>
     <p:extLst>
       <p:ext uri="{BB962C8B-B14F-4D97-AF65-F5344CB8AC3E}">
-        <p14:creationId xmlns:p14="http://schemas.microsoft.com/office/powerpoint/2010/main" xmlns:p="http://schemas.openxmlformats.org/presentationml/2006/main" xmlns:r="http://schemas.openxmlformats.org/officeDocument/2006/relationships" xmlns:a="http://schemas.openxmlformats.org/drawingml/2006/main" xmlns="" val="1279084256"/>
+        <p14:creationId xmlns:p14="http://schemas.microsoft.com/office/powerpoint/2010/main" val="1279084256"/>
       </p:ext>
     </p:extLst>
   </p:cSld>
@@ -8199,109 +8441,8 @@
 </p:sld>
 </file>
 
-<file path=ppt/slides/slide2.xml><?xml version="1.0" encoding="utf-8"?>
-<p:sld xmlns:a="http://schemas.openxmlformats.org/drawingml/2006/main" xmlns:r="http://schemas.openxmlformats.org/officeDocument/2006/relationships" xmlns:mc="http://schemas.openxmlformats.org/markup-compatibility/2006" xmlns:mv="urn:schemas-microsoft-com:mac:vml" xmlns:p="http://schemas.openxmlformats.org/presentationml/2006/main" mc:Ignorable="mv" mc:PreserveAttributes="mv:*">
-  <p:cSld>
-    <p:spTree>
-      <p:nvGrpSpPr>
-        <p:cNvPr id="1" name=""/>
-        <p:cNvGrpSpPr/>
-        <p:nvPr/>
-      </p:nvGrpSpPr>
-      <p:grpSpPr>
-        <a:xfrm>
-          <a:off x="0" y="0"/>
-          <a:ext cx="0" cy="0"/>
-          <a:chOff x="0" y="0"/>
-          <a:chExt cx="0" cy="0"/>
-        </a:xfrm>
-      </p:grpSpPr>
-      <p:sp>
-        <p:nvSpPr>
-          <p:cNvPr id="2" name="Title 1"/>
-          <p:cNvSpPr>
-            <a:spLocks noGrp="1"/>
-          </p:cNvSpPr>
-          <p:nvPr>
-            <p:ph type="title"/>
-          </p:nvPr>
-        </p:nvSpPr>
-        <p:spPr/>
-        <p:txBody>
-          <a:bodyPr/>
-          <a:lstStyle/>
-          <a:p>
-            <a:r>
-              <a:rPr lang="en-US" dirty="0" smtClean="0"/>
-              <a:t>Outline</a:t>
-            </a:r>
-            <a:endParaRPr lang="en-US" dirty="0"/>
-          </a:p>
-        </p:txBody>
-      </p:sp>
-      <p:sp>
-        <p:nvSpPr>
-          <p:cNvPr id="3" name="Content Placeholder 2"/>
-          <p:cNvSpPr>
-            <a:spLocks noGrp="1"/>
-          </p:cNvSpPr>
-          <p:nvPr>
-            <p:ph idx="1"/>
-          </p:nvPr>
-        </p:nvSpPr>
-        <p:spPr>
-          <a:xfrm>
-            <a:off x="1107129" y="2068618"/>
-            <a:ext cx="7617771" cy="4197711"/>
-          </a:xfrm>
-        </p:spPr>
-        <p:txBody>
-          <a:bodyPr/>
-          <a:lstStyle/>
-          <a:p>
-            <a:r>
-              <a:rPr lang="en-US" dirty="0" smtClean="0"/>
-              <a:t>API structure and scope</a:t>
-            </a:r>
-          </a:p>
-          <a:p>
-            <a:r>
-              <a:rPr lang="en-US" dirty="0" smtClean="0"/>
-              <a:t>API walkthrough</a:t>
-            </a:r>
-          </a:p>
-          <a:p>
-            <a:r>
-              <a:rPr lang="en-US" dirty="0" smtClean="0"/>
-              <a:t>implementation details</a:t>
-            </a:r>
-          </a:p>
-          <a:p>
-            <a:r>
-              <a:rPr lang="en-US" dirty="0" smtClean="0"/>
-              <a:t>API extensions</a:t>
-            </a:r>
-            <a:endParaRPr lang="en-US" dirty="0"/>
-          </a:p>
-        </p:txBody>
-      </p:sp>
-    </p:spTree>
-  </p:cSld>
-  <p:clrMapOvr>
-    <a:masterClrMapping/>
-  </p:clrMapOvr>
-  <p:timing>
-    <p:tnLst>
-      <p:par>
-        <p:cTn id="1" dur="indefinite" restart="never" nodeType="tmRoot"/>
-      </p:par>
-    </p:tnLst>
-  </p:timing>
-</p:sld>
-</file>
-
-<file path=ppt/slides/slide20.xml><?xml version="1.0" encoding="utf-8"?>
-<p:sld xmlns:a="http://schemas.openxmlformats.org/drawingml/2006/main" xmlns:r="http://schemas.openxmlformats.org/officeDocument/2006/relationships" xmlns:mc="http://schemas.openxmlformats.org/markup-compatibility/2006" xmlns:mv="urn:schemas-microsoft-com:mac:vml" xmlns:p="http://schemas.openxmlformats.org/presentationml/2006/main" mc:Ignorable="mv" mc:PreserveAttributes="mv:*">
+<file path=ppt/slides/slide21.xml><?xml version="1.0" encoding="utf-8"?>
+<p:sld xmlns:a="http://schemas.openxmlformats.org/drawingml/2006/main" xmlns:r="http://schemas.openxmlformats.org/officeDocument/2006/relationships" xmlns:p="http://schemas.openxmlformats.org/presentationml/2006/main">
   <p:cSld>
     <p:spTree>
       <p:nvGrpSpPr>
@@ -8702,7 +8843,7 @@
     </p:spTree>
     <p:extLst>
       <p:ext uri="{BB962C8B-B14F-4D97-AF65-F5344CB8AC3E}">
-        <p14:creationId xmlns:p14="http://schemas.microsoft.com/office/powerpoint/2010/main" xmlns:p="http://schemas.openxmlformats.org/presentationml/2006/main" xmlns:r="http://schemas.openxmlformats.org/officeDocument/2006/relationships" xmlns:a="http://schemas.openxmlformats.org/drawingml/2006/main" xmlns="" val="393658979"/>
+        <p14:creationId xmlns:p14="http://schemas.microsoft.com/office/powerpoint/2010/main" val="393658979"/>
       </p:ext>
     </p:extLst>
   </p:cSld>
@@ -8712,8 +8853,8 @@
 </p:sld>
 </file>
 
-<file path=ppt/slides/slide21.xml><?xml version="1.0" encoding="utf-8"?>
-<p:sld xmlns:a="http://schemas.openxmlformats.org/drawingml/2006/main" xmlns:r="http://schemas.openxmlformats.org/officeDocument/2006/relationships" xmlns:mc="http://schemas.openxmlformats.org/markup-compatibility/2006" xmlns:mv="urn:schemas-microsoft-com:mac:vml" xmlns:p="http://schemas.openxmlformats.org/presentationml/2006/main" mc:Ignorable="mv" mc:PreserveAttributes="mv:*">
+<file path=ppt/slides/slide22.xml><?xml version="1.0" encoding="utf-8"?>
+<p:sld xmlns:a="http://schemas.openxmlformats.org/drawingml/2006/main" xmlns:r="http://schemas.openxmlformats.org/officeDocument/2006/relationships" xmlns:p="http://schemas.openxmlformats.org/presentationml/2006/main">
   <p:cSld>
     <p:spTree>
       <p:nvGrpSpPr>
@@ -8857,7 +8998,7 @@
     </p:spTree>
     <p:extLst>
       <p:ext uri="{BB962C8B-B14F-4D97-AF65-F5344CB8AC3E}">
-        <p14:creationId xmlns:p14="http://schemas.microsoft.com/office/powerpoint/2010/main" xmlns:p="http://schemas.openxmlformats.org/presentationml/2006/main" xmlns:r="http://schemas.openxmlformats.org/officeDocument/2006/relationships" xmlns:a="http://schemas.openxmlformats.org/drawingml/2006/main" xmlns="" val="2936737826"/>
+        <p14:creationId xmlns:p14="http://schemas.microsoft.com/office/powerpoint/2010/main" val="2936737826"/>
       </p:ext>
     </p:extLst>
   </p:cSld>
@@ -8867,8 +9008,8 @@
 </p:sld>
 </file>
 
-<file path=ppt/slides/slide22.xml><?xml version="1.0" encoding="utf-8"?>
-<p:sld xmlns:a="http://schemas.openxmlformats.org/drawingml/2006/main" xmlns:r="http://schemas.openxmlformats.org/officeDocument/2006/relationships" xmlns:mc="http://schemas.openxmlformats.org/markup-compatibility/2006" xmlns:mv="urn:schemas-microsoft-com:mac:vml" xmlns:p="http://schemas.openxmlformats.org/presentationml/2006/main" mc:Ignorable="mv" mc:PreserveAttributes="mv:*">
+<file path=ppt/slides/slide23.xml><?xml version="1.0" encoding="utf-8"?>
+<p:sld xmlns:a="http://schemas.openxmlformats.org/drawingml/2006/main" xmlns:r="http://schemas.openxmlformats.org/officeDocument/2006/relationships" xmlns:p="http://schemas.openxmlformats.org/presentationml/2006/main">
   <p:cSld>
     <p:spTree>
       <p:nvGrpSpPr>
@@ -9001,7 +9142,11 @@
             </a:r>
             <a:r>
               <a:rPr lang="en-US" dirty="0" smtClean="0"/>
-              <a:t>assumed to be opaque </a:t>
+              <a:t>assumed to be </a:t>
+            </a:r>
+            <a:r>
+              <a:rPr lang="en-US" dirty="0" smtClean="0"/>
+              <a:t>opaque </a:t>
             </a:r>
             <a:r>
               <a:rPr lang="en-US" dirty="0"/>
@@ -9018,7 +9163,7 @@
     </p:spTree>
     <p:extLst>
       <p:ext uri="{BB962C8B-B14F-4D97-AF65-F5344CB8AC3E}">
-        <p14:creationId xmlns:p14="http://schemas.microsoft.com/office/powerpoint/2010/main" xmlns:p="http://schemas.openxmlformats.org/presentationml/2006/main" xmlns:r="http://schemas.openxmlformats.org/officeDocument/2006/relationships" xmlns:a="http://schemas.openxmlformats.org/drawingml/2006/main" xmlns="" val="3657352639"/>
+        <p14:creationId xmlns:p14="http://schemas.microsoft.com/office/powerpoint/2010/main" val="3657352639"/>
       </p:ext>
     </p:extLst>
   </p:cSld>
@@ -9028,8 +9173,8 @@
 </p:sld>
 </file>
 
-<file path=ppt/slides/slide23.xml><?xml version="1.0" encoding="utf-8"?>
-<p:sld xmlns:a="http://schemas.openxmlformats.org/drawingml/2006/main" xmlns:r="http://schemas.openxmlformats.org/officeDocument/2006/relationships" xmlns:mc="http://schemas.openxmlformats.org/markup-compatibility/2006" xmlns:mv="urn:schemas-microsoft-com:mac:vml" xmlns:p="http://schemas.openxmlformats.org/presentationml/2006/main" mc:Ignorable="mv" mc:PreserveAttributes="mv:*">
+<file path=ppt/slides/slide24.xml><?xml version="1.0" encoding="utf-8"?>
+<p:sld xmlns:a="http://schemas.openxmlformats.org/drawingml/2006/main" xmlns:r="http://schemas.openxmlformats.org/officeDocument/2006/relationships" xmlns:p="http://schemas.openxmlformats.org/presentationml/2006/main">
   <p:cSld>
     <p:spTree>
       <p:nvGrpSpPr>
@@ -9636,7 +9781,7 @@
     </p:spTree>
     <p:extLst>
       <p:ext uri="{BB962C8B-B14F-4D97-AF65-F5344CB8AC3E}">
-        <p14:creationId xmlns:p14="http://schemas.microsoft.com/office/powerpoint/2010/main" xmlns:p="http://schemas.openxmlformats.org/presentationml/2006/main" xmlns:r="http://schemas.openxmlformats.org/officeDocument/2006/relationships" xmlns:a="http://schemas.openxmlformats.org/drawingml/2006/main" xmlns="" val="1668556561"/>
+        <p14:creationId xmlns:p14="http://schemas.microsoft.com/office/powerpoint/2010/main" val="1668556561"/>
       </p:ext>
     </p:extLst>
   </p:cSld>
@@ -9646,8 +9791,8 @@
 </p:sld>
 </file>
 
-<file path=ppt/slides/slide24.xml><?xml version="1.0" encoding="utf-8"?>
-<p:sld xmlns:a="http://schemas.openxmlformats.org/drawingml/2006/main" xmlns:r="http://schemas.openxmlformats.org/officeDocument/2006/relationships" xmlns:mc="http://schemas.openxmlformats.org/markup-compatibility/2006" xmlns:mv="urn:schemas-microsoft-com:mac:vml" xmlns:p="http://schemas.openxmlformats.org/presentationml/2006/main" mc:Ignorable="mv" mc:PreserveAttributes="mv:*">
+<file path=ppt/slides/slide25.xml><?xml version="1.0" encoding="utf-8"?>
+<p:sld xmlns:a="http://schemas.openxmlformats.org/drawingml/2006/main" xmlns:r="http://schemas.openxmlformats.org/officeDocument/2006/relationships" xmlns:p="http://schemas.openxmlformats.org/presentationml/2006/main">
   <p:cSld>
     <p:spTree>
       <p:nvGrpSpPr>
@@ -9931,7 +10076,7 @@
     </p:spTree>
     <p:extLst>
       <p:ext uri="{BB962C8B-B14F-4D97-AF65-F5344CB8AC3E}">
-        <p14:creationId xmlns:p14="http://schemas.microsoft.com/office/powerpoint/2010/main" xmlns:p="http://schemas.openxmlformats.org/presentationml/2006/main" xmlns:r="http://schemas.openxmlformats.org/officeDocument/2006/relationships" xmlns:a="http://schemas.openxmlformats.org/drawingml/2006/main" xmlns="" val="3427845436"/>
+        <p14:creationId xmlns:p14="http://schemas.microsoft.com/office/powerpoint/2010/main" val="3427845436"/>
       </p:ext>
     </p:extLst>
   </p:cSld>
@@ -9941,8 +10086,8 @@
 </p:sld>
 </file>
 
-<file path=ppt/slides/slide25.xml><?xml version="1.0" encoding="utf-8"?>
-<p:sld xmlns:a="http://schemas.openxmlformats.org/drawingml/2006/main" xmlns:r="http://schemas.openxmlformats.org/officeDocument/2006/relationships" xmlns:mc="http://schemas.openxmlformats.org/markup-compatibility/2006" xmlns:mv="urn:schemas-microsoft-com:mac:vml" xmlns:p="http://schemas.openxmlformats.org/presentationml/2006/main" mc:Ignorable="mv" mc:PreserveAttributes="mv:*">
+<file path=ppt/slides/slide26.xml><?xml version="1.0" encoding="utf-8"?>
+<p:sld xmlns:a="http://schemas.openxmlformats.org/drawingml/2006/main" xmlns:r="http://schemas.openxmlformats.org/officeDocument/2006/relationships" xmlns:p="http://schemas.openxmlformats.org/presentationml/2006/main">
   <p:cSld>
     <p:spTree>
       <p:nvGrpSpPr>
@@ -10127,7 +10272,7 @@
     </p:spTree>
     <p:extLst>
       <p:ext uri="{BB962C8B-B14F-4D97-AF65-F5344CB8AC3E}">
-        <p14:creationId xmlns:p14="http://schemas.microsoft.com/office/powerpoint/2010/main" xmlns:p="http://schemas.openxmlformats.org/presentationml/2006/main" xmlns:r="http://schemas.openxmlformats.org/officeDocument/2006/relationships" xmlns:a="http://schemas.openxmlformats.org/drawingml/2006/main" xmlns="" val="3493384740"/>
+        <p14:creationId xmlns:p14="http://schemas.microsoft.com/office/powerpoint/2010/main" val="3493384740"/>
       </p:ext>
     </p:extLst>
   </p:cSld>
@@ -10137,8 +10282,8 @@
 </p:sld>
 </file>
 
-<file path=ppt/slides/slide26.xml><?xml version="1.0" encoding="utf-8"?>
-<p:sld xmlns:a="http://schemas.openxmlformats.org/drawingml/2006/main" xmlns:r="http://schemas.openxmlformats.org/officeDocument/2006/relationships" xmlns:mc="http://schemas.openxmlformats.org/markup-compatibility/2006" xmlns:mv="urn:schemas-microsoft-com:mac:vml" xmlns:p="http://schemas.openxmlformats.org/presentationml/2006/main" mc:Ignorable="mv" mc:PreserveAttributes="mv:*">
+<file path=ppt/slides/slide27.xml><?xml version="1.0" encoding="utf-8"?>
+<p:sld xmlns:a="http://schemas.openxmlformats.org/drawingml/2006/main" xmlns:r="http://schemas.openxmlformats.org/officeDocument/2006/relationships" xmlns:p="http://schemas.openxmlformats.org/presentationml/2006/main">
   <p:cSld>
     <p:spTree>
       <p:nvGrpSpPr>
@@ -10757,7 +10902,7 @@
     </p:spTree>
     <p:extLst>
       <p:ext uri="{BB962C8B-B14F-4D97-AF65-F5344CB8AC3E}">
-        <p14:creationId xmlns:p14="http://schemas.microsoft.com/office/powerpoint/2010/main" xmlns:p="http://schemas.openxmlformats.org/presentationml/2006/main" xmlns:r="http://schemas.openxmlformats.org/officeDocument/2006/relationships" xmlns:a="http://schemas.openxmlformats.org/drawingml/2006/main" xmlns="" val="3124065083"/>
+        <p14:creationId xmlns:p14="http://schemas.microsoft.com/office/powerpoint/2010/main" val="3124065083"/>
       </p:ext>
     </p:extLst>
   </p:cSld>
@@ -10767,8 +10912,8 @@
 </p:sld>
 </file>
 
-<file path=ppt/slides/slide27.xml><?xml version="1.0" encoding="utf-8"?>
-<p:sld xmlns:a="http://schemas.openxmlformats.org/drawingml/2006/main" xmlns:r="http://schemas.openxmlformats.org/officeDocument/2006/relationships" xmlns:mc="http://schemas.openxmlformats.org/markup-compatibility/2006" xmlns:mv="urn:schemas-microsoft-com:mac:vml" xmlns:p="http://schemas.openxmlformats.org/presentationml/2006/main" mc:Ignorable="mv" mc:PreserveAttributes="mv:*">
+<file path=ppt/slides/slide28.xml><?xml version="1.0" encoding="utf-8"?>
+<p:sld xmlns:a="http://schemas.openxmlformats.org/drawingml/2006/main" xmlns:r="http://schemas.openxmlformats.org/officeDocument/2006/relationships" xmlns:p="http://schemas.openxmlformats.org/presentationml/2006/main">
   <p:cSld>
     <p:spTree>
       <p:nvGrpSpPr>
@@ -10929,7 +11074,7 @@
     </p:spTree>
     <p:extLst>
       <p:ext uri="{BB962C8B-B14F-4D97-AF65-F5344CB8AC3E}">
-        <p14:creationId xmlns:p14="http://schemas.microsoft.com/office/powerpoint/2010/main" xmlns:p="http://schemas.openxmlformats.org/presentationml/2006/main" xmlns:r="http://schemas.openxmlformats.org/officeDocument/2006/relationships" xmlns:a="http://schemas.openxmlformats.org/drawingml/2006/main" xmlns="" val="3394878304"/>
+        <p14:creationId xmlns:p14="http://schemas.microsoft.com/office/powerpoint/2010/main" val="3394878304"/>
       </p:ext>
     </p:extLst>
   </p:cSld>
@@ -10939,8 +11084,8 @@
 </p:sld>
 </file>
 
-<file path=ppt/slides/slide28.xml><?xml version="1.0" encoding="utf-8"?>
-<p:sld xmlns:a="http://schemas.openxmlformats.org/drawingml/2006/main" xmlns:r="http://schemas.openxmlformats.org/officeDocument/2006/relationships" xmlns:mc="http://schemas.openxmlformats.org/markup-compatibility/2006" xmlns:mv="urn:schemas-microsoft-com:mac:vml" xmlns:p="http://schemas.openxmlformats.org/presentationml/2006/main" mc:Ignorable="mv" mc:PreserveAttributes="mv:*">
+<file path=ppt/slides/slide29.xml><?xml version="1.0" encoding="utf-8"?>
+<p:sld xmlns:a="http://schemas.openxmlformats.org/drawingml/2006/main" xmlns:r="http://schemas.openxmlformats.org/officeDocument/2006/relationships" xmlns:p="http://schemas.openxmlformats.org/presentationml/2006/main">
   <p:cSld>
     <p:spTree>
       <p:nvGrpSpPr>
@@ -11373,7 +11518,7 @@
     </p:spTree>
     <p:extLst>
       <p:ext uri="{BB962C8B-B14F-4D97-AF65-F5344CB8AC3E}">
-        <p14:creationId xmlns:p14="http://schemas.microsoft.com/office/powerpoint/2010/main" xmlns:p="http://schemas.openxmlformats.org/presentationml/2006/main" xmlns:r="http://schemas.openxmlformats.org/officeDocument/2006/relationships" xmlns:a="http://schemas.openxmlformats.org/drawingml/2006/main" xmlns="" val="3419220388"/>
+        <p14:creationId xmlns:p14="http://schemas.microsoft.com/office/powerpoint/2010/main" val="3419220388"/>
       </p:ext>
     </p:extLst>
   </p:cSld>
@@ -11383,8 +11528,8 @@
 </p:sld>
 </file>
 
-<file path=ppt/slides/slide29.xml><?xml version="1.0" encoding="utf-8"?>
-<p:sld xmlns:a="http://schemas.openxmlformats.org/drawingml/2006/main" xmlns:r="http://schemas.openxmlformats.org/officeDocument/2006/relationships" xmlns:mc="http://schemas.openxmlformats.org/markup-compatibility/2006" xmlns:mv="urn:schemas-microsoft-com:mac:vml" xmlns:p="http://schemas.openxmlformats.org/presentationml/2006/main" mc:Ignorable="mv" mc:PreserveAttributes="mv:*">
+<file path=ppt/slides/slide3.xml><?xml version="1.0" encoding="utf-8"?>
+<p:sld xmlns:a="http://schemas.openxmlformats.org/drawingml/2006/main" xmlns:r="http://schemas.openxmlformats.org/officeDocument/2006/relationships" xmlns:p="http://schemas.openxmlformats.org/presentationml/2006/main">
   <p:cSld>
     <p:spTree>
       <p:nvGrpSpPr>
@@ -11416,12 +11561,8 @@
           <a:lstStyle/>
           <a:p>
             <a:r>
-              <a:rPr lang="en-US" dirty="0"/>
-              <a:t>SAGA </a:t>
-            </a:r>
-            <a:r>
               <a:rPr lang="en-US" dirty="0" smtClean="0"/>
-              <a:t>Advert Package</a:t>
+              <a:t>SAGA Design Principles</a:t>
             </a:r>
             <a:endParaRPr lang="en-US" dirty="0"/>
           </a:p>
@@ -11439,68 +11580,105 @@
         </p:nvSpPr>
         <p:spPr>
           <a:xfrm>
-            <a:off x="575067" y="2068619"/>
-            <a:ext cx="8155866" cy="3127850"/>
+            <a:off x="757947" y="2004892"/>
+            <a:ext cx="7966954" cy="4448688"/>
           </a:xfrm>
         </p:spPr>
         <p:txBody>
-          <a:bodyPr numCol="1">
-            <a:noAutofit/>
+          <a:bodyPr>
+            <a:normAutofit fontScale="85000" lnSpcReduction="20000"/>
           </a:bodyPr>
           <a:lstStyle/>
           <a:p>
             <a:r>
               <a:rPr lang="en-US" dirty="0" smtClean="0"/>
-              <a:t>persistent </a:t>
-            </a:r>
-            <a:r>
-              <a:rPr lang="en-US" dirty="0"/>
-              <a:t>storage of application level information</a:t>
-            </a:r>
-          </a:p>
-          <a:p>
+              <a:t>SAGA: Simple API for Grid Applications </a:t>
+            </a:r>
+          </a:p>
+          <a:p>
+            <a:pPr lvl="1"/>
             <a:r>
               <a:rPr lang="en-US" dirty="0" smtClean="0"/>
-              <a:t>semantics </a:t>
-            </a:r>
-            <a:r>
-              <a:rPr lang="en-US" dirty="0"/>
-              <a:t>of information defined by application</a:t>
+              <a:t>OGF approach to a uniform API layer (facade) </a:t>
             </a:r>
           </a:p>
           <a:p>
             <a:r>
               <a:rPr lang="en-US" dirty="0" smtClean="0"/>
-              <a:t>allows </a:t>
-            </a:r>
-            <a:r>
-              <a:rPr lang="en-US" dirty="0"/>
-              <a:t>storage of serialized SAGA objects (</a:t>
-            </a:r>
+              <a:t>governing principle: 80:20 rule </a:t>
+            </a:r>
+          </a:p>
+          <a:p>
+            <a:pPr lvl="1"/>
             <a:r>
               <a:rPr lang="en-US" dirty="0" smtClean="0"/>
-              <a:t>object persistency)</a:t>
-            </a:r>
-          </a:p>
-          <a:p>
-            <a:r>
-              <a:rPr lang="en-US" b="1" i="1" dirty="0"/>
-              <a:t>v</a:t>
-            </a:r>
-            <a:r>
-              <a:rPr lang="en-US" b="1" i="1" dirty="0" smtClean="0"/>
-              <a:t>ery useful for bootstrapping and coordinating distributed application components</a:t>
-            </a:r>
-            <a:endParaRPr lang="en-US" b="1" i="1" dirty="0"/>
+              <a:t>simplicity versus control! </a:t>
+            </a:r>
+          </a:p>
+          <a:p>
+            <a:r>
+              <a:rPr lang="en-US" dirty="0" smtClean="0"/>
+              <a:t>top-down approach</a:t>
+            </a:r>
+          </a:p>
+          <a:p>
+            <a:pPr lvl="1"/>
+            <a:r>
+              <a:rPr lang="en-US" dirty="0" smtClean="0"/>
+              <a:t>use case driven! </a:t>
+            </a:r>
+          </a:p>
+          <a:p>
+            <a:pPr lvl="1"/>
+            <a:r>
+              <a:rPr lang="en-US" dirty="0" smtClean="0"/>
+              <a:t>defines application level abstractions </a:t>
+            </a:r>
+          </a:p>
+          <a:p>
+            <a:r>
+              <a:rPr lang="en-US" dirty="0" smtClean="0"/>
+              <a:t>extensible</a:t>
+            </a:r>
+          </a:p>
+          <a:p>
+            <a:pPr lvl="1"/>
+            <a:r>
+              <a:rPr lang="en-US" dirty="0" smtClean="0"/>
+              <a:t>stable look &amp; feel </a:t>
+            </a:r>
+          </a:p>
+          <a:p>
+            <a:pPr lvl="1"/>
+            <a:r>
+              <a:rPr lang="en-US" dirty="0" smtClean="0"/>
+              <a:t>API packages </a:t>
+            </a:r>
+          </a:p>
+          <a:p>
+            <a:r>
+              <a:rPr lang="en-US" dirty="0" smtClean="0"/>
+              <a:t>API Specification is language independent (IDL) </a:t>
+            </a:r>
+          </a:p>
+          <a:p>
+            <a:pPr lvl="1"/>
+            <a:r>
+              <a:rPr lang="en-US" dirty="0" smtClean="0"/>
+              <a:t>Renderings exist in C++, Python, Java </a:t>
+            </a:r>
+          </a:p>
+          <a:p>
+            <a:pPr lvl="1"/>
+            <a:r>
+              <a:rPr lang="en-US" dirty="0" smtClean="0"/>
+              <a:t>Examples here are in C++</a:t>
+            </a:r>
+            <a:endParaRPr lang="en-US" dirty="0"/>
           </a:p>
         </p:txBody>
       </p:sp>
     </p:spTree>
-    <p:extLst>
-      <p:ext uri="{BB962C8B-B14F-4D97-AF65-F5344CB8AC3E}">
-        <p14:creationId xmlns:p14="http://schemas.microsoft.com/office/powerpoint/2010/main" xmlns:p="http://schemas.openxmlformats.org/presentationml/2006/main" xmlns:r="http://schemas.openxmlformats.org/officeDocument/2006/relationships" xmlns:a="http://schemas.openxmlformats.org/drawingml/2006/main" xmlns="" val="1782586087"/>
-      </p:ext>
-    </p:extLst>
   </p:cSld>
   <p:clrMapOvr>
     <a:masterClrMapping/>
@@ -11508,8 +11686,8 @@
 </p:sld>
 </file>
 
-<file path=ppt/slides/slide3.xml><?xml version="1.0" encoding="utf-8"?>
-<p:sld xmlns:a="http://schemas.openxmlformats.org/drawingml/2006/main" xmlns:r="http://schemas.openxmlformats.org/officeDocument/2006/relationships" xmlns:mc="http://schemas.openxmlformats.org/markup-compatibility/2006" xmlns:mv="urn:schemas-microsoft-com:mac:vml" xmlns:p="http://schemas.openxmlformats.org/presentationml/2006/main" mc:Ignorable="mv" mc:PreserveAttributes="mv:*">
+<file path=ppt/slides/slide30.xml><?xml version="1.0" encoding="utf-8"?>
+<p:sld xmlns:a="http://schemas.openxmlformats.org/drawingml/2006/main" xmlns:r="http://schemas.openxmlformats.org/officeDocument/2006/relationships" xmlns:p="http://schemas.openxmlformats.org/presentationml/2006/main">
   <p:cSld>
     <p:spTree>
       <p:nvGrpSpPr>
@@ -11541,8 +11719,12 @@
           <a:lstStyle/>
           <a:p>
             <a:r>
+              <a:rPr lang="en-US" dirty="0"/>
+              <a:t>SAGA </a:t>
+            </a:r>
+            <a:r>
               <a:rPr lang="en-US" dirty="0" smtClean="0"/>
-              <a:t>SAGA Design Principles</a:t>
+              <a:t>Advert Package</a:t>
             </a:r>
             <a:endParaRPr lang="en-US" dirty="0"/>
           </a:p>
@@ -11560,105 +11742,68 @@
         </p:nvSpPr>
         <p:spPr>
           <a:xfrm>
-            <a:off x="757947" y="2004892"/>
-            <a:ext cx="7966954" cy="4448688"/>
+            <a:off x="575067" y="2068619"/>
+            <a:ext cx="8155866" cy="3127850"/>
           </a:xfrm>
         </p:spPr>
         <p:txBody>
-          <a:bodyPr>
-            <a:normAutofit fontScale="85000" lnSpcReduction="20000"/>
+          <a:bodyPr numCol="1">
+            <a:noAutofit/>
           </a:bodyPr>
           <a:lstStyle/>
           <a:p>
             <a:r>
               <a:rPr lang="en-US" dirty="0" smtClean="0"/>
-              <a:t>SAGA: Simple API for Grid Applications </a:t>
-            </a:r>
-          </a:p>
-          <a:p>
-            <a:pPr lvl="1"/>
+              <a:t>persistent </a:t>
+            </a:r>
+            <a:r>
+              <a:rPr lang="en-US" dirty="0"/>
+              <a:t>storage of application level information</a:t>
+            </a:r>
+          </a:p>
+          <a:p>
             <a:r>
               <a:rPr lang="en-US" dirty="0" smtClean="0"/>
-              <a:t>OGF approach to a uniform API layer (facade) </a:t>
+              <a:t>semantics </a:t>
+            </a:r>
+            <a:r>
+              <a:rPr lang="en-US" dirty="0"/>
+              <a:t>of information defined by application</a:t>
             </a:r>
           </a:p>
           <a:p>
             <a:r>
               <a:rPr lang="en-US" dirty="0" smtClean="0"/>
-              <a:t>governing principle: 80:20 rule </a:t>
-            </a:r>
-          </a:p>
-          <a:p>
-            <a:pPr lvl="1"/>
+              <a:t>allows </a:t>
+            </a:r>
+            <a:r>
+              <a:rPr lang="en-US" dirty="0"/>
+              <a:t>storage of serialized SAGA objects (</a:t>
+            </a:r>
             <a:r>
               <a:rPr lang="en-US" dirty="0" smtClean="0"/>
-              <a:t>simplicity versus control! </a:t>
-            </a:r>
-          </a:p>
-          <a:p>
-            <a:r>
-              <a:rPr lang="en-US" dirty="0" smtClean="0"/>
-              <a:t>top-down approach</a:t>
-            </a:r>
-          </a:p>
-          <a:p>
-            <a:pPr lvl="1"/>
-            <a:r>
-              <a:rPr lang="en-US" dirty="0" smtClean="0"/>
-              <a:t>use case driven! </a:t>
-            </a:r>
-          </a:p>
-          <a:p>
-            <a:pPr lvl="1"/>
-            <a:r>
-              <a:rPr lang="en-US" dirty="0" smtClean="0"/>
-              <a:t>defines application level abstractions </a:t>
-            </a:r>
-          </a:p>
-          <a:p>
-            <a:r>
-              <a:rPr lang="en-US" dirty="0" smtClean="0"/>
-              <a:t>extensible</a:t>
-            </a:r>
-          </a:p>
-          <a:p>
-            <a:pPr lvl="1"/>
-            <a:r>
-              <a:rPr lang="en-US" dirty="0" smtClean="0"/>
-              <a:t>stable look &amp; feel </a:t>
-            </a:r>
-          </a:p>
-          <a:p>
-            <a:pPr lvl="1"/>
-            <a:r>
-              <a:rPr lang="en-US" dirty="0" smtClean="0"/>
-              <a:t>API packages </a:t>
-            </a:r>
-          </a:p>
-          <a:p>
-            <a:r>
-              <a:rPr lang="en-US" dirty="0" smtClean="0"/>
-              <a:t>API Specification is language independent (IDL) </a:t>
-            </a:r>
-          </a:p>
-          <a:p>
-            <a:pPr lvl="1"/>
-            <a:r>
-              <a:rPr lang="en-US" dirty="0" smtClean="0"/>
-              <a:t>Renderings exist in C++, Python, Java </a:t>
-            </a:r>
-          </a:p>
-          <a:p>
-            <a:pPr lvl="1"/>
-            <a:r>
-              <a:rPr lang="en-US" dirty="0" smtClean="0"/>
-              <a:t>Examples here are in C++</a:t>
-            </a:r>
-            <a:endParaRPr lang="en-US" dirty="0"/>
+              <a:t>object persistency)</a:t>
+            </a:r>
+          </a:p>
+          <a:p>
+            <a:r>
+              <a:rPr lang="en-US" b="1" i="1" dirty="0"/>
+              <a:t>v</a:t>
+            </a:r>
+            <a:r>
+              <a:rPr lang="en-US" b="1" i="1" dirty="0" smtClean="0"/>
+              <a:t>ery useful for bootstrapping and coordinating distributed application components</a:t>
+            </a:r>
+            <a:endParaRPr lang="en-US" b="1" i="1" dirty="0"/>
           </a:p>
         </p:txBody>
       </p:sp>
     </p:spTree>
+    <p:extLst>
+      <p:ext uri="{BB962C8B-B14F-4D97-AF65-F5344CB8AC3E}">
+        <p14:creationId xmlns:p14="http://schemas.microsoft.com/office/powerpoint/2010/main" val="1782586087"/>
+      </p:ext>
+    </p:extLst>
   </p:cSld>
   <p:clrMapOvr>
     <a:masterClrMapping/>
@@ -11666,8 +11811,8 @@
 </p:sld>
 </file>
 
-<file path=ppt/slides/slide30.xml><?xml version="1.0" encoding="utf-8"?>
-<p:sld xmlns:a="http://schemas.openxmlformats.org/drawingml/2006/main" xmlns:r="http://schemas.openxmlformats.org/officeDocument/2006/relationships" xmlns:mc="http://schemas.openxmlformats.org/markup-compatibility/2006" xmlns:mv="urn:schemas-microsoft-com:mac:vml" xmlns:p="http://schemas.openxmlformats.org/presentationml/2006/main" mc:Ignorable="mv" mc:PreserveAttributes="mv:*">
+<file path=ppt/slides/slide31.xml><?xml version="1.0" encoding="utf-8"?>
+<p:sld xmlns:a="http://schemas.openxmlformats.org/drawingml/2006/main" xmlns:r="http://schemas.openxmlformats.org/officeDocument/2006/relationships" xmlns:p="http://schemas.openxmlformats.org/presentationml/2006/main">
   <p:cSld>
     <p:spTree>
       <p:nvGrpSpPr>
@@ -12334,7 +12479,7 @@
     </p:spTree>
     <p:extLst>
       <p:ext uri="{BB962C8B-B14F-4D97-AF65-F5344CB8AC3E}">
-        <p14:creationId xmlns:p14="http://schemas.microsoft.com/office/powerpoint/2010/main" xmlns:p="http://schemas.openxmlformats.org/presentationml/2006/main" xmlns:r="http://schemas.openxmlformats.org/officeDocument/2006/relationships" xmlns:a="http://schemas.openxmlformats.org/drawingml/2006/main" xmlns="" val="2979891476"/>
+        <p14:creationId xmlns:p14="http://schemas.microsoft.com/office/powerpoint/2010/main" val="2979891476"/>
       </p:ext>
     </p:extLst>
   </p:cSld>
@@ -12344,8 +12489,8 @@
 </p:sld>
 </file>
 
-<file path=ppt/slides/slide31.xml><?xml version="1.0" encoding="utf-8"?>
-<p:sld xmlns:a="http://schemas.openxmlformats.org/drawingml/2006/main" xmlns:r="http://schemas.openxmlformats.org/officeDocument/2006/relationships" xmlns:mc="http://schemas.openxmlformats.org/markup-compatibility/2006" xmlns:mv="urn:schemas-microsoft-com:mac:vml" xmlns:p="http://schemas.openxmlformats.org/presentationml/2006/main" mc:Ignorable="mv" mc:PreserveAttributes="mv:*">
+<file path=ppt/slides/slide32.xml><?xml version="1.0" encoding="utf-8"?>
+<p:sld xmlns:a="http://schemas.openxmlformats.org/drawingml/2006/main" xmlns:r="http://schemas.openxmlformats.org/officeDocument/2006/relationships" xmlns:p="http://schemas.openxmlformats.org/presentationml/2006/main">
   <p:cSld>
     <p:spTree>
       <p:nvGrpSpPr>
@@ -12733,7 +12878,7 @@
     </p:spTree>
     <p:extLst>
       <p:ext uri="{BB962C8B-B14F-4D97-AF65-F5344CB8AC3E}">
-        <p14:creationId xmlns:p14="http://schemas.microsoft.com/office/powerpoint/2010/main" xmlns:p="http://schemas.openxmlformats.org/presentationml/2006/main" xmlns:r="http://schemas.openxmlformats.org/officeDocument/2006/relationships" xmlns:a="http://schemas.openxmlformats.org/drawingml/2006/main" xmlns="" val="1920102061"/>
+        <p14:creationId xmlns:p14="http://schemas.microsoft.com/office/powerpoint/2010/main" val="1920102061"/>
       </p:ext>
     </p:extLst>
   </p:cSld>
@@ -12743,8 +12888,8 @@
 </p:sld>
 </file>
 
-<file path=ppt/slides/slide32.xml><?xml version="1.0" encoding="utf-8"?>
-<p:sld xmlns:a="http://schemas.openxmlformats.org/drawingml/2006/main" xmlns:r="http://schemas.openxmlformats.org/officeDocument/2006/relationships" xmlns:mc="http://schemas.openxmlformats.org/markup-compatibility/2006" xmlns:mv="urn:schemas-microsoft-com:mac:vml" xmlns:p="http://schemas.openxmlformats.org/presentationml/2006/main" mc:Ignorable="mv" mc:PreserveAttributes="mv:*">
+<file path=ppt/slides/slide33.xml><?xml version="1.0" encoding="utf-8"?>
+<p:sld xmlns:a="http://schemas.openxmlformats.org/drawingml/2006/main" xmlns:r="http://schemas.openxmlformats.org/officeDocument/2006/relationships" xmlns:p="http://schemas.openxmlformats.org/presentationml/2006/main">
   <p:cSld>
     <p:spTree>
       <p:nvGrpSpPr>
@@ -12809,7 +12954,7 @@
     </p:spTree>
     <p:extLst>
       <p:ext uri="{BB962C8B-B14F-4D97-AF65-F5344CB8AC3E}">
-        <p14:creationId xmlns:p14="http://schemas.microsoft.com/office/powerpoint/2010/main" xmlns:p="http://schemas.openxmlformats.org/presentationml/2006/main" xmlns:r="http://schemas.openxmlformats.org/officeDocument/2006/relationships" xmlns:a="http://schemas.openxmlformats.org/drawingml/2006/main" xmlns="" val="379548810"/>
+        <p14:creationId xmlns:p14="http://schemas.microsoft.com/office/powerpoint/2010/main" val="379548810"/>
       </p:ext>
     </p:extLst>
   </p:cSld>
@@ -12819,8 +12964,8 @@
 </p:sld>
 </file>
 
-<file path=ppt/slides/slide33.xml><?xml version="1.0" encoding="utf-8"?>
-<p:sld xmlns:a="http://schemas.openxmlformats.org/drawingml/2006/main" xmlns:r="http://schemas.openxmlformats.org/officeDocument/2006/relationships" xmlns:mc="http://schemas.openxmlformats.org/markup-compatibility/2006" xmlns:mv="urn:schemas-microsoft-com:mac:vml" xmlns:p="http://schemas.openxmlformats.org/presentationml/2006/main" mc:Ignorable="mv" mc:PreserveAttributes="mv:*">
+<file path=ppt/slides/slide34.xml><?xml version="1.0" encoding="utf-8"?>
+<p:sld xmlns:a="http://schemas.openxmlformats.org/drawingml/2006/main" xmlns:r="http://schemas.openxmlformats.org/officeDocument/2006/relationships" xmlns:p="http://schemas.openxmlformats.org/presentationml/2006/main">
   <p:cSld>
     <p:spTree>
       <p:nvGrpSpPr>
@@ -13392,7 +13537,7 @@
     </p:spTree>
     <p:extLst>
       <p:ext uri="{BB962C8B-B14F-4D97-AF65-F5344CB8AC3E}">
-        <p14:creationId xmlns:p14="http://schemas.microsoft.com/office/powerpoint/2010/main" xmlns:p="http://schemas.openxmlformats.org/presentationml/2006/main" xmlns:r="http://schemas.openxmlformats.org/officeDocument/2006/relationships" xmlns:a="http://schemas.openxmlformats.org/drawingml/2006/main" xmlns="" val="2115472614"/>
+        <p14:creationId xmlns:p14="http://schemas.microsoft.com/office/powerpoint/2010/main" val="2115472614"/>
       </p:ext>
     </p:extLst>
   </p:cSld>
@@ -13402,8 +13547,162 @@
 </p:sld>
 </file>
 
-<file path=ppt/slides/slide34.xml><?xml version="1.0" encoding="utf-8"?>
-<p:sld xmlns:a="http://schemas.openxmlformats.org/drawingml/2006/main" xmlns:r="http://schemas.openxmlformats.org/officeDocument/2006/relationships" xmlns:mc="http://schemas.openxmlformats.org/markup-compatibility/2006" xmlns:mv="urn:schemas-microsoft-com:mac:vml" xmlns:p="http://schemas.openxmlformats.org/presentationml/2006/main" mc:Ignorable="mv" mc:PreserveAttributes="mv:*">
+<file path=ppt/slides/slide35.xml><?xml version="1.0" encoding="utf-8"?>
+<p:sld xmlns:a="http://schemas.openxmlformats.org/drawingml/2006/main" xmlns:r="http://schemas.openxmlformats.org/officeDocument/2006/relationships" xmlns:p="http://schemas.openxmlformats.org/presentationml/2006/main">
+  <p:cSld>
+    <p:spTree>
+      <p:nvGrpSpPr>
+        <p:cNvPr id="1" name=""/>
+        <p:cNvGrpSpPr/>
+        <p:nvPr/>
+      </p:nvGrpSpPr>
+      <p:grpSpPr>
+        <a:xfrm>
+          <a:off x="0" y="0"/>
+          <a:ext cx="0" cy="0"/>
+          <a:chOff x="0" y="0"/>
+          <a:chExt cx="0" cy="0"/>
+        </a:xfrm>
+      </p:grpSpPr>
+      <p:sp>
+        <p:nvSpPr>
+          <p:cNvPr id="2" name="Title 1"/>
+          <p:cNvSpPr>
+            <a:spLocks noGrp="1"/>
+          </p:cNvSpPr>
+          <p:nvPr>
+            <p:ph type="title"/>
+          </p:nvPr>
+        </p:nvSpPr>
+        <p:spPr/>
+        <p:txBody>
+          <a:bodyPr/>
+          <a:lstStyle/>
+          <a:p>
+            <a:r>
+              <a:rPr lang="en-US" dirty="0"/>
+              <a:t>SAGA </a:t>
+            </a:r>
+            <a:r>
+              <a:rPr lang="en-US" dirty="0" smtClean="0"/>
+              <a:t>Session: Properties</a:t>
+            </a:r>
+            <a:endParaRPr lang="en-US" dirty="0"/>
+          </a:p>
+        </p:txBody>
+      </p:sp>
+      <p:sp>
+        <p:nvSpPr>
+          <p:cNvPr id="3" name="Content Placeholder 2"/>
+          <p:cNvSpPr>
+            <a:spLocks noGrp="1"/>
+          </p:cNvSpPr>
+          <p:nvPr>
+            <p:ph idx="1"/>
+          </p:nvPr>
+        </p:nvSpPr>
+        <p:spPr>
+          <a:xfrm>
+            <a:off x="575067" y="2068619"/>
+            <a:ext cx="8155866" cy="3127850"/>
+          </a:xfrm>
+        </p:spPr>
+        <p:txBody>
+          <a:bodyPr numCol="1">
+            <a:noAutofit/>
+          </a:bodyPr>
+          <a:lstStyle/>
+          <a:p>
+            <a:r>
+              <a:rPr lang="en-US" dirty="0"/>
+              <a:t>by default hidden (default session is used)</a:t>
+            </a:r>
+          </a:p>
+          <a:p>
+            <a:r>
+              <a:rPr lang="en-US" dirty="0" smtClean="0"/>
+              <a:t>session </a:t>
+            </a:r>
+            <a:r>
+              <a:rPr lang="en-US" dirty="0"/>
+              <a:t>is identified by lifetime of security </a:t>
+            </a:r>
+            <a:r>
+              <a:rPr lang="en-US" dirty="0" smtClean="0"/>
+              <a:t>credentials,</a:t>
+            </a:r>
+            <a:br>
+              <a:rPr lang="en-US" dirty="0" smtClean="0"/>
+            </a:br>
+            <a:r>
+              <a:rPr lang="en-US" dirty="0" smtClean="0"/>
+              <a:t>and </a:t>
+            </a:r>
+            <a:r>
+              <a:rPr lang="en-US" dirty="0"/>
+              <a:t>by objects in this session (jobs etc.)</a:t>
+            </a:r>
+          </a:p>
+          <a:p>
+            <a:r>
+              <a:rPr lang="en-US" dirty="0" smtClean="0"/>
+              <a:t>session </a:t>
+            </a:r>
+            <a:r>
+              <a:rPr lang="en-US" dirty="0"/>
+              <a:t>is used on object creation (optional)</a:t>
+            </a:r>
+          </a:p>
+          <a:p>
+            <a:r>
+              <a:rPr lang="en-US" dirty="0" smtClean="0"/>
+              <a:t>saga</a:t>
+            </a:r>
+            <a:r>
+              <a:rPr lang="en-US" dirty="0"/>
+              <a:t>::context </a:t>
+            </a:r>
+            <a:r>
+              <a:rPr lang="en-US" dirty="0" smtClean="0"/>
+              <a:t>can attach </a:t>
+            </a:r>
+            <a:r>
+              <a:rPr lang="en-US" dirty="0"/>
+              <a:t>security tokens to </a:t>
+            </a:r>
+            <a:r>
+              <a:rPr lang="en-US" dirty="0" smtClean="0"/>
+              <a:t>a session</a:t>
+            </a:r>
+          </a:p>
+          <a:p>
+            <a:pPr lvl="1"/>
+            <a:r>
+              <a:rPr lang="en-US" dirty="0" smtClean="0"/>
+              <a:t>the </a:t>
+            </a:r>
+            <a:r>
+              <a:rPr lang="en-US" dirty="0"/>
+              <a:t>default session has default contexts</a:t>
+            </a:r>
+          </a:p>
+        </p:txBody>
+      </p:sp>
+    </p:spTree>
+    <p:extLst>
+      <p:ext uri="{BB962C8B-B14F-4D97-AF65-F5344CB8AC3E}">
+        <p14:creationId xmlns:p14="http://schemas.microsoft.com/office/powerpoint/2010/main" val="709120760"/>
+      </p:ext>
+    </p:extLst>
+  </p:cSld>
+  <p:clrMapOvr>
+    <a:masterClrMapping/>
+  </p:clrMapOvr>
+</p:sld>
+</file>
+
+<file path=ppt/slides/slide36.xml><?xml version="1.0" encoding="utf-8"?>
+<p:sld xmlns:a="http://schemas.openxmlformats.org/drawingml/2006/main" xmlns:r="http://schemas.openxmlformats.org/officeDocument/2006/relationships" xmlns:p="http://schemas.openxmlformats.org/presentationml/2006/main">
   <p:cSld>
     <p:spTree>
       <p:nvGrpSpPr>
@@ -13749,7 +14048,7 @@
     </p:spTree>
     <p:extLst>
       <p:ext uri="{BB962C8B-B14F-4D97-AF65-F5344CB8AC3E}">
-        <p14:creationId xmlns:p14="http://schemas.microsoft.com/office/powerpoint/2010/main" xmlns:p="http://schemas.openxmlformats.org/presentationml/2006/main" xmlns:r="http://schemas.openxmlformats.org/officeDocument/2006/relationships" xmlns:a="http://schemas.openxmlformats.org/drawingml/2006/main" xmlns="" val="2065531179"/>
+        <p14:creationId xmlns:p14="http://schemas.microsoft.com/office/powerpoint/2010/main" val="2065531179"/>
       </p:ext>
     </p:extLst>
   </p:cSld>
@@ -13759,162 +14058,8 @@
 </p:sld>
 </file>
 
-<file path=ppt/slides/slide35.xml><?xml version="1.0" encoding="utf-8"?>
-<p:sld xmlns:a="http://schemas.openxmlformats.org/drawingml/2006/main" xmlns:r="http://schemas.openxmlformats.org/officeDocument/2006/relationships" xmlns:mc="http://schemas.openxmlformats.org/markup-compatibility/2006" xmlns:mv="urn:schemas-microsoft-com:mac:vml" xmlns:p="http://schemas.openxmlformats.org/presentationml/2006/main" mc:Ignorable="mv" mc:PreserveAttributes="mv:*">
-  <p:cSld>
-    <p:spTree>
-      <p:nvGrpSpPr>
-        <p:cNvPr id="1" name=""/>
-        <p:cNvGrpSpPr/>
-        <p:nvPr/>
-      </p:nvGrpSpPr>
-      <p:grpSpPr>
-        <a:xfrm>
-          <a:off x="0" y="0"/>
-          <a:ext cx="0" cy="0"/>
-          <a:chOff x="0" y="0"/>
-          <a:chExt cx="0" cy="0"/>
-        </a:xfrm>
-      </p:grpSpPr>
-      <p:sp>
-        <p:nvSpPr>
-          <p:cNvPr id="2" name="Title 1"/>
-          <p:cNvSpPr>
-            <a:spLocks noGrp="1"/>
-          </p:cNvSpPr>
-          <p:nvPr>
-            <p:ph type="title"/>
-          </p:nvPr>
-        </p:nvSpPr>
-        <p:spPr/>
-        <p:txBody>
-          <a:bodyPr/>
-          <a:lstStyle/>
-          <a:p>
-            <a:r>
-              <a:rPr lang="en-US" dirty="0"/>
-              <a:t>SAGA </a:t>
-            </a:r>
-            <a:r>
-              <a:rPr lang="en-US" dirty="0" smtClean="0"/>
-              <a:t>Session: Properties</a:t>
-            </a:r>
-            <a:endParaRPr lang="en-US" dirty="0"/>
-          </a:p>
-        </p:txBody>
-      </p:sp>
-      <p:sp>
-        <p:nvSpPr>
-          <p:cNvPr id="3" name="Content Placeholder 2"/>
-          <p:cNvSpPr>
-            <a:spLocks noGrp="1"/>
-          </p:cNvSpPr>
-          <p:nvPr>
-            <p:ph idx="1"/>
-          </p:nvPr>
-        </p:nvSpPr>
-        <p:spPr>
-          <a:xfrm>
-            <a:off x="575067" y="2068619"/>
-            <a:ext cx="8155866" cy="3127850"/>
-          </a:xfrm>
-        </p:spPr>
-        <p:txBody>
-          <a:bodyPr numCol="1">
-            <a:noAutofit/>
-          </a:bodyPr>
-          <a:lstStyle/>
-          <a:p>
-            <a:r>
-              <a:rPr lang="en-US" dirty="0"/>
-              <a:t>by default hidden (default session is used)</a:t>
-            </a:r>
-          </a:p>
-          <a:p>
-            <a:r>
-              <a:rPr lang="en-US" dirty="0" smtClean="0"/>
-              <a:t>session </a:t>
-            </a:r>
-            <a:r>
-              <a:rPr lang="en-US" dirty="0"/>
-              <a:t>is identified by lifetime of security </a:t>
-            </a:r>
-            <a:r>
-              <a:rPr lang="en-US" dirty="0" smtClean="0"/>
-              <a:t>credentials,</a:t>
-            </a:r>
-            <a:br>
-              <a:rPr lang="en-US" dirty="0" smtClean="0"/>
-            </a:br>
-            <a:r>
-              <a:rPr lang="en-US" dirty="0" smtClean="0"/>
-              <a:t>and </a:t>
-            </a:r>
-            <a:r>
-              <a:rPr lang="en-US" dirty="0"/>
-              <a:t>by objects in this session (jobs etc.)</a:t>
-            </a:r>
-          </a:p>
-          <a:p>
-            <a:r>
-              <a:rPr lang="en-US" dirty="0" smtClean="0"/>
-              <a:t>session </a:t>
-            </a:r>
-            <a:r>
-              <a:rPr lang="en-US" dirty="0"/>
-              <a:t>is used on object creation (optional)</a:t>
-            </a:r>
-          </a:p>
-          <a:p>
-            <a:r>
-              <a:rPr lang="en-US" dirty="0" smtClean="0"/>
-              <a:t>saga</a:t>
-            </a:r>
-            <a:r>
-              <a:rPr lang="en-US" dirty="0"/>
-              <a:t>::context </a:t>
-            </a:r>
-            <a:r>
-              <a:rPr lang="en-US" dirty="0" smtClean="0"/>
-              <a:t>can attach </a:t>
-            </a:r>
-            <a:r>
-              <a:rPr lang="en-US" dirty="0"/>
-              <a:t>security tokens to </a:t>
-            </a:r>
-            <a:r>
-              <a:rPr lang="en-US" dirty="0" smtClean="0"/>
-              <a:t>a session</a:t>
-            </a:r>
-          </a:p>
-          <a:p>
-            <a:pPr lvl="1"/>
-            <a:r>
-              <a:rPr lang="en-US" dirty="0" smtClean="0"/>
-              <a:t>the </a:t>
-            </a:r>
-            <a:r>
-              <a:rPr lang="en-US" dirty="0"/>
-              <a:t>default session has default contexts</a:t>
-            </a:r>
-          </a:p>
-        </p:txBody>
-      </p:sp>
-    </p:spTree>
-    <p:extLst>
-      <p:ext uri="{BB962C8B-B14F-4D97-AF65-F5344CB8AC3E}">
-        <p14:creationId xmlns:p14="http://schemas.microsoft.com/office/powerpoint/2010/main" xmlns:p="http://schemas.openxmlformats.org/presentationml/2006/main" xmlns:r="http://schemas.openxmlformats.org/officeDocument/2006/relationships" xmlns:a="http://schemas.openxmlformats.org/drawingml/2006/main" xmlns="" val="709120760"/>
-      </p:ext>
-    </p:extLst>
-  </p:cSld>
-  <p:clrMapOvr>
-    <a:masterClrMapping/>
-  </p:clrMapOvr>
-</p:sld>
-</file>
-
-<file path=ppt/slides/slide36.xml><?xml version="1.0" encoding="utf-8"?>
-<p:sld xmlns:a="http://schemas.openxmlformats.org/drawingml/2006/main" xmlns:r="http://schemas.openxmlformats.org/officeDocument/2006/relationships" xmlns:mc="http://schemas.openxmlformats.org/markup-compatibility/2006" xmlns:mv="urn:schemas-microsoft-com:mac:vml" xmlns:p="http://schemas.openxmlformats.org/presentationml/2006/main" mc:Ignorable="mv" mc:PreserveAttributes="mv:*">
+<file path=ppt/slides/slide37.xml><?xml version="1.0" encoding="utf-8"?>
+<p:sld xmlns:a="http://schemas.openxmlformats.org/drawingml/2006/main" xmlns:r="http://schemas.openxmlformats.org/officeDocument/2006/relationships" xmlns:p="http://schemas.openxmlformats.org/presentationml/2006/main">
   <p:cSld>
     <p:spTree>
       <p:nvGrpSpPr>
@@ -14296,7 +14441,7 @@
     </p:spTree>
     <p:extLst>
       <p:ext uri="{BB962C8B-B14F-4D97-AF65-F5344CB8AC3E}">
-        <p14:creationId xmlns:p14="http://schemas.microsoft.com/office/powerpoint/2010/main" xmlns:p="http://schemas.openxmlformats.org/presentationml/2006/main" xmlns:r="http://schemas.openxmlformats.org/officeDocument/2006/relationships" xmlns:a="http://schemas.openxmlformats.org/drawingml/2006/main" xmlns="" val="3629655379"/>
+        <p14:creationId xmlns:p14="http://schemas.microsoft.com/office/powerpoint/2010/main" val="3629655379"/>
       </p:ext>
     </p:extLst>
   </p:cSld>
@@ -14306,8 +14451,8 @@
 </p:sld>
 </file>
 
-<file path=ppt/slides/slide37.xml><?xml version="1.0" encoding="utf-8"?>
-<p:sld xmlns:a="http://schemas.openxmlformats.org/drawingml/2006/main" xmlns:r="http://schemas.openxmlformats.org/officeDocument/2006/relationships" xmlns:mc="http://schemas.openxmlformats.org/markup-compatibility/2006" xmlns:mv="urn:schemas-microsoft-com:mac:vml" xmlns:p="http://schemas.openxmlformats.org/presentationml/2006/main" mc:Ignorable="mv" mc:PreserveAttributes="mv:*">
+<file path=ppt/slides/slide38.xml><?xml version="1.0" encoding="utf-8"?>
+<p:sld xmlns:a="http://schemas.openxmlformats.org/drawingml/2006/main" xmlns:r="http://schemas.openxmlformats.org/officeDocument/2006/relationships" xmlns:p="http://schemas.openxmlformats.org/presentationml/2006/main">
   <p:cSld>
     <p:spTree>
       <p:nvGrpSpPr>
@@ -14508,7 +14653,7 @@
     </p:spTree>
     <p:extLst>
       <p:ext uri="{BB962C8B-B14F-4D97-AF65-F5344CB8AC3E}">
-        <p14:creationId xmlns:p14="http://schemas.microsoft.com/office/powerpoint/2010/main" xmlns:p="http://schemas.openxmlformats.org/presentationml/2006/main" xmlns:r="http://schemas.openxmlformats.org/officeDocument/2006/relationships" xmlns:a="http://schemas.openxmlformats.org/drawingml/2006/main" xmlns="" val="2400555662"/>
+        <p14:creationId xmlns:p14="http://schemas.microsoft.com/office/powerpoint/2010/main" val="2400555662"/>
       </p:ext>
     </p:extLst>
   </p:cSld>
@@ -14518,8 +14663,8 @@
 </p:sld>
 </file>
 
-<file path=ppt/slides/slide38.xml><?xml version="1.0" encoding="utf-8"?>
-<p:sld xmlns:a="http://schemas.openxmlformats.org/drawingml/2006/main" xmlns:r="http://schemas.openxmlformats.org/officeDocument/2006/relationships" xmlns:mc="http://schemas.openxmlformats.org/markup-compatibility/2006" xmlns:mv="urn:schemas-microsoft-com:mac:vml" xmlns:p="http://schemas.openxmlformats.org/presentationml/2006/main" mc:Ignorable="mv" mc:PreserveAttributes="mv:*">
+<file path=ppt/slides/slide39.xml><?xml version="1.0" encoding="utf-8"?>
+<p:sld xmlns:a="http://schemas.openxmlformats.org/drawingml/2006/main" xmlns:r="http://schemas.openxmlformats.org/officeDocument/2006/relationships" xmlns:p="http://schemas.openxmlformats.org/presentationml/2006/main">
   <p:cSld>
     <p:spTree>
       <p:nvGrpSpPr>
@@ -14572,7 +14717,7 @@
           <a:blip r:embed="rId2">
             <a:extLst>
               <a:ext uri="{28A0092B-C50C-407E-A947-70E740481C1C}">
-                <a14:useLocalDpi xmlns:a14="http://schemas.microsoft.com/office/drawing/2010/main" xmlns:p="http://schemas.openxmlformats.org/presentationml/2006/main" xmlns:r="http://schemas.openxmlformats.org/officeDocument/2006/relationships" xmlns:a="http://schemas.openxmlformats.org/drawingml/2006/main" xmlns="" val="0"/>
+                <a14:useLocalDpi xmlns:a14="http://schemas.microsoft.com/office/drawing/2010/main" val="0"/>
               </a:ext>
             </a:extLst>
           </a:blip>
@@ -14590,368 +14735,7 @@
     </p:spTree>
     <p:extLst>
       <p:ext uri="{BB962C8B-B14F-4D97-AF65-F5344CB8AC3E}">
-        <p14:creationId xmlns:p14="http://schemas.microsoft.com/office/powerpoint/2010/main" xmlns:p="http://schemas.openxmlformats.org/presentationml/2006/main" xmlns:r="http://schemas.openxmlformats.org/officeDocument/2006/relationships" xmlns:a="http://schemas.openxmlformats.org/drawingml/2006/main" xmlns="" val="2314353703"/>
-      </p:ext>
-    </p:extLst>
-  </p:cSld>
-  <p:clrMapOvr>
-    <a:masterClrMapping/>
-  </p:clrMapOvr>
-</p:sld>
-</file>
-
-<file path=ppt/slides/slide39.xml><?xml version="1.0" encoding="utf-8"?>
-<p:sld xmlns:a="http://schemas.openxmlformats.org/drawingml/2006/main" xmlns:r="http://schemas.openxmlformats.org/officeDocument/2006/relationships" xmlns:mc="http://schemas.openxmlformats.org/markup-compatibility/2006" xmlns:mv="urn:schemas-microsoft-com:mac:vml" xmlns:p="http://schemas.openxmlformats.org/presentationml/2006/main" mc:Ignorable="mv" mc:PreserveAttributes="mv:*">
-  <p:cSld>
-    <p:spTree>
-      <p:nvGrpSpPr>
-        <p:cNvPr id="1" name=""/>
-        <p:cNvGrpSpPr/>
-        <p:nvPr/>
-      </p:nvGrpSpPr>
-      <p:grpSpPr>
-        <a:xfrm>
-          <a:off x="0" y="0"/>
-          <a:ext cx="0" cy="0"/>
-          <a:chOff x="0" y="0"/>
-          <a:chExt cx="0" cy="0"/>
-        </a:xfrm>
-      </p:grpSpPr>
-      <p:sp>
-        <p:nvSpPr>
-          <p:cNvPr id="2" name="Title 1"/>
-          <p:cNvSpPr>
-            <a:spLocks noGrp="1"/>
-          </p:cNvSpPr>
-          <p:nvPr>
-            <p:ph type="title"/>
-          </p:nvPr>
-        </p:nvSpPr>
-        <p:spPr/>
-        <p:txBody>
-          <a:bodyPr/>
-          <a:lstStyle/>
-          <a:p>
-            <a:r>
-              <a:rPr lang="en-US" dirty="0"/>
-              <a:t>SAGA </a:t>
-            </a:r>
-            <a:r>
-              <a:rPr lang="en-US" dirty="0" smtClean="0"/>
-              <a:t>Tasks</a:t>
-            </a:r>
-            <a:endParaRPr lang="en-US" dirty="0"/>
-          </a:p>
-        </p:txBody>
-      </p:sp>
-      <p:sp>
-        <p:nvSpPr>
-          <p:cNvPr id="3" name="Content Placeholder 2"/>
-          <p:cNvSpPr>
-            <a:spLocks noGrp="1"/>
-          </p:cNvSpPr>
-          <p:nvPr>
-            <p:ph idx="1"/>
-          </p:nvPr>
-        </p:nvSpPr>
-        <p:spPr>
-          <a:xfrm>
-            <a:off x="575067" y="2068619"/>
-            <a:ext cx="8155866" cy="4321030"/>
-          </a:xfrm>
-        </p:spPr>
-        <p:txBody>
-          <a:bodyPr numCol="1">
-            <a:noAutofit/>
-          </a:bodyPr>
-          <a:lstStyle/>
-          <a:p>
-            <a:r>
-              <a:rPr lang="en-US" dirty="0"/>
-              <a:t>different versions for each method call: </a:t>
-            </a:r>
-            <a:r>
-              <a:rPr lang="en-US" dirty="0" smtClean="0"/>
-              <a:t> </a:t>
-            </a:r>
-            <a:r>
-              <a:rPr lang="en-US" dirty="0">
-                <a:latin typeface="Consolas" pitchFamily="49" charset="0"/>
-                <a:cs typeface="Consolas" pitchFamily="49" charset="0"/>
-              </a:rPr>
-              <a:t>S</a:t>
-            </a:r>
-            <a:r>
-              <a:rPr lang="en-US" dirty="0" smtClean="0">
-                <a:latin typeface="Consolas" pitchFamily="49" charset="0"/>
-                <a:cs typeface="Consolas" pitchFamily="49" charset="0"/>
-              </a:rPr>
-              <a:t>ync</a:t>
-            </a:r>
-            <a:r>
-              <a:rPr lang="en-US" dirty="0">
-                <a:latin typeface="Consolas" pitchFamily="49" charset="0"/>
-                <a:cs typeface="Consolas" pitchFamily="49" charset="0"/>
-              </a:rPr>
-              <a:t>, </a:t>
-            </a:r>
-            <a:r>
-              <a:rPr lang="en-US" dirty="0" err="1" smtClean="0">
-                <a:latin typeface="Consolas" pitchFamily="49" charset="0"/>
-                <a:cs typeface="Consolas" pitchFamily="49" charset="0"/>
-              </a:rPr>
-              <a:t>Async</a:t>
-            </a:r>
-            <a:r>
-              <a:rPr lang="en-US" dirty="0" smtClean="0">
-                <a:latin typeface="Consolas" pitchFamily="49" charset="0"/>
-                <a:cs typeface="Consolas" pitchFamily="49" charset="0"/>
-              </a:rPr>
-              <a:t>, Task</a:t>
-            </a:r>
-            <a:endParaRPr lang="en-US" dirty="0">
-              <a:latin typeface="Consolas" pitchFamily="49" charset="0"/>
-              <a:cs typeface="Consolas" pitchFamily="49" charset="0"/>
-            </a:endParaRPr>
-          </a:p>
-          <a:p>
-            <a:r>
-              <a:rPr lang="en-US" dirty="0" smtClean="0"/>
-              <a:t>signature </a:t>
-            </a:r>
-            <a:r>
-              <a:rPr lang="en-US" dirty="0"/>
-              <a:t>basically the same</a:t>
-            </a:r>
-          </a:p>
-          <a:p>
-            <a:r>
-              <a:rPr lang="en-US" dirty="0" smtClean="0"/>
-              <a:t>differ </a:t>
-            </a:r>
-            <a:r>
-              <a:rPr lang="en-US" dirty="0"/>
-              <a:t>in state of </a:t>
-            </a:r>
-            <a:r>
-              <a:rPr lang="en-US" dirty="0" smtClean="0"/>
-              <a:t>the task </a:t>
-            </a:r>
-            <a:r>
-              <a:rPr lang="en-US" dirty="0"/>
-              <a:t>returned by that </a:t>
-            </a:r>
-            <a:r>
-              <a:rPr lang="en-US" dirty="0" smtClean="0"/>
-              <a:t>method</a:t>
-            </a:r>
-          </a:p>
-          <a:p>
-            <a:pPr lvl="1"/>
-            <a:r>
-              <a:rPr lang="en-US" dirty="0" smtClean="0">
-                <a:latin typeface="Consolas" pitchFamily="49" charset="0"/>
-                <a:cs typeface="Consolas" pitchFamily="49" charset="0"/>
-              </a:rPr>
-              <a:t>Sync</a:t>
-            </a:r>
-            <a:r>
-              <a:rPr lang="en-US" dirty="0" smtClean="0"/>
-              <a:t>: 	task is </a:t>
-            </a:r>
-            <a:r>
-              <a:rPr lang="en-US" dirty="0" smtClean="0">
-                <a:latin typeface="Consolas" pitchFamily="49" charset="0"/>
-                <a:cs typeface="Consolas" pitchFamily="49" charset="0"/>
-              </a:rPr>
-              <a:t>Done</a:t>
-            </a:r>
-          </a:p>
-          <a:p>
-            <a:pPr lvl="1"/>
-            <a:r>
-              <a:rPr lang="en-US" dirty="0" err="1" smtClean="0">
-                <a:latin typeface="Consolas" pitchFamily="49" charset="0"/>
-                <a:cs typeface="Consolas" pitchFamily="49" charset="0"/>
-              </a:rPr>
-              <a:t>Async</a:t>
-            </a:r>
-            <a:r>
-              <a:rPr lang="en-US" dirty="0" smtClean="0"/>
-              <a:t>: 	task is </a:t>
-            </a:r>
-            <a:r>
-              <a:rPr lang="en-US" dirty="0" smtClean="0">
-                <a:latin typeface="Consolas" pitchFamily="49" charset="0"/>
-                <a:cs typeface="Consolas" pitchFamily="49" charset="0"/>
-              </a:rPr>
-              <a:t>Running</a:t>
-            </a:r>
-            <a:r>
-              <a:rPr lang="en-US" dirty="0" smtClean="0"/>
-              <a:t>		-&gt; </a:t>
-            </a:r>
-            <a:r>
-              <a:rPr lang="en-US" dirty="0" smtClean="0">
-                <a:latin typeface="Consolas" pitchFamily="49" charset="0"/>
-                <a:cs typeface="Consolas" pitchFamily="49" charset="0"/>
-              </a:rPr>
-              <a:t>wait();</a:t>
-            </a:r>
-          </a:p>
-          <a:p>
-            <a:pPr lvl="1"/>
-            <a:r>
-              <a:rPr lang="en-US" dirty="0" smtClean="0">
-                <a:latin typeface="Consolas" pitchFamily="49" charset="0"/>
-                <a:cs typeface="Consolas" pitchFamily="49" charset="0"/>
-              </a:rPr>
-              <a:t>Task</a:t>
-            </a:r>
-            <a:r>
-              <a:rPr lang="en-US" dirty="0" smtClean="0"/>
-              <a:t>: </a:t>
-            </a:r>
-            <a:r>
-              <a:rPr lang="en-US" dirty="0"/>
-              <a:t>	</a:t>
-            </a:r>
-            <a:r>
-              <a:rPr lang="en-US" dirty="0" smtClean="0"/>
-              <a:t>task </a:t>
-            </a:r>
-            <a:r>
-              <a:rPr lang="en-US" dirty="0"/>
-              <a:t>is </a:t>
-            </a:r>
-            <a:r>
-              <a:rPr lang="en-US" dirty="0" smtClean="0">
-                <a:latin typeface="Consolas" pitchFamily="49" charset="0"/>
-                <a:cs typeface="Consolas" pitchFamily="49" charset="0"/>
-              </a:rPr>
-              <a:t>New</a:t>
-            </a:r>
-            <a:r>
-              <a:rPr lang="en-US" dirty="0" smtClean="0"/>
-              <a:t>		-&gt; </a:t>
-            </a:r>
-            <a:r>
-              <a:rPr lang="en-US" dirty="0" smtClean="0">
-                <a:latin typeface="Consolas" pitchFamily="49" charset="0"/>
-                <a:cs typeface="Consolas" pitchFamily="49" charset="0"/>
-              </a:rPr>
-              <a:t>run(); wait();</a:t>
-            </a:r>
-          </a:p>
-          <a:p>
-            <a:r>
-              <a:rPr lang="en-US" dirty="0" smtClean="0">
-                <a:latin typeface="Century Gothic" pitchFamily="34" charset="0"/>
-                <a:cs typeface="Consolas" pitchFamily="49" charset="0"/>
-              </a:rPr>
-              <a:t>delayed exception delivery</a:t>
-            </a:r>
-          </a:p>
-          <a:p>
-            <a:pPr marL="349250" lvl="1" indent="0">
-              <a:buNone/>
-            </a:pPr>
-            <a:r>
-              <a:rPr lang="en-US" sz="1400" dirty="0">
-                <a:latin typeface="Consolas" pitchFamily="49" charset="0"/>
-                <a:cs typeface="Consolas" pitchFamily="49" charset="0"/>
-              </a:rPr>
-              <a:t>i</a:t>
-            </a:r>
-            <a:r>
-              <a:rPr lang="en-US" sz="1400" dirty="0" smtClean="0">
-                <a:latin typeface="Consolas" pitchFamily="49" charset="0"/>
-                <a:cs typeface="Consolas" pitchFamily="49" charset="0"/>
-              </a:rPr>
-              <a:t>f ( saga::task::Failed == </a:t>
-            </a:r>
-            <a:r>
-              <a:rPr lang="en-US" sz="1400" dirty="0" err="1" smtClean="0">
-                <a:latin typeface="Consolas" pitchFamily="49" charset="0"/>
-                <a:cs typeface="Consolas" pitchFamily="49" charset="0"/>
-              </a:rPr>
-              <a:t>task.get_state</a:t>
-            </a:r>
-            <a:r>
-              <a:rPr lang="en-US" sz="1400" dirty="0" smtClean="0">
-                <a:latin typeface="Consolas" pitchFamily="49" charset="0"/>
-                <a:cs typeface="Consolas" pitchFamily="49" charset="0"/>
-              </a:rPr>
-              <a:t> () )</a:t>
-            </a:r>
-          </a:p>
-          <a:p>
-            <a:pPr marL="349250" lvl="1" indent="0">
-              <a:buNone/>
-            </a:pPr>
-            <a:r>
-              <a:rPr lang="en-US" sz="1400" dirty="0" smtClean="0">
-                <a:latin typeface="Consolas" pitchFamily="49" charset="0"/>
-                <a:cs typeface="Consolas" pitchFamily="49" charset="0"/>
-              </a:rPr>
-              <a:t>{</a:t>
-            </a:r>
-          </a:p>
-          <a:p>
-            <a:pPr marL="349250" lvl="1" indent="0">
-              <a:buNone/>
-            </a:pPr>
-            <a:r>
-              <a:rPr lang="en-US" sz="1400" dirty="0">
-                <a:latin typeface="Consolas" pitchFamily="49" charset="0"/>
-                <a:cs typeface="Consolas" pitchFamily="49" charset="0"/>
-              </a:rPr>
-              <a:t> </a:t>
-            </a:r>
-            <a:r>
-              <a:rPr lang="en-US" sz="1400" dirty="0" smtClean="0">
-                <a:latin typeface="Consolas" pitchFamily="49" charset="0"/>
-                <a:cs typeface="Consolas" pitchFamily="49" charset="0"/>
-              </a:rPr>
-              <a:t>   </a:t>
-            </a:r>
-            <a:r>
-              <a:rPr lang="en-US" sz="1400" dirty="0" err="1" smtClean="0">
-                <a:latin typeface="Consolas" pitchFamily="49" charset="0"/>
-                <a:cs typeface="Consolas" pitchFamily="49" charset="0"/>
-              </a:rPr>
-              <a:t>task.rethrow</a:t>
-            </a:r>
-            <a:r>
-              <a:rPr lang="en-US" sz="1400" dirty="0" smtClean="0">
-                <a:latin typeface="Consolas" pitchFamily="49" charset="0"/>
-                <a:cs typeface="Consolas" pitchFamily="49" charset="0"/>
-              </a:rPr>
-              <a:t> ();</a:t>
-            </a:r>
-          </a:p>
-          <a:p>
-            <a:pPr marL="349250" lvl="1" indent="0">
-              <a:buNone/>
-            </a:pPr>
-            <a:r>
-              <a:rPr lang="en-US" sz="1400" dirty="0">
-                <a:latin typeface="Consolas" pitchFamily="49" charset="0"/>
-                <a:cs typeface="Consolas" pitchFamily="49" charset="0"/>
-              </a:rPr>
-              <a:t>}</a:t>
-            </a:r>
-          </a:p>
-          <a:p>
-            <a:pPr lvl="1"/>
-            <a:endParaRPr lang="en-US" dirty="0"/>
-          </a:p>
-        </p:txBody>
-      </p:sp>
-    </p:spTree>
-    <p:extLst>
-      <p:ext uri="{BB962C8B-B14F-4D97-AF65-F5344CB8AC3E}">
-        <p14:creationId xmlns:p14="http://schemas.microsoft.com/office/powerpoint/2010/main" xmlns:p="http://schemas.openxmlformats.org/presentationml/2006/main" xmlns:r="http://schemas.openxmlformats.org/officeDocument/2006/relationships" xmlns:a="http://schemas.openxmlformats.org/drawingml/2006/main" xmlns="" val="847814926"/>
+        <p14:creationId xmlns:p14="http://schemas.microsoft.com/office/powerpoint/2010/main" val="2314353703"/>
       </p:ext>
     </p:extLst>
   </p:cSld>
@@ -14962,7 +14746,7 @@
 </file>
 
 <file path=ppt/slides/slide4.xml><?xml version="1.0" encoding="utf-8"?>
-<p:sld xmlns:a="http://schemas.openxmlformats.org/drawingml/2006/main" xmlns:r="http://schemas.openxmlformats.org/officeDocument/2006/relationships" xmlns:mc="http://schemas.openxmlformats.org/markup-compatibility/2006" xmlns:mv="urn:schemas-microsoft-com:mac:vml" xmlns:p="http://schemas.openxmlformats.org/presentationml/2006/main" mc:Ignorable="mv" mc:PreserveAttributes="mv:*">
+<p:sld xmlns:a="http://schemas.openxmlformats.org/drawingml/2006/main" xmlns:r="http://schemas.openxmlformats.org/officeDocument/2006/relationships" xmlns:p="http://schemas.openxmlformats.org/presentationml/2006/main">
   <p:cSld>
     <p:spTree>
       <p:nvGrpSpPr>
@@ -15360,7 +15144,368 @@
 </file>
 
 <file path=ppt/slides/slide40.xml><?xml version="1.0" encoding="utf-8"?>
-<p:sld xmlns:a="http://schemas.openxmlformats.org/drawingml/2006/main" xmlns:r="http://schemas.openxmlformats.org/officeDocument/2006/relationships" xmlns:mc="http://schemas.openxmlformats.org/markup-compatibility/2006" xmlns:mv="urn:schemas-microsoft-com:mac:vml" xmlns:p="http://schemas.openxmlformats.org/presentationml/2006/main" mc:Ignorable="mv" mc:PreserveAttributes="mv:*">
+<p:sld xmlns:a="http://schemas.openxmlformats.org/drawingml/2006/main" xmlns:r="http://schemas.openxmlformats.org/officeDocument/2006/relationships" xmlns:p="http://schemas.openxmlformats.org/presentationml/2006/main">
+  <p:cSld>
+    <p:spTree>
+      <p:nvGrpSpPr>
+        <p:cNvPr id="1" name=""/>
+        <p:cNvGrpSpPr/>
+        <p:nvPr/>
+      </p:nvGrpSpPr>
+      <p:grpSpPr>
+        <a:xfrm>
+          <a:off x="0" y="0"/>
+          <a:ext cx="0" cy="0"/>
+          <a:chOff x="0" y="0"/>
+          <a:chExt cx="0" cy="0"/>
+        </a:xfrm>
+      </p:grpSpPr>
+      <p:sp>
+        <p:nvSpPr>
+          <p:cNvPr id="2" name="Title 1"/>
+          <p:cNvSpPr>
+            <a:spLocks noGrp="1"/>
+          </p:cNvSpPr>
+          <p:nvPr>
+            <p:ph type="title"/>
+          </p:nvPr>
+        </p:nvSpPr>
+        <p:spPr/>
+        <p:txBody>
+          <a:bodyPr/>
+          <a:lstStyle/>
+          <a:p>
+            <a:r>
+              <a:rPr lang="en-US" dirty="0"/>
+              <a:t>SAGA </a:t>
+            </a:r>
+            <a:r>
+              <a:rPr lang="en-US" dirty="0" smtClean="0"/>
+              <a:t>Tasks</a:t>
+            </a:r>
+            <a:endParaRPr lang="en-US" dirty="0"/>
+          </a:p>
+        </p:txBody>
+      </p:sp>
+      <p:sp>
+        <p:nvSpPr>
+          <p:cNvPr id="3" name="Content Placeholder 2"/>
+          <p:cNvSpPr>
+            <a:spLocks noGrp="1"/>
+          </p:cNvSpPr>
+          <p:nvPr>
+            <p:ph idx="1"/>
+          </p:nvPr>
+        </p:nvSpPr>
+        <p:spPr>
+          <a:xfrm>
+            <a:off x="575067" y="2068619"/>
+            <a:ext cx="8155866" cy="4321030"/>
+          </a:xfrm>
+        </p:spPr>
+        <p:txBody>
+          <a:bodyPr numCol="1">
+            <a:noAutofit/>
+          </a:bodyPr>
+          <a:lstStyle/>
+          <a:p>
+            <a:r>
+              <a:rPr lang="en-US" dirty="0"/>
+              <a:t>different versions for each method call: </a:t>
+            </a:r>
+            <a:r>
+              <a:rPr lang="en-US" dirty="0" smtClean="0"/>
+              <a:t> </a:t>
+            </a:r>
+            <a:r>
+              <a:rPr lang="en-US" dirty="0">
+                <a:latin typeface="Consolas" pitchFamily="49" charset="0"/>
+                <a:cs typeface="Consolas" pitchFamily="49" charset="0"/>
+              </a:rPr>
+              <a:t>S</a:t>
+            </a:r>
+            <a:r>
+              <a:rPr lang="en-US" dirty="0" smtClean="0">
+                <a:latin typeface="Consolas" pitchFamily="49" charset="0"/>
+                <a:cs typeface="Consolas" pitchFamily="49" charset="0"/>
+              </a:rPr>
+              <a:t>ync</a:t>
+            </a:r>
+            <a:r>
+              <a:rPr lang="en-US" dirty="0">
+                <a:latin typeface="Consolas" pitchFamily="49" charset="0"/>
+                <a:cs typeface="Consolas" pitchFamily="49" charset="0"/>
+              </a:rPr>
+              <a:t>, </a:t>
+            </a:r>
+            <a:r>
+              <a:rPr lang="en-US" dirty="0" err="1" smtClean="0">
+                <a:latin typeface="Consolas" pitchFamily="49" charset="0"/>
+                <a:cs typeface="Consolas" pitchFamily="49" charset="0"/>
+              </a:rPr>
+              <a:t>Async</a:t>
+            </a:r>
+            <a:r>
+              <a:rPr lang="en-US" dirty="0" smtClean="0">
+                <a:latin typeface="Consolas" pitchFamily="49" charset="0"/>
+                <a:cs typeface="Consolas" pitchFamily="49" charset="0"/>
+              </a:rPr>
+              <a:t>, Task</a:t>
+            </a:r>
+            <a:endParaRPr lang="en-US" dirty="0">
+              <a:latin typeface="Consolas" pitchFamily="49" charset="0"/>
+              <a:cs typeface="Consolas" pitchFamily="49" charset="0"/>
+            </a:endParaRPr>
+          </a:p>
+          <a:p>
+            <a:r>
+              <a:rPr lang="en-US" dirty="0" smtClean="0"/>
+              <a:t>signature </a:t>
+            </a:r>
+            <a:r>
+              <a:rPr lang="en-US" dirty="0"/>
+              <a:t>basically the same</a:t>
+            </a:r>
+          </a:p>
+          <a:p>
+            <a:r>
+              <a:rPr lang="en-US" dirty="0" smtClean="0"/>
+              <a:t>differ </a:t>
+            </a:r>
+            <a:r>
+              <a:rPr lang="en-US" dirty="0"/>
+              <a:t>in state of </a:t>
+            </a:r>
+            <a:r>
+              <a:rPr lang="en-US" dirty="0" smtClean="0"/>
+              <a:t>the task </a:t>
+            </a:r>
+            <a:r>
+              <a:rPr lang="en-US" dirty="0"/>
+              <a:t>returned by that </a:t>
+            </a:r>
+            <a:r>
+              <a:rPr lang="en-US" dirty="0" smtClean="0"/>
+              <a:t>method</a:t>
+            </a:r>
+          </a:p>
+          <a:p>
+            <a:pPr lvl="1"/>
+            <a:r>
+              <a:rPr lang="en-US" dirty="0" smtClean="0">
+                <a:latin typeface="Consolas" pitchFamily="49" charset="0"/>
+                <a:cs typeface="Consolas" pitchFamily="49" charset="0"/>
+              </a:rPr>
+              <a:t>Sync</a:t>
+            </a:r>
+            <a:r>
+              <a:rPr lang="en-US" dirty="0" smtClean="0"/>
+              <a:t>: 	task is </a:t>
+            </a:r>
+            <a:r>
+              <a:rPr lang="en-US" dirty="0" smtClean="0">
+                <a:latin typeface="Consolas" pitchFamily="49" charset="0"/>
+                <a:cs typeface="Consolas" pitchFamily="49" charset="0"/>
+              </a:rPr>
+              <a:t>Done</a:t>
+            </a:r>
+          </a:p>
+          <a:p>
+            <a:pPr lvl="1"/>
+            <a:r>
+              <a:rPr lang="en-US" dirty="0" err="1" smtClean="0">
+                <a:latin typeface="Consolas" pitchFamily="49" charset="0"/>
+                <a:cs typeface="Consolas" pitchFamily="49" charset="0"/>
+              </a:rPr>
+              <a:t>Async</a:t>
+            </a:r>
+            <a:r>
+              <a:rPr lang="en-US" dirty="0" smtClean="0"/>
+              <a:t>: 	task is </a:t>
+            </a:r>
+            <a:r>
+              <a:rPr lang="en-US" dirty="0" smtClean="0">
+                <a:latin typeface="Consolas" pitchFamily="49" charset="0"/>
+                <a:cs typeface="Consolas" pitchFamily="49" charset="0"/>
+              </a:rPr>
+              <a:t>Running</a:t>
+            </a:r>
+            <a:r>
+              <a:rPr lang="en-US" dirty="0" smtClean="0"/>
+              <a:t>		-&gt; </a:t>
+            </a:r>
+            <a:r>
+              <a:rPr lang="en-US" dirty="0" smtClean="0">
+                <a:latin typeface="Consolas" pitchFamily="49" charset="0"/>
+                <a:cs typeface="Consolas" pitchFamily="49" charset="0"/>
+              </a:rPr>
+              <a:t>wait();</a:t>
+            </a:r>
+          </a:p>
+          <a:p>
+            <a:pPr lvl="1"/>
+            <a:r>
+              <a:rPr lang="en-US" dirty="0" smtClean="0">
+                <a:latin typeface="Consolas" pitchFamily="49" charset="0"/>
+                <a:cs typeface="Consolas" pitchFamily="49" charset="0"/>
+              </a:rPr>
+              <a:t>Task</a:t>
+            </a:r>
+            <a:r>
+              <a:rPr lang="en-US" dirty="0" smtClean="0"/>
+              <a:t>: </a:t>
+            </a:r>
+            <a:r>
+              <a:rPr lang="en-US" dirty="0"/>
+              <a:t>	</a:t>
+            </a:r>
+            <a:r>
+              <a:rPr lang="en-US" dirty="0" smtClean="0"/>
+              <a:t>task </a:t>
+            </a:r>
+            <a:r>
+              <a:rPr lang="en-US" dirty="0"/>
+              <a:t>is </a:t>
+            </a:r>
+            <a:r>
+              <a:rPr lang="en-US" dirty="0" smtClean="0">
+                <a:latin typeface="Consolas" pitchFamily="49" charset="0"/>
+                <a:cs typeface="Consolas" pitchFamily="49" charset="0"/>
+              </a:rPr>
+              <a:t>New</a:t>
+            </a:r>
+            <a:r>
+              <a:rPr lang="en-US" dirty="0" smtClean="0"/>
+              <a:t>		-&gt; </a:t>
+            </a:r>
+            <a:r>
+              <a:rPr lang="en-US" dirty="0" smtClean="0">
+                <a:latin typeface="Consolas" pitchFamily="49" charset="0"/>
+                <a:cs typeface="Consolas" pitchFamily="49" charset="0"/>
+              </a:rPr>
+              <a:t>run(); wait();</a:t>
+            </a:r>
+          </a:p>
+          <a:p>
+            <a:r>
+              <a:rPr lang="en-US" dirty="0" smtClean="0">
+                <a:latin typeface="Century Gothic" pitchFamily="34" charset="0"/>
+                <a:cs typeface="Consolas" pitchFamily="49" charset="0"/>
+              </a:rPr>
+              <a:t>delayed exception delivery</a:t>
+            </a:r>
+          </a:p>
+          <a:p>
+            <a:pPr marL="349250" lvl="1" indent="0">
+              <a:buNone/>
+            </a:pPr>
+            <a:r>
+              <a:rPr lang="en-US" sz="1400" dirty="0">
+                <a:latin typeface="Consolas" pitchFamily="49" charset="0"/>
+                <a:cs typeface="Consolas" pitchFamily="49" charset="0"/>
+              </a:rPr>
+              <a:t>i</a:t>
+            </a:r>
+            <a:r>
+              <a:rPr lang="en-US" sz="1400" dirty="0" smtClean="0">
+                <a:latin typeface="Consolas" pitchFamily="49" charset="0"/>
+                <a:cs typeface="Consolas" pitchFamily="49" charset="0"/>
+              </a:rPr>
+              <a:t>f ( saga::task::Failed == </a:t>
+            </a:r>
+            <a:r>
+              <a:rPr lang="en-US" sz="1400" dirty="0" err="1" smtClean="0">
+                <a:latin typeface="Consolas" pitchFamily="49" charset="0"/>
+                <a:cs typeface="Consolas" pitchFamily="49" charset="0"/>
+              </a:rPr>
+              <a:t>task.get_state</a:t>
+            </a:r>
+            <a:r>
+              <a:rPr lang="en-US" sz="1400" dirty="0" smtClean="0">
+                <a:latin typeface="Consolas" pitchFamily="49" charset="0"/>
+                <a:cs typeface="Consolas" pitchFamily="49" charset="0"/>
+              </a:rPr>
+              <a:t> () )</a:t>
+            </a:r>
+          </a:p>
+          <a:p>
+            <a:pPr marL="349250" lvl="1" indent="0">
+              <a:buNone/>
+            </a:pPr>
+            <a:r>
+              <a:rPr lang="en-US" sz="1400" dirty="0" smtClean="0">
+                <a:latin typeface="Consolas" pitchFamily="49" charset="0"/>
+                <a:cs typeface="Consolas" pitchFamily="49" charset="0"/>
+              </a:rPr>
+              <a:t>{</a:t>
+            </a:r>
+          </a:p>
+          <a:p>
+            <a:pPr marL="349250" lvl="1" indent="0">
+              <a:buNone/>
+            </a:pPr>
+            <a:r>
+              <a:rPr lang="en-US" sz="1400" dirty="0">
+                <a:latin typeface="Consolas" pitchFamily="49" charset="0"/>
+                <a:cs typeface="Consolas" pitchFamily="49" charset="0"/>
+              </a:rPr>
+              <a:t> </a:t>
+            </a:r>
+            <a:r>
+              <a:rPr lang="en-US" sz="1400" dirty="0" smtClean="0">
+                <a:latin typeface="Consolas" pitchFamily="49" charset="0"/>
+                <a:cs typeface="Consolas" pitchFamily="49" charset="0"/>
+              </a:rPr>
+              <a:t>   </a:t>
+            </a:r>
+            <a:r>
+              <a:rPr lang="en-US" sz="1400" dirty="0" err="1" smtClean="0">
+                <a:latin typeface="Consolas" pitchFamily="49" charset="0"/>
+                <a:cs typeface="Consolas" pitchFamily="49" charset="0"/>
+              </a:rPr>
+              <a:t>task.rethrow</a:t>
+            </a:r>
+            <a:r>
+              <a:rPr lang="en-US" sz="1400" dirty="0" smtClean="0">
+                <a:latin typeface="Consolas" pitchFamily="49" charset="0"/>
+                <a:cs typeface="Consolas" pitchFamily="49" charset="0"/>
+              </a:rPr>
+              <a:t> ();</a:t>
+            </a:r>
+          </a:p>
+          <a:p>
+            <a:pPr marL="349250" lvl="1" indent="0">
+              <a:buNone/>
+            </a:pPr>
+            <a:r>
+              <a:rPr lang="en-US" sz="1400" dirty="0">
+                <a:latin typeface="Consolas" pitchFamily="49" charset="0"/>
+                <a:cs typeface="Consolas" pitchFamily="49" charset="0"/>
+              </a:rPr>
+              <a:t>}</a:t>
+            </a:r>
+          </a:p>
+          <a:p>
+            <a:pPr lvl="1"/>
+            <a:endParaRPr lang="en-US" dirty="0"/>
+          </a:p>
+        </p:txBody>
+      </p:sp>
+    </p:spTree>
+    <p:extLst>
+      <p:ext uri="{BB962C8B-B14F-4D97-AF65-F5344CB8AC3E}">
+        <p14:creationId xmlns:p14="http://schemas.microsoft.com/office/powerpoint/2010/main" val="847814926"/>
+      </p:ext>
+    </p:extLst>
+  </p:cSld>
+  <p:clrMapOvr>
+    <a:masterClrMapping/>
+  </p:clrMapOvr>
+</p:sld>
+</file>
+
+<file path=ppt/slides/slide41.xml><?xml version="1.0" encoding="utf-8"?>
+<p:sld xmlns:a="http://schemas.openxmlformats.org/drawingml/2006/main" xmlns:r="http://schemas.openxmlformats.org/officeDocument/2006/relationships" xmlns:p="http://schemas.openxmlformats.org/presentationml/2006/main">
   <p:cSld>
     <p:spTree>
       <p:nvGrpSpPr>
@@ -15910,7 +16055,7 @@
     </p:spTree>
     <p:extLst>
       <p:ext uri="{BB962C8B-B14F-4D97-AF65-F5344CB8AC3E}">
-        <p14:creationId xmlns:p14="http://schemas.microsoft.com/office/powerpoint/2010/main" xmlns:p="http://schemas.openxmlformats.org/presentationml/2006/main" xmlns:r="http://schemas.openxmlformats.org/officeDocument/2006/relationships" xmlns:a="http://schemas.openxmlformats.org/drawingml/2006/main" xmlns="" val="2958372846"/>
+        <p14:creationId xmlns:p14="http://schemas.microsoft.com/office/powerpoint/2010/main" val="2958372846"/>
       </p:ext>
     </p:extLst>
   </p:cSld>
@@ -15920,8 +16065,8 @@
 </p:sld>
 </file>
 
-<file path=ppt/slides/slide41.xml><?xml version="1.0" encoding="utf-8"?>
-<p:sld xmlns:a="http://schemas.openxmlformats.org/drawingml/2006/main" xmlns:r="http://schemas.openxmlformats.org/officeDocument/2006/relationships" xmlns:mc="http://schemas.openxmlformats.org/markup-compatibility/2006" xmlns:mv="urn:schemas-microsoft-com:mac:vml" xmlns:p="http://schemas.openxmlformats.org/presentationml/2006/main" mc:Ignorable="mv" mc:PreserveAttributes="mv:*">
+<file path=ppt/slides/slide42.xml><?xml version="1.0" encoding="utf-8"?>
+<p:sld xmlns:a="http://schemas.openxmlformats.org/drawingml/2006/main" xmlns:r="http://schemas.openxmlformats.org/officeDocument/2006/relationships" xmlns:p="http://schemas.openxmlformats.org/presentationml/2006/main">
   <p:cSld>
     <p:spTree>
       <p:nvGrpSpPr>
@@ -16497,7 +16642,7 @@
     </p:spTree>
     <p:extLst>
       <p:ext uri="{BB962C8B-B14F-4D97-AF65-F5344CB8AC3E}">
-        <p14:creationId xmlns:p14="http://schemas.microsoft.com/office/powerpoint/2010/main" xmlns:p="http://schemas.openxmlformats.org/presentationml/2006/main" xmlns:r="http://schemas.openxmlformats.org/officeDocument/2006/relationships" xmlns:a="http://schemas.openxmlformats.org/drawingml/2006/main" xmlns="" val="2570867600"/>
+        <p14:creationId xmlns:p14="http://schemas.microsoft.com/office/powerpoint/2010/main" val="2570867600"/>
       </p:ext>
     </p:extLst>
   </p:cSld>
@@ -16507,8 +16652,8 @@
 </p:sld>
 </file>
 
-<file path=ppt/slides/slide42.xml><?xml version="1.0" encoding="utf-8"?>
-<p:sld xmlns:a="http://schemas.openxmlformats.org/drawingml/2006/main" xmlns:r="http://schemas.openxmlformats.org/officeDocument/2006/relationships" xmlns:mc="http://schemas.openxmlformats.org/markup-compatibility/2006" xmlns:mv="urn:schemas-microsoft-com:mac:vml" xmlns:p="http://schemas.openxmlformats.org/presentationml/2006/main" mc:Ignorable="mv" mc:PreserveAttributes="mv:*">
+<file path=ppt/slides/slide43.xml><?xml version="1.0" encoding="utf-8"?>
+<p:sld xmlns:a="http://schemas.openxmlformats.org/drawingml/2006/main" xmlns:r="http://schemas.openxmlformats.org/officeDocument/2006/relationships" xmlns:p="http://schemas.openxmlformats.org/presentationml/2006/main">
   <p:cSld>
     <p:spTree>
       <p:nvGrpSpPr>
@@ -16931,7 +17076,7 @@
     </p:spTree>
     <p:extLst>
       <p:ext uri="{BB962C8B-B14F-4D97-AF65-F5344CB8AC3E}">
-        <p14:creationId xmlns:p14="http://schemas.microsoft.com/office/powerpoint/2010/main" xmlns:p="http://schemas.openxmlformats.org/presentationml/2006/main" xmlns:r="http://schemas.openxmlformats.org/officeDocument/2006/relationships" xmlns:a="http://schemas.openxmlformats.org/drawingml/2006/main" xmlns="" val="2697782710"/>
+        <p14:creationId xmlns:p14="http://schemas.microsoft.com/office/powerpoint/2010/main" val="2697782710"/>
       </p:ext>
     </p:extLst>
   </p:cSld>
@@ -16941,8 +17086,8 @@
 </p:sld>
 </file>
 
-<file path=ppt/slides/slide43.xml><?xml version="1.0" encoding="utf-8"?>
-<p:sld xmlns:a="http://schemas.openxmlformats.org/drawingml/2006/main" xmlns:r="http://schemas.openxmlformats.org/officeDocument/2006/relationships" xmlns:mc="http://schemas.openxmlformats.org/markup-compatibility/2006" xmlns:mv="urn:schemas-microsoft-com:mac:vml" xmlns:p="http://schemas.openxmlformats.org/presentationml/2006/main" mc:Ignorable="mv" mc:PreserveAttributes="mv:*">
+<file path=ppt/slides/slide44.xml><?xml version="1.0" encoding="utf-8"?>
+<p:sld xmlns:a="http://schemas.openxmlformats.org/drawingml/2006/main" xmlns:r="http://schemas.openxmlformats.org/officeDocument/2006/relationships" xmlns:p="http://schemas.openxmlformats.org/presentationml/2006/main">
   <p:cSld>
     <p:spTree>
       <p:nvGrpSpPr>
@@ -17351,7 +17496,7 @@
     </p:spTree>
     <p:extLst>
       <p:ext uri="{BB962C8B-B14F-4D97-AF65-F5344CB8AC3E}">
-        <p14:creationId xmlns:p14="http://schemas.microsoft.com/office/powerpoint/2010/main" xmlns:p="http://schemas.openxmlformats.org/presentationml/2006/main" xmlns:r="http://schemas.openxmlformats.org/officeDocument/2006/relationships" xmlns:a="http://schemas.openxmlformats.org/drawingml/2006/main" xmlns="" val="3573218890"/>
+        <p14:creationId xmlns:p14="http://schemas.microsoft.com/office/powerpoint/2010/main" val="3573218890"/>
       </p:ext>
     </p:extLst>
   </p:cSld>
@@ -17362,7 +17507,7 @@
 </file>
 
 <file path=ppt/slides/slide5.xml><?xml version="1.0" encoding="utf-8"?>
-<p:sld xmlns:a="http://schemas.openxmlformats.org/drawingml/2006/main" xmlns:r="http://schemas.openxmlformats.org/officeDocument/2006/relationships" xmlns:mc="http://schemas.openxmlformats.org/markup-compatibility/2006" xmlns:mv="urn:schemas-microsoft-com:mac:vml" xmlns:p="http://schemas.openxmlformats.org/presentationml/2006/main" mc:Ignorable="mv" mc:PreserveAttributes="mv:*">
+<p:sld xmlns:a="http://schemas.openxmlformats.org/drawingml/2006/main" xmlns:r="http://schemas.openxmlformats.org/officeDocument/2006/relationships" xmlns:p="http://schemas.openxmlformats.org/presentationml/2006/main">
   <p:cSld>
     <p:spTree>
       <p:nvGrpSpPr>
@@ -17463,7 +17608,7 @@
 </file>
 
 <file path=ppt/slides/slide6.xml><?xml version="1.0" encoding="utf-8"?>
-<p:sld xmlns:a="http://schemas.openxmlformats.org/drawingml/2006/main" xmlns:r="http://schemas.openxmlformats.org/officeDocument/2006/relationships" xmlns:mc="http://schemas.openxmlformats.org/markup-compatibility/2006" xmlns:mv="urn:schemas-microsoft-com:mac:vml" xmlns:p="http://schemas.openxmlformats.org/presentationml/2006/main" mc:Ignorable="mv" mc:PreserveAttributes="mv:*">
+<p:sld xmlns:a="http://schemas.openxmlformats.org/drawingml/2006/main" xmlns:r="http://schemas.openxmlformats.org/officeDocument/2006/relationships" xmlns:p="http://schemas.openxmlformats.org/presentationml/2006/main">
   <p:cSld>
     <p:spTree>
       <p:nvGrpSpPr>
@@ -17880,7 +18025,7 @@
 </file>
 
 <file path=ppt/slides/slide7.xml><?xml version="1.0" encoding="utf-8"?>
-<p:sld xmlns:a="http://schemas.openxmlformats.org/drawingml/2006/main" xmlns:r="http://schemas.openxmlformats.org/officeDocument/2006/relationships" xmlns:mc="http://schemas.openxmlformats.org/markup-compatibility/2006" xmlns:mv="urn:schemas-microsoft-com:mac:vml" xmlns:p="http://schemas.openxmlformats.org/presentationml/2006/main" mc:Ignorable="mv" mc:PreserveAttributes="mv:*">
+<p:sld xmlns:a="http://schemas.openxmlformats.org/drawingml/2006/main" xmlns:r="http://schemas.openxmlformats.org/officeDocument/2006/relationships" xmlns:p="http://schemas.openxmlformats.org/presentationml/2006/main">
   <p:cSld>
     <p:spTree>
       <p:nvGrpSpPr>
@@ -18284,7 +18429,7 @@
 </file>
 
 <file path=ppt/slides/slide8.xml><?xml version="1.0" encoding="utf-8"?>
-<p:sld xmlns:a="http://schemas.openxmlformats.org/drawingml/2006/main" xmlns:r="http://schemas.openxmlformats.org/officeDocument/2006/relationships" xmlns:mc="http://schemas.openxmlformats.org/markup-compatibility/2006" xmlns:mv="urn:schemas-microsoft-com:mac:vml" xmlns:p="http://schemas.openxmlformats.org/presentationml/2006/main" mc:Ignorable="mv" mc:PreserveAttributes="mv:*">
+<p:sld xmlns:a="http://schemas.openxmlformats.org/drawingml/2006/main" xmlns:r="http://schemas.openxmlformats.org/officeDocument/2006/relationships" xmlns:p="http://schemas.openxmlformats.org/presentationml/2006/main">
   <p:cSld>
     <p:spTree>
       <p:nvGrpSpPr>
@@ -18390,7 +18535,7 @@
 </file>
 
 <file path=ppt/slides/slide9.xml><?xml version="1.0" encoding="utf-8"?>
-<p:sld xmlns:a="http://schemas.openxmlformats.org/drawingml/2006/main" xmlns:r="http://schemas.openxmlformats.org/officeDocument/2006/relationships" xmlns:mc="http://schemas.openxmlformats.org/markup-compatibility/2006" xmlns:mv="urn:schemas-microsoft-com:mac:vml" xmlns:p="http://schemas.openxmlformats.org/presentationml/2006/main" mc:Ignorable="mv" mc:PreserveAttributes="mv:*">
+<p:sld xmlns:a="http://schemas.openxmlformats.org/drawingml/2006/main" xmlns:r="http://schemas.openxmlformats.org/officeDocument/2006/relationships" xmlns:p="http://schemas.openxmlformats.org/presentationml/2006/main">
   <p:cSld>
     <p:bg>
       <p:bgRef idx="1001">

</xml_diff>

<commit_message>
Minor tweaks for Andre (who does not like his powerpoint, and his    powerpoint does not like him).
git-svn-id: file://localhost/tmp/svn2git/svn@3281 defb5e50-622e-49ec-a68e-d72c7db87b45
</commit_message>
<xml_diff>
--- a/tutorial/general_tutorial/API-Intro-short.pptx
+++ b/tutorial/general_tutorial/API-Intro-short.pptx
@@ -1,6 +1,6 @@
 
 <file path=ppt/presentation.xml><?xml version="1.0" encoding="utf-8"?>
-<p:presentation xmlns:a="http://schemas.openxmlformats.org/drawingml/2006/main" xmlns:r="http://schemas.openxmlformats.org/officeDocument/2006/relationships" xmlns:p="http://schemas.openxmlformats.org/presentationml/2006/main" saveSubsetFonts="1" autoCompressPictures="0">
+<p:presentation xmlns:a="http://schemas.openxmlformats.org/drawingml/2006/main" xmlns:r="http://schemas.openxmlformats.org/officeDocument/2006/relationships" xmlns:mc="http://schemas.openxmlformats.org/markup-compatibility/2006" xmlns:mv="urn:schemas-microsoft-com:mac:vml" xmlns:p="http://schemas.openxmlformats.org/presentationml/2006/main" mc:Ignorable="mv" mc:PreserveAttributes="mv:*" saveSubsetFonts="1" autoCompressPictures="0">
   <p:sldMasterIdLst>
     <p:sldMasterId id="2147483648" r:id="rId1"/>
   </p:sldMasterIdLst>
@@ -157,7 +157,7 @@
 </file>
 
 <file path=ppt/handoutMasters/handoutMaster1.xml><?xml version="1.0" encoding="utf-8"?>
-<p:handoutMaster xmlns:a="http://schemas.openxmlformats.org/drawingml/2006/main" xmlns:r="http://schemas.openxmlformats.org/officeDocument/2006/relationships" xmlns:p="http://schemas.openxmlformats.org/presentationml/2006/main">
+<p:handoutMaster xmlns:a="http://schemas.openxmlformats.org/drawingml/2006/main" xmlns:r="http://schemas.openxmlformats.org/officeDocument/2006/relationships" xmlns:mc="http://schemas.openxmlformats.org/markup-compatibility/2006" xmlns:mv="urn:schemas-microsoft-com:mac:vml" xmlns:p="http://schemas.openxmlformats.org/presentationml/2006/main" mc:Ignorable="mv" mc:PreserveAttributes="mv:*">
   <p:cSld>
     <p:bg>
       <p:bgRef idx="1001">
@@ -239,7 +239,7 @@
             <a:fld id="{9A6AC4B2-6F12-454D-8DA7-7B9C78843B81}" type="datetimeFigureOut">
               <a:rPr lang="en-US" smtClean="0"/>
               <a:pPr/>
-              <a:t>11/28/2010</a:t>
+              <a:t>11/29/10</a:t>
             </a:fld>
             <a:endParaRPr lang="en-US"/>
           </a:p>
@@ -315,7 +315,7 @@
     </p:spTree>
     <p:extLst>
       <p:ext uri="{BB962C8B-B14F-4D97-AF65-F5344CB8AC3E}">
-        <p14:creationId xmlns:p14="http://schemas.microsoft.com/office/powerpoint/2010/main" val="1850353593"/>
+        <p14:creationId xmlns:p14="http://schemas.microsoft.com/office/powerpoint/2010/main" xmlns:p="http://schemas.openxmlformats.org/presentationml/2006/main" xmlns:r="http://schemas.openxmlformats.org/officeDocument/2006/relationships" xmlns:a="http://schemas.openxmlformats.org/drawingml/2006/main" xmlns="" val="1850353593"/>
       </p:ext>
     </p:extLst>
   </p:cSld>
@@ -325,7 +325,7 @@
 </file>
 
 <file path=ppt/notesMasters/notesMaster1.xml><?xml version="1.0" encoding="utf-8"?>
-<p:notesMaster xmlns:a="http://schemas.openxmlformats.org/drawingml/2006/main" xmlns:r="http://schemas.openxmlformats.org/officeDocument/2006/relationships" xmlns:p="http://schemas.openxmlformats.org/presentationml/2006/main">
+<p:notesMaster xmlns:a="http://schemas.openxmlformats.org/drawingml/2006/main" xmlns:r="http://schemas.openxmlformats.org/officeDocument/2006/relationships" xmlns:mc="http://schemas.openxmlformats.org/markup-compatibility/2006" xmlns:mv="urn:schemas-microsoft-com:mac:vml" xmlns:p="http://schemas.openxmlformats.org/presentationml/2006/main" mc:Ignorable="mv" mc:PreserveAttributes="mv:*">
   <p:cSld>
     <p:bg>
       <p:bgRef idx="1001">
@@ -407,7 +407,7 @@
             <a:fld id="{19F24AD4-A78B-B645-8B43-825B1EB2901C}" type="datetimeFigureOut">
               <a:rPr lang="en-US" smtClean="0"/>
               <a:pPr/>
-              <a:t>11/28/2010</a:t>
+              <a:t>11/29/10</a:t>
             </a:fld>
             <a:endParaRPr lang="en-US"/>
           </a:p>
@@ -578,7 +578,7 @@
     </p:spTree>
     <p:extLst>
       <p:ext uri="{BB962C8B-B14F-4D97-AF65-F5344CB8AC3E}">
-        <p14:creationId xmlns:p14="http://schemas.microsoft.com/office/powerpoint/2010/main" val="1953130109"/>
+        <p14:creationId xmlns:p14="http://schemas.microsoft.com/office/powerpoint/2010/main" xmlns:p="http://schemas.openxmlformats.org/presentationml/2006/main" xmlns:r="http://schemas.openxmlformats.org/officeDocument/2006/relationships" xmlns:a="http://schemas.openxmlformats.org/drawingml/2006/main" xmlns="" val="1953130109"/>
       </p:ext>
     </p:extLst>
   </p:cSld>
@@ -680,7 +680,7 @@
 </file>
 
 <file path=ppt/notesSlides/notesSlide1.xml><?xml version="1.0" encoding="utf-8"?>
-<p:notes xmlns:a="http://schemas.openxmlformats.org/drawingml/2006/main" xmlns:r="http://schemas.openxmlformats.org/officeDocument/2006/relationships" xmlns:p="http://schemas.openxmlformats.org/presentationml/2006/main">
+<p:notes xmlns:a="http://schemas.openxmlformats.org/drawingml/2006/main" xmlns:r="http://schemas.openxmlformats.org/officeDocument/2006/relationships" xmlns:mc="http://schemas.openxmlformats.org/markup-compatibility/2006" xmlns:mv="urn:schemas-microsoft-com:mac:vml" xmlns:p="http://schemas.openxmlformats.org/presentationml/2006/main" mc:Ignorable="mv" mc:PreserveAttributes="mv:*">
   <p:cSld>
     <p:spTree>
       <p:nvGrpSpPr>
@@ -762,7 +762,7 @@
 </file>
 
 <file path=ppt/slideLayouts/slideLayout1.xml><?xml version="1.0" encoding="utf-8"?>
-<p:sldLayout xmlns:a="http://schemas.openxmlformats.org/drawingml/2006/main" xmlns:r="http://schemas.openxmlformats.org/officeDocument/2006/relationships" xmlns:p="http://schemas.openxmlformats.org/presentationml/2006/main" preserve="1" userDrawn="1">
+<p:sldLayout xmlns:a="http://schemas.openxmlformats.org/drawingml/2006/main" xmlns:r="http://schemas.openxmlformats.org/officeDocument/2006/relationships" xmlns:mc="http://schemas.openxmlformats.org/markup-compatibility/2006" xmlns:mv="urn:schemas-microsoft-com:mac:vml" xmlns:p="http://schemas.openxmlformats.org/presentationml/2006/main" mc:Ignorable="mv" mc:PreserveAttributes="mv:*" preserve="1" userDrawn="1">
   <p:cSld name="Title Slide">
     <p:spTree>
       <p:nvGrpSpPr>
@@ -948,7 +948,7 @@
             <a:fld id="{ADB8239A-D789-5443-937F-338E3AE3D41C}" type="datetime1">
               <a:rPr lang="en-US" smtClean="0"/>
               <a:pPr/>
-              <a:t>11/28/2010</a:t>
+              <a:t>11/29/10</a:t>
             </a:fld>
             <a:endParaRPr lang="en-US"/>
           </a:p>
@@ -987,7 +987,7 @@
 </file>
 
 <file path=ppt/slideLayouts/slideLayout10.xml><?xml version="1.0" encoding="utf-8"?>
-<p:sldLayout xmlns:a="http://schemas.openxmlformats.org/drawingml/2006/main" xmlns:r="http://schemas.openxmlformats.org/officeDocument/2006/relationships" xmlns:p="http://schemas.openxmlformats.org/presentationml/2006/main" type="picTx" preserve="1">
+<p:sldLayout xmlns:a="http://schemas.openxmlformats.org/drawingml/2006/main" xmlns:r="http://schemas.openxmlformats.org/officeDocument/2006/relationships" xmlns:mc="http://schemas.openxmlformats.org/markup-compatibility/2006" xmlns:mv="urn:schemas-microsoft-com:mac:vml" xmlns:p="http://schemas.openxmlformats.org/presentationml/2006/main" mc:Ignorable="mv" mc:PreserveAttributes="mv:*" type="picTx" preserve="1">
   <p:cSld name="Picture with Caption">
     <p:spTree>
       <p:nvGrpSpPr>
@@ -1252,7 +1252,7 @@
             <a:fld id="{459EC1CE-E98D-704D-AD6F-6E3323A36483}" type="datetime1">
               <a:rPr lang="en-US" smtClean="0"/>
               <a:pPr/>
-              <a:t>11/28/2010</a:t>
+              <a:t>11/29/10</a:t>
             </a:fld>
             <a:endParaRPr lang="en-US"/>
           </a:p>
@@ -1310,7 +1310,7 @@
 </file>
 
 <file path=ppt/slideLayouts/slideLayout11.xml><?xml version="1.0" encoding="utf-8"?>
-<p:sldLayout xmlns:a="http://schemas.openxmlformats.org/drawingml/2006/main" xmlns:r="http://schemas.openxmlformats.org/officeDocument/2006/relationships" xmlns:p="http://schemas.openxmlformats.org/presentationml/2006/main" preserve="1">
+<p:sldLayout xmlns:a="http://schemas.openxmlformats.org/drawingml/2006/main" xmlns:r="http://schemas.openxmlformats.org/officeDocument/2006/relationships" xmlns:mc="http://schemas.openxmlformats.org/markup-compatibility/2006" xmlns:mv="urn:schemas-microsoft-com:mac:vml" xmlns:p="http://schemas.openxmlformats.org/presentationml/2006/main" mc:Ignorable="mv" mc:PreserveAttributes="mv:*" preserve="1">
   <p:cSld name="Picture above Caption">
     <p:spTree>
       <p:nvGrpSpPr>
@@ -1528,7 +1528,7 @@
             <a:fld id="{23E692A5-8B3E-1949-B0CC-6F0593ACFA8E}" type="datetime1">
               <a:rPr lang="en-US" smtClean="0"/>
               <a:pPr/>
-              <a:t>11/28/2010</a:t>
+              <a:t>11/29/10</a:t>
             </a:fld>
             <a:endParaRPr lang="en-US"/>
           </a:p>
@@ -1597,7 +1597,7 @@
 </file>
 
 <file path=ppt/slideLayouts/slideLayout12.xml><?xml version="1.0" encoding="utf-8"?>
-<p:sldLayout xmlns:a="http://schemas.openxmlformats.org/drawingml/2006/main" xmlns:r="http://schemas.openxmlformats.org/officeDocument/2006/relationships" xmlns:p="http://schemas.openxmlformats.org/presentationml/2006/main" preserve="1">
+<p:sldLayout xmlns:a="http://schemas.openxmlformats.org/drawingml/2006/main" xmlns:r="http://schemas.openxmlformats.org/officeDocument/2006/relationships" xmlns:mc="http://schemas.openxmlformats.org/markup-compatibility/2006" xmlns:mv="urn:schemas-microsoft-com:mac:vml" xmlns:p="http://schemas.openxmlformats.org/presentationml/2006/main" mc:Ignorable="mv" mc:PreserveAttributes="mv:*" preserve="1">
   <p:cSld name="2 Pictures with Caption">
     <p:spTree>
       <p:nvGrpSpPr>
@@ -1820,7 +1820,7 @@
             <a:fld id="{C381DA14-A3C0-9C42-96F2-BEE3D5DE963D}" type="datetime1">
               <a:rPr lang="en-US" smtClean="0"/>
               <a:pPr/>
-              <a:t>11/28/2010</a:t>
+              <a:t>11/29/10</a:t>
             </a:fld>
             <a:endParaRPr lang="en-US"/>
           </a:p>
@@ -1924,7 +1924,7 @@
 </file>
 
 <file path=ppt/slideLayouts/slideLayout13.xml><?xml version="1.0" encoding="utf-8"?>
-<p:sldLayout xmlns:a="http://schemas.openxmlformats.org/drawingml/2006/main" xmlns:r="http://schemas.openxmlformats.org/officeDocument/2006/relationships" xmlns:p="http://schemas.openxmlformats.org/presentationml/2006/main" preserve="1">
+<p:sldLayout xmlns:a="http://schemas.openxmlformats.org/drawingml/2006/main" xmlns:r="http://schemas.openxmlformats.org/officeDocument/2006/relationships" xmlns:mc="http://schemas.openxmlformats.org/markup-compatibility/2006" xmlns:mv="urn:schemas-microsoft-com:mac:vml" xmlns:p="http://schemas.openxmlformats.org/presentationml/2006/main" mc:Ignorable="mv" mc:PreserveAttributes="mv:*" preserve="1">
   <p:cSld name="3 Pictures with Caption">
     <p:spTree>
       <p:nvGrpSpPr>
@@ -2147,7 +2147,7 @@
             <a:fld id="{33319320-9A5F-694B-B7B5-C734EC93AAA2}" type="datetime1">
               <a:rPr lang="en-US" smtClean="0"/>
               <a:pPr/>
-              <a:t>11/28/2010</a:t>
+              <a:t>11/29/10</a:t>
             </a:fld>
             <a:endParaRPr lang="en-US"/>
           </a:p>
@@ -2286,7 +2286,7 @@
 </file>
 
 <file path=ppt/slideLayouts/slideLayout14.xml><?xml version="1.0" encoding="utf-8"?>
-<p:sldLayout xmlns:a="http://schemas.openxmlformats.org/drawingml/2006/main" xmlns:r="http://schemas.openxmlformats.org/officeDocument/2006/relationships" xmlns:p="http://schemas.openxmlformats.org/presentationml/2006/main" type="vertTx" preserve="1">
+<p:sldLayout xmlns:a="http://schemas.openxmlformats.org/drawingml/2006/main" xmlns:r="http://schemas.openxmlformats.org/officeDocument/2006/relationships" xmlns:mc="http://schemas.openxmlformats.org/markup-compatibility/2006" xmlns:mv="urn:schemas-microsoft-com:mac:vml" xmlns:p="http://schemas.openxmlformats.org/presentationml/2006/main" mc:Ignorable="mv" mc:PreserveAttributes="mv:*" type="vertTx" preserve="1">
   <p:cSld name="Title and Vertical Text">
     <p:spTree>
       <p:nvGrpSpPr>
@@ -2395,7 +2395,7 @@
             <a:fld id="{CF6CE397-A6E6-7547-B24A-92BB5049E0F2}" type="datetime1">
               <a:rPr lang="en-US" smtClean="0"/>
               <a:pPr/>
-              <a:t>11/28/2010</a:t>
+              <a:t>11/29/10</a:t>
             </a:fld>
             <a:endParaRPr lang="en-US"/>
           </a:p>
@@ -2453,7 +2453,7 @@
 </file>
 
 <file path=ppt/slideLayouts/slideLayout15.xml><?xml version="1.0" encoding="utf-8"?>
-<p:sldLayout xmlns:a="http://schemas.openxmlformats.org/drawingml/2006/main" xmlns:r="http://schemas.openxmlformats.org/officeDocument/2006/relationships" xmlns:p="http://schemas.openxmlformats.org/presentationml/2006/main" type="vertTitleAndTx" preserve="1">
+<p:sldLayout xmlns:a="http://schemas.openxmlformats.org/drawingml/2006/main" xmlns:r="http://schemas.openxmlformats.org/officeDocument/2006/relationships" xmlns:mc="http://schemas.openxmlformats.org/markup-compatibility/2006" xmlns:mv="urn:schemas-microsoft-com:mac:vml" xmlns:p="http://schemas.openxmlformats.org/presentationml/2006/main" mc:Ignorable="mv" mc:PreserveAttributes="mv:*" type="vertTitleAndTx" preserve="1">
   <p:cSld name="Vertical Title and Text">
     <p:spTree>
       <p:nvGrpSpPr>
@@ -2572,7 +2572,7 @@
             <a:fld id="{27AB7D46-BD5E-E641-9118-DCE28F3B83FA}" type="datetime1">
               <a:rPr lang="en-US" smtClean="0"/>
               <a:pPr/>
-              <a:t>11/28/2010</a:t>
+              <a:t>11/29/10</a:t>
             </a:fld>
             <a:endParaRPr lang="en-US"/>
           </a:p>
@@ -2630,7 +2630,7 @@
 </file>
 
 <file path=ppt/slideLayouts/slideLayout2.xml><?xml version="1.0" encoding="utf-8"?>
-<p:sldLayout xmlns:a="http://schemas.openxmlformats.org/drawingml/2006/main" xmlns:r="http://schemas.openxmlformats.org/officeDocument/2006/relationships" xmlns:p="http://schemas.openxmlformats.org/presentationml/2006/main" type="obj" preserve="1">
+<p:sldLayout xmlns:a="http://schemas.openxmlformats.org/drawingml/2006/main" xmlns:r="http://schemas.openxmlformats.org/officeDocument/2006/relationships" xmlns:mc="http://schemas.openxmlformats.org/markup-compatibility/2006" xmlns:mv="urn:schemas-microsoft-com:mac:vml" xmlns:p="http://schemas.openxmlformats.org/presentationml/2006/main" mc:Ignorable="mv" mc:PreserveAttributes="mv:*" type="obj" preserve="1">
   <p:cSld name="Title and Content">
     <p:spTree>
       <p:nvGrpSpPr>
@@ -2824,7 +2824,7 @@
             <a:fld id="{BC26097E-015C-3B4D-86C1-CD2AD30F0B81}" type="datetime1">
               <a:rPr lang="en-US" smtClean="0"/>
               <a:pPr/>
-              <a:t>11/28/2010</a:t>
+              <a:t>11/29/10</a:t>
             </a:fld>
             <a:endParaRPr lang="en-US"/>
           </a:p>
@@ -2887,7 +2887,7 @@
 </file>
 
 <file path=ppt/slideLayouts/slideLayout3.xml><?xml version="1.0" encoding="utf-8"?>
-<p:sldLayout xmlns:a="http://schemas.openxmlformats.org/drawingml/2006/main" xmlns:r="http://schemas.openxmlformats.org/officeDocument/2006/relationships" xmlns:p="http://schemas.openxmlformats.org/presentationml/2006/main" preserve="1">
+<p:sldLayout xmlns:a="http://schemas.openxmlformats.org/drawingml/2006/main" xmlns:r="http://schemas.openxmlformats.org/officeDocument/2006/relationships" xmlns:mc="http://schemas.openxmlformats.org/markup-compatibility/2006" xmlns:mv="urn:schemas-microsoft-com:mac:vml" xmlns:p="http://schemas.openxmlformats.org/presentationml/2006/main" mc:Ignorable="mv" mc:PreserveAttributes="mv:*" preserve="1">
   <p:cSld name="Title Slide with Picture">
     <p:spTree>
       <p:nvGrpSpPr>
@@ -3100,7 +3100,7 @@
             <a:fld id="{ED6649F4-2545-3040-B7BD-803CA59D50C7}" type="datetime1">
               <a:rPr lang="en-US" smtClean="0"/>
               <a:pPr/>
-              <a:t>11/28/2010</a:t>
+              <a:t>11/29/10</a:t>
             </a:fld>
             <a:endParaRPr lang="en-US"/>
           </a:p>
@@ -3169,7 +3169,7 @@
 </file>
 
 <file path=ppt/slideLayouts/slideLayout4.xml><?xml version="1.0" encoding="utf-8"?>
-<p:sldLayout xmlns:a="http://schemas.openxmlformats.org/drawingml/2006/main" xmlns:r="http://schemas.openxmlformats.org/officeDocument/2006/relationships" xmlns:p="http://schemas.openxmlformats.org/presentationml/2006/main" type="secHead" preserve="1">
+<p:sldLayout xmlns:a="http://schemas.openxmlformats.org/drawingml/2006/main" xmlns:r="http://schemas.openxmlformats.org/officeDocument/2006/relationships" xmlns:mc="http://schemas.openxmlformats.org/markup-compatibility/2006" xmlns:mv="urn:schemas-microsoft-com:mac:vml" xmlns:p="http://schemas.openxmlformats.org/presentationml/2006/main" mc:Ignorable="mv" mc:PreserveAttributes="mv:*" type="secHead" preserve="1">
   <p:cSld name="Section Header">
     <p:spTree>
       <p:nvGrpSpPr>
@@ -3408,7 +3408,7 @@
             <a:fld id="{833A9088-CEDD-2F48-A9A0-611A3CC03FE9}" type="datetime1">
               <a:rPr lang="en-US" smtClean="0"/>
               <a:pPr/>
-              <a:t>11/28/2010</a:t>
+              <a:t>11/29/10</a:t>
             </a:fld>
             <a:endParaRPr lang="en-US"/>
           </a:p>
@@ -3466,7 +3466,7 @@
 </file>
 
 <file path=ppt/slideLayouts/slideLayout5.xml><?xml version="1.0" encoding="utf-8"?>
-<p:sldLayout xmlns:a="http://schemas.openxmlformats.org/drawingml/2006/main" xmlns:r="http://schemas.openxmlformats.org/officeDocument/2006/relationships" xmlns:p="http://schemas.openxmlformats.org/presentationml/2006/main" type="twoObj" preserve="1">
+<p:sldLayout xmlns:a="http://schemas.openxmlformats.org/drawingml/2006/main" xmlns:r="http://schemas.openxmlformats.org/officeDocument/2006/relationships" xmlns:mc="http://schemas.openxmlformats.org/markup-compatibility/2006" xmlns:mv="urn:schemas-microsoft-com:mac:vml" xmlns:p="http://schemas.openxmlformats.org/presentationml/2006/main" mc:Ignorable="mv" mc:PreserveAttributes="mv:*" type="twoObj" preserve="1">
   <p:cSld name="Two Content">
     <p:spTree>
       <p:nvGrpSpPr>
@@ -3702,7 +3702,7 @@
             <a:fld id="{AED87ACF-EB3C-EA42-8610-542FB50388EB}" type="datetime1">
               <a:rPr lang="en-US" smtClean="0"/>
               <a:pPr/>
-              <a:t>11/28/2010</a:t>
+              <a:t>11/29/10</a:t>
             </a:fld>
             <a:endParaRPr lang="en-US"/>
           </a:p>
@@ -3760,7 +3760,7 @@
 </file>
 
 <file path=ppt/slideLayouts/slideLayout6.xml><?xml version="1.0" encoding="utf-8"?>
-<p:sldLayout xmlns:a="http://schemas.openxmlformats.org/drawingml/2006/main" xmlns:r="http://schemas.openxmlformats.org/officeDocument/2006/relationships" xmlns:p="http://schemas.openxmlformats.org/presentationml/2006/main" type="twoTxTwoObj" preserve="1">
+<p:sldLayout xmlns:a="http://schemas.openxmlformats.org/drawingml/2006/main" xmlns:r="http://schemas.openxmlformats.org/officeDocument/2006/relationships" xmlns:mc="http://schemas.openxmlformats.org/markup-compatibility/2006" xmlns:mv="urn:schemas-microsoft-com:mac:vml" xmlns:p="http://schemas.openxmlformats.org/presentationml/2006/main" mc:Ignorable="mv" mc:PreserveAttributes="mv:*" type="twoTxTwoObj" preserve="1">
   <p:cSld name="Comparison">
     <p:spTree>
       <p:nvGrpSpPr>
@@ -4134,7 +4134,7 @@
             <a:fld id="{0E0DC31B-692F-774E-A937-DA560DE61DA8}" type="datetime1">
               <a:rPr lang="en-US" smtClean="0"/>
               <a:pPr/>
-              <a:t>11/28/2010</a:t>
+              <a:t>11/29/10</a:t>
             </a:fld>
             <a:endParaRPr lang="en-US"/>
           </a:p>
@@ -4425,7 +4425,7 @@
 </file>
 
 <file path=ppt/slideLayouts/slideLayout7.xml><?xml version="1.0" encoding="utf-8"?>
-<p:sldLayout xmlns:a="http://schemas.openxmlformats.org/drawingml/2006/main" xmlns:r="http://schemas.openxmlformats.org/officeDocument/2006/relationships" xmlns:p="http://schemas.openxmlformats.org/presentationml/2006/main" type="titleOnly" preserve="1">
+<p:sldLayout xmlns:a="http://schemas.openxmlformats.org/drawingml/2006/main" xmlns:r="http://schemas.openxmlformats.org/officeDocument/2006/relationships" xmlns:mc="http://schemas.openxmlformats.org/markup-compatibility/2006" xmlns:mv="urn:schemas-microsoft-com:mac:vml" xmlns:p="http://schemas.openxmlformats.org/presentationml/2006/main" mc:Ignorable="mv" mc:PreserveAttributes="mv:*" type="titleOnly" preserve="1">
   <p:cSld name="Title Only">
     <p:spTree>
       <p:nvGrpSpPr>
@@ -4482,7 +4482,7 @@
             <a:fld id="{95DEFDAE-5BDC-1B4F-BC4C-23C867CEBC21}" type="datetime1">
               <a:rPr lang="en-US" smtClean="0"/>
               <a:pPr/>
-              <a:t>11/28/2010</a:t>
+              <a:t>11/29/10</a:t>
             </a:fld>
             <a:endParaRPr lang="en-US"/>
           </a:p>
@@ -4540,7 +4540,7 @@
 </file>
 
 <file path=ppt/slideLayouts/slideLayout8.xml><?xml version="1.0" encoding="utf-8"?>
-<p:sldLayout xmlns:a="http://schemas.openxmlformats.org/drawingml/2006/main" xmlns:r="http://schemas.openxmlformats.org/officeDocument/2006/relationships" xmlns:p="http://schemas.openxmlformats.org/presentationml/2006/main" type="blank" preserve="1">
+<p:sldLayout xmlns:a="http://schemas.openxmlformats.org/drawingml/2006/main" xmlns:r="http://schemas.openxmlformats.org/officeDocument/2006/relationships" xmlns:mc="http://schemas.openxmlformats.org/markup-compatibility/2006" xmlns:mv="urn:schemas-microsoft-com:mac:vml" xmlns:p="http://schemas.openxmlformats.org/presentationml/2006/main" mc:Ignorable="mv" mc:PreserveAttributes="mv:*" type="blank" preserve="1">
   <p:cSld name="Blank">
     <p:spTree>
       <p:nvGrpSpPr>
@@ -4574,7 +4574,7 @@
             <a:fld id="{9F53C516-787B-9A45-AFCF-5D75DD78DEBE}" type="datetime1">
               <a:rPr lang="en-US" smtClean="0"/>
               <a:pPr/>
-              <a:t>11/28/2010</a:t>
+              <a:t>11/29/10</a:t>
             </a:fld>
             <a:endParaRPr lang="en-US"/>
           </a:p>
@@ -4632,7 +4632,7 @@
 </file>
 
 <file path=ppt/slideLayouts/slideLayout9.xml><?xml version="1.0" encoding="utf-8"?>
-<p:sldLayout xmlns:a="http://schemas.openxmlformats.org/drawingml/2006/main" xmlns:r="http://schemas.openxmlformats.org/officeDocument/2006/relationships" xmlns:p="http://schemas.openxmlformats.org/presentationml/2006/main" type="objTx" preserve="1">
+<p:sldLayout xmlns:a="http://schemas.openxmlformats.org/drawingml/2006/main" xmlns:r="http://schemas.openxmlformats.org/officeDocument/2006/relationships" xmlns:mc="http://schemas.openxmlformats.org/markup-compatibility/2006" xmlns:mv="urn:schemas-microsoft-com:mac:vml" xmlns:p="http://schemas.openxmlformats.org/presentationml/2006/main" mc:Ignorable="mv" mc:PreserveAttributes="mv:*" type="objTx" preserve="1">
   <p:cSld name="Content with Caption">
     <p:spTree>
       <p:nvGrpSpPr>
@@ -4913,7 +4913,7 @@
             <a:fld id="{F19CAA94-9393-BB4A-8CB6-008B1351A132}" type="datetime1">
               <a:rPr lang="en-US" smtClean="0"/>
               <a:pPr/>
-              <a:t>11/28/2010</a:t>
+              <a:t>11/29/10</a:t>
             </a:fld>
             <a:endParaRPr lang="en-US"/>
           </a:p>
@@ -4971,7 +4971,7 @@
 </file>
 
 <file path=ppt/slideMasters/slideMaster1.xml><?xml version="1.0" encoding="utf-8"?>
-<p:sldMaster xmlns:a="http://schemas.openxmlformats.org/drawingml/2006/main" xmlns:r="http://schemas.openxmlformats.org/officeDocument/2006/relationships" xmlns:p="http://schemas.openxmlformats.org/presentationml/2006/main">
+<p:sldMaster xmlns:a="http://schemas.openxmlformats.org/drawingml/2006/main" xmlns:r="http://schemas.openxmlformats.org/officeDocument/2006/relationships" xmlns:mc="http://schemas.openxmlformats.org/markup-compatibility/2006" xmlns:mv="urn:schemas-microsoft-com:mac:vml" xmlns:p="http://schemas.openxmlformats.org/presentationml/2006/main" mc:Ignorable="mv" mc:PreserveAttributes="mv:*">
   <p:cSld>
     <p:bg>
       <p:bgRef idx="1001">
@@ -5127,7 +5127,7 @@
             <a:fld id="{A3476A5E-2ED6-7749-A8C1-D0B1EEEB97E0}" type="datetime1">
               <a:rPr lang="en-US" smtClean="0"/>
               <a:pPr/>
-              <a:t>11/28/2010</a:t>
+              <a:t>11/29/10</a:t>
             </a:fld>
             <a:endParaRPr lang="en-US"/>
           </a:p>
@@ -5621,7 +5621,7 @@
 </file>
 
 <file path=ppt/slides/slide1.xml><?xml version="1.0" encoding="utf-8"?>
-<p:sld xmlns:a="http://schemas.openxmlformats.org/drawingml/2006/main" xmlns:r="http://schemas.openxmlformats.org/officeDocument/2006/relationships" xmlns:p="http://schemas.openxmlformats.org/presentationml/2006/main">
+<p:sld xmlns:a="http://schemas.openxmlformats.org/drawingml/2006/main" xmlns:r="http://schemas.openxmlformats.org/officeDocument/2006/relationships" xmlns:mc="http://schemas.openxmlformats.org/markup-compatibility/2006" xmlns:mv="urn:schemas-microsoft-com:mac:vml" xmlns:p="http://schemas.openxmlformats.org/presentationml/2006/main" mc:Ignorable="mv" mc:PreserveAttributes="mv:*">
   <p:cSld>
     <p:spTree>
       <p:nvGrpSpPr>
@@ -5770,7 +5770,7 @@
 </file>
 
 <file path=ppt/slides/slide10.xml><?xml version="1.0" encoding="utf-8"?>
-<p:sld xmlns:a="http://schemas.openxmlformats.org/drawingml/2006/main" xmlns:r="http://schemas.openxmlformats.org/officeDocument/2006/relationships" xmlns:p="http://schemas.openxmlformats.org/presentationml/2006/main">
+<p:sld xmlns:a="http://schemas.openxmlformats.org/drawingml/2006/main" xmlns:r="http://schemas.openxmlformats.org/officeDocument/2006/relationships" xmlns:mc="http://schemas.openxmlformats.org/markup-compatibility/2006" xmlns:mv="urn:schemas-microsoft-com:mac:vml" xmlns:p="http://schemas.openxmlformats.org/presentationml/2006/main" mc:Ignorable="mv" mc:PreserveAttributes="mv:*">
   <p:cSld>
     <p:spTree>
       <p:nvGrpSpPr>
@@ -5819,8 +5819,8 @@
             <p:ph idx="1"/>
           </p:nvPr>
         </p:nvPicPr>
-        <mc:AlternateContent xmlns:mc="http://schemas.openxmlformats.org/markup-compatibility/2006">
-          <mc:Choice xmlns="" xmlns:mv="urn:schemas-microsoft-com:mac:vml" xmlns:ma="http://schemas.microsoft.com/office/mac/drawingml/2008/main" Requires="ma">
+        <mc:AlternateContent xmlns:ma="http://schemas.microsoft.com/office/mac/drawingml/2008/main">
+          <mc:Choice Requires="ma">
             <p:blipFill>
               <a:blip r:embed="rId2"/>
               <a:stretch>
@@ -5828,7 +5828,7 @@
               </a:stretch>
             </p:blipFill>
           </mc:Choice>
-          <mc:Fallback>
+          <mc:Fallback xmlns:mc="http://schemas.openxmlformats.org/markup-compatibility/2006" xmlns:p="http://schemas.openxmlformats.org/presentationml/2006/main" xmlns:r="http://schemas.openxmlformats.org/officeDocument/2006/relationships" xmlns:a="http://schemas.openxmlformats.org/drawingml/2006/main" xmlns="">
             <p:blipFill>
               <a:blip r:embed="rId3"/>
               <a:stretch>
@@ -5853,7 +5853,7 @@
 </file>
 
 <file path=ppt/slides/slide11.xml><?xml version="1.0" encoding="utf-8"?>
-<p:sld xmlns:a="http://schemas.openxmlformats.org/drawingml/2006/main" xmlns:r="http://schemas.openxmlformats.org/officeDocument/2006/relationships" xmlns:p="http://schemas.openxmlformats.org/presentationml/2006/main">
+<p:sld xmlns:a="http://schemas.openxmlformats.org/drawingml/2006/main" xmlns:r="http://schemas.openxmlformats.org/officeDocument/2006/relationships" xmlns:mc="http://schemas.openxmlformats.org/markup-compatibility/2006" xmlns:mv="urn:schemas-microsoft-com:mac:vml" xmlns:p="http://schemas.openxmlformats.org/presentationml/2006/main" mc:Ignorable="mv" mc:PreserveAttributes="mv:*">
   <p:cSld>
     <p:spTree>
       <p:nvGrpSpPr>
@@ -5917,7 +5917,7 @@
     </p:spTree>
     <p:extLst>
       <p:ext uri="{BB962C8B-B14F-4D97-AF65-F5344CB8AC3E}">
-        <p14:creationId xmlns:p14="http://schemas.microsoft.com/office/powerpoint/2010/main" val="738217468"/>
+        <p14:creationId xmlns:p14="http://schemas.microsoft.com/office/powerpoint/2010/main" xmlns:p="http://schemas.openxmlformats.org/presentationml/2006/main" xmlns:r="http://schemas.openxmlformats.org/officeDocument/2006/relationships" xmlns:a="http://schemas.openxmlformats.org/drawingml/2006/main" xmlns="" val="738217468"/>
       </p:ext>
     </p:extLst>
   </p:cSld>
@@ -5928,7 +5928,7 @@
 </file>
 
 <file path=ppt/slides/slide12.xml><?xml version="1.0" encoding="utf-8"?>
-<p:sld xmlns:a="http://schemas.openxmlformats.org/drawingml/2006/main" xmlns:r="http://schemas.openxmlformats.org/officeDocument/2006/relationships" xmlns:p="http://schemas.openxmlformats.org/presentationml/2006/main">
+<p:sld xmlns:a="http://schemas.openxmlformats.org/drawingml/2006/main" xmlns:r="http://schemas.openxmlformats.org/officeDocument/2006/relationships" xmlns:mc="http://schemas.openxmlformats.org/markup-compatibility/2006" xmlns:mv="urn:schemas-microsoft-com:mac:vml" xmlns:p="http://schemas.openxmlformats.org/presentationml/2006/main" mc:Ignorable="mv" mc:PreserveAttributes="mv:*">
   <p:cSld>
     <p:spTree>
       <p:nvGrpSpPr>
@@ -5977,8 +5977,8 @@
             <p:ph idx="1"/>
           </p:nvPr>
         </p:nvPicPr>
-        <mc:AlternateContent xmlns:mc="http://schemas.openxmlformats.org/markup-compatibility/2006">
-          <mc:Choice xmlns="" xmlns:mv="urn:schemas-microsoft-com:mac:vml" xmlns:ma="http://schemas.microsoft.com/office/mac/drawingml/2008/main" Requires="ma">
+        <mc:AlternateContent xmlns:ma="http://schemas.microsoft.com/office/mac/drawingml/2008/main">
+          <mc:Choice Requires="ma">
             <p:blipFill>
               <a:blip r:embed="rId2"/>
               <a:stretch>
@@ -5986,7 +5986,7 @@
               </a:stretch>
             </p:blipFill>
           </mc:Choice>
-          <mc:Fallback>
+          <mc:Fallback xmlns:mc="http://schemas.openxmlformats.org/markup-compatibility/2006" xmlns:p="http://schemas.openxmlformats.org/presentationml/2006/main" xmlns:r="http://schemas.openxmlformats.org/officeDocument/2006/relationships" xmlns:a="http://schemas.openxmlformats.org/drawingml/2006/main" xmlns="">
             <p:blipFill>
               <a:blip r:embed="rId3"/>
               <a:stretch>
@@ -6011,7 +6011,7 @@
 </file>
 
 <file path=ppt/slides/slide13.xml><?xml version="1.0" encoding="utf-8"?>
-<p:sld xmlns:a="http://schemas.openxmlformats.org/drawingml/2006/main" xmlns:r="http://schemas.openxmlformats.org/officeDocument/2006/relationships" xmlns:p="http://schemas.openxmlformats.org/presentationml/2006/main">
+<p:sld xmlns:a="http://schemas.openxmlformats.org/drawingml/2006/main" xmlns:r="http://schemas.openxmlformats.org/officeDocument/2006/relationships" xmlns:mc="http://schemas.openxmlformats.org/markup-compatibility/2006" xmlns:mv="urn:schemas-microsoft-com:mac:vml" xmlns:p="http://schemas.openxmlformats.org/presentationml/2006/main" mc:Ignorable="mv" mc:PreserveAttributes="mv:*">
   <p:cSld>
     <p:spTree>
       <p:nvGrpSpPr>
@@ -6082,7 +6082,7 @@
 </file>
 
 <file path=ppt/slides/slide14.xml><?xml version="1.0" encoding="utf-8"?>
-<p:sld xmlns:a="http://schemas.openxmlformats.org/drawingml/2006/main" xmlns:r="http://schemas.openxmlformats.org/officeDocument/2006/relationships" xmlns:p="http://schemas.openxmlformats.org/presentationml/2006/main">
+<p:sld xmlns:a="http://schemas.openxmlformats.org/drawingml/2006/main" xmlns:r="http://schemas.openxmlformats.org/officeDocument/2006/relationships" xmlns:mc="http://schemas.openxmlformats.org/markup-compatibility/2006" xmlns:mv="urn:schemas-microsoft-com:mac:vml" xmlns:p="http://schemas.openxmlformats.org/presentationml/2006/main" mc:Ignorable="mv" mc:PreserveAttributes="mv:*">
   <p:cSld>
     <p:spTree>
       <p:nvGrpSpPr>
@@ -6119,11 +6119,7 @@
             </a:r>
             <a:r>
               <a:rPr lang="en-US" dirty="0" smtClean="0"/>
-              <a:t>Package</a:t>
-            </a:r>
-            <a:r>
-              <a:rPr lang="en-US" dirty="0" smtClean="0"/>
-              <a:t>: Overview</a:t>
+              <a:t>Package: Overview</a:t>
             </a:r>
             <a:endParaRPr lang="en-US" dirty="0"/>
           </a:p>
@@ -6229,7 +6225,7 @@
     </p:spTree>
     <p:extLst>
       <p:ext uri="{BB962C8B-B14F-4D97-AF65-F5344CB8AC3E}">
-        <p14:creationId xmlns:p14="http://schemas.microsoft.com/office/powerpoint/2010/main" val="2862049404"/>
+        <p14:creationId xmlns:p14="http://schemas.microsoft.com/office/powerpoint/2010/main" xmlns:p="http://schemas.openxmlformats.org/presentationml/2006/main" xmlns:r="http://schemas.openxmlformats.org/officeDocument/2006/relationships" xmlns:a="http://schemas.openxmlformats.org/drawingml/2006/main" xmlns="" val="2862049404"/>
       </p:ext>
     </p:extLst>
   </p:cSld>
@@ -6240,7 +6236,7 @@
 </file>
 
 <file path=ppt/slides/slide15.xml><?xml version="1.0" encoding="utf-8"?>
-<p:sld xmlns:a="http://schemas.openxmlformats.org/drawingml/2006/main" xmlns:r="http://schemas.openxmlformats.org/officeDocument/2006/relationships" xmlns:p="http://schemas.openxmlformats.org/presentationml/2006/main">
+<p:sld xmlns:a="http://schemas.openxmlformats.org/drawingml/2006/main" xmlns:r="http://schemas.openxmlformats.org/officeDocument/2006/relationships" xmlns:mc="http://schemas.openxmlformats.org/markup-compatibility/2006" xmlns:mv="urn:schemas-microsoft-com:mac:vml" xmlns:p="http://schemas.openxmlformats.org/presentationml/2006/main" mc:Ignorable="mv" mc:PreserveAttributes="mv:*">
   <p:cSld>
     <p:spTree>
       <p:nvGrpSpPr>
@@ -6711,7 +6707,7 @@
 </file>
 
 <file path=ppt/slides/slide16.xml><?xml version="1.0" encoding="utf-8"?>
-<p:sld xmlns:a="http://schemas.openxmlformats.org/drawingml/2006/main" xmlns:r="http://schemas.openxmlformats.org/officeDocument/2006/relationships" xmlns:p="http://schemas.openxmlformats.org/presentationml/2006/main">
+<p:sld xmlns:a="http://schemas.openxmlformats.org/drawingml/2006/main" xmlns:r="http://schemas.openxmlformats.org/officeDocument/2006/relationships" xmlns:mc="http://schemas.openxmlformats.org/markup-compatibility/2006" xmlns:mv="urn:schemas-microsoft-com:mac:vml" xmlns:p="http://schemas.openxmlformats.org/presentationml/2006/main" mc:Ignorable="mv" mc:PreserveAttributes="mv:*">
   <p:cSld>
     <p:spTree>
       <p:nvGrpSpPr>
@@ -6764,7 +6760,7 @@
           <a:blip r:embed="rId2">
             <a:extLst>
               <a:ext uri="{28A0092B-C50C-407E-A947-70E740481C1C}">
-                <a14:useLocalDpi xmlns:a14="http://schemas.microsoft.com/office/drawing/2010/main" val="0"/>
+                <a14:useLocalDpi xmlns:a14="http://schemas.microsoft.com/office/drawing/2010/main" xmlns:p="http://schemas.openxmlformats.org/presentationml/2006/main" xmlns:r="http://schemas.openxmlformats.org/officeDocument/2006/relationships" xmlns:a="http://schemas.openxmlformats.org/drawingml/2006/main" xmlns="" val="0"/>
               </a:ext>
             </a:extLst>
           </a:blip>
@@ -6782,7 +6778,7 @@
     </p:spTree>
     <p:extLst>
       <p:ext uri="{BB962C8B-B14F-4D97-AF65-F5344CB8AC3E}">
-        <p14:creationId xmlns:p14="http://schemas.microsoft.com/office/powerpoint/2010/main" val="3604452974"/>
+        <p14:creationId xmlns:p14="http://schemas.microsoft.com/office/powerpoint/2010/main" xmlns:p="http://schemas.openxmlformats.org/presentationml/2006/main" xmlns:r="http://schemas.openxmlformats.org/officeDocument/2006/relationships" xmlns:a="http://schemas.openxmlformats.org/drawingml/2006/main" xmlns="" val="3604452974"/>
       </p:ext>
     </p:extLst>
   </p:cSld>
@@ -6800,7 +6796,7 @@
 </file>
 
 <file path=ppt/slides/slide17.xml><?xml version="1.0" encoding="utf-8"?>
-<p:sld xmlns:a="http://schemas.openxmlformats.org/drawingml/2006/main" xmlns:r="http://schemas.openxmlformats.org/officeDocument/2006/relationships" xmlns:p="http://schemas.openxmlformats.org/presentationml/2006/main">
+<p:sld xmlns:a="http://schemas.openxmlformats.org/drawingml/2006/main" xmlns:r="http://schemas.openxmlformats.org/officeDocument/2006/relationships" xmlns:mc="http://schemas.openxmlformats.org/markup-compatibility/2006" xmlns:mv="urn:schemas-microsoft-com:mac:vml" xmlns:p="http://schemas.openxmlformats.org/presentationml/2006/main" mc:Ignorable="mv" mc:PreserveAttributes="mv:*">
   <p:cSld>
     <p:spTree>
       <p:nvGrpSpPr>
@@ -7161,7 +7157,7 @@
     </p:spTree>
     <p:extLst>
       <p:ext uri="{BB962C8B-B14F-4D97-AF65-F5344CB8AC3E}">
-        <p14:creationId xmlns:p14="http://schemas.microsoft.com/office/powerpoint/2010/main" val="249318202"/>
+        <p14:creationId xmlns:p14="http://schemas.microsoft.com/office/powerpoint/2010/main" xmlns:p="http://schemas.openxmlformats.org/presentationml/2006/main" xmlns:r="http://schemas.openxmlformats.org/officeDocument/2006/relationships" xmlns:a="http://schemas.openxmlformats.org/drawingml/2006/main" xmlns="" val="249318202"/>
       </p:ext>
     </p:extLst>
   </p:cSld>
@@ -7179,7 +7175,7 @@
 </file>
 
 <file path=ppt/slides/slide18.xml><?xml version="1.0" encoding="utf-8"?>
-<p:sld xmlns:a="http://schemas.openxmlformats.org/drawingml/2006/main" xmlns:r="http://schemas.openxmlformats.org/officeDocument/2006/relationships" xmlns:p="http://schemas.openxmlformats.org/presentationml/2006/main">
+<p:sld xmlns:a="http://schemas.openxmlformats.org/drawingml/2006/main" xmlns:r="http://schemas.openxmlformats.org/officeDocument/2006/relationships" xmlns:mc="http://schemas.openxmlformats.org/markup-compatibility/2006" xmlns:mv="urn:schemas-microsoft-com:mac:vml" xmlns:p="http://schemas.openxmlformats.org/presentationml/2006/main" mc:Ignorable="mv" mc:PreserveAttributes="mv:*">
   <p:cSld>
     <p:spTree>
       <p:nvGrpSpPr>
@@ -7613,7 +7609,7 @@
     </p:spTree>
     <p:extLst>
       <p:ext uri="{BB962C8B-B14F-4D97-AF65-F5344CB8AC3E}">
-        <p14:creationId xmlns:p14="http://schemas.microsoft.com/office/powerpoint/2010/main" val="2506735757"/>
+        <p14:creationId xmlns:p14="http://schemas.microsoft.com/office/powerpoint/2010/main" xmlns:p="http://schemas.openxmlformats.org/presentationml/2006/main" xmlns:r="http://schemas.openxmlformats.org/officeDocument/2006/relationships" xmlns:a="http://schemas.openxmlformats.org/drawingml/2006/main" xmlns="" val="2506735757"/>
       </p:ext>
     </p:extLst>
   </p:cSld>
@@ -7631,7 +7627,7 @@
 </file>
 
 <file path=ppt/slides/slide19.xml><?xml version="1.0" encoding="utf-8"?>
-<p:sld xmlns:a="http://schemas.openxmlformats.org/drawingml/2006/main" xmlns:r="http://schemas.openxmlformats.org/officeDocument/2006/relationships" xmlns:p="http://schemas.openxmlformats.org/presentationml/2006/main">
+<p:sld xmlns:a="http://schemas.openxmlformats.org/drawingml/2006/main" xmlns:r="http://schemas.openxmlformats.org/officeDocument/2006/relationships" xmlns:mc="http://schemas.openxmlformats.org/markup-compatibility/2006" xmlns:mv="urn:schemas-microsoft-com:mac:vml" xmlns:p="http://schemas.openxmlformats.org/presentationml/2006/main" mc:Ignorable="mv" mc:PreserveAttributes="mv:*">
   <p:cSld>
     <p:spTree>
       <p:nvGrpSpPr>
@@ -8120,7 +8116,7 @@
     </p:spTree>
     <p:extLst>
       <p:ext uri="{BB962C8B-B14F-4D97-AF65-F5344CB8AC3E}">
-        <p14:creationId xmlns:p14="http://schemas.microsoft.com/office/powerpoint/2010/main" val="3921534399"/>
+        <p14:creationId xmlns:p14="http://schemas.microsoft.com/office/powerpoint/2010/main" xmlns:p="http://schemas.openxmlformats.org/presentationml/2006/main" xmlns:r="http://schemas.openxmlformats.org/officeDocument/2006/relationships" xmlns:a="http://schemas.openxmlformats.org/drawingml/2006/main" xmlns="" val="3921534399"/>
       </p:ext>
     </p:extLst>
   </p:cSld>
@@ -8131,7 +8127,7 @@
 </file>
 
 <file path=ppt/slides/slide2.xml><?xml version="1.0" encoding="utf-8"?>
-<p:sld xmlns:a="http://schemas.openxmlformats.org/drawingml/2006/main" xmlns:r="http://schemas.openxmlformats.org/officeDocument/2006/relationships" xmlns:p="http://schemas.openxmlformats.org/presentationml/2006/main">
+<p:sld xmlns:a="http://schemas.openxmlformats.org/drawingml/2006/main" xmlns:r="http://schemas.openxmlformats.org/officeDocument/2006/relationships" xmlns:mc="http://schemas.openxmlformats.org/markup-compatibility/2006" xmlns:mv="urn:schemas-microsoft-com:mac:vml" xmlns:p="http://schemas.openxmlformats.org/presentationml/2006/main" mc:Ignorable="mv" mc:PreserveAttributes="mv:*">
   <p:cSld>
     <p:spTree>
       <p:nvGrpSpPr>
@@ -8198,21 +8194,13 @@
           <a:p>
             <a:r>
               <a:rPr lang="en-US" dirty="0" smtClean="0"/>
-              <a:t>API walkthrough</a:t>
-            </a:r>
-          </a:p>
-          <a:p>
+              <a:t>API </a:t>
+            </a:r>
             <a:r>
               <a:rPr lang="en-US" dirty="0" smtClean="0"/>
-              <a:t>implementation details</a:t>
-            </a:r>
-          </a:p>
-          <a:p>
-            <a:r>
-              <a:rPr lang="en-US" dirty="0" smtClean="0"/>
-              <a:t>API extensions</a:t>
-            </a:r>
-            <a:endParaRPr lang="en-US" dirty="0"/>
+              <a:t>walkthrough</a:t>
+            </a:r>
+            <a:endParaRPr lang="en-US" dirty="0" smtClean="0"/>
           </a:p>
         </p:txBody>
       </p:sp>
@@ -8232,7 +8220,7 @@
 </file>
 
 <file path=ppt/slides/slide20.xml><?xml version="1.0" encoding="utf-8"?>
-<p:sld xmlns:a="http://schemas.openxmlformats.org/drawingml/2006/main" xmlns:r="http://schemas.openxmlformats.org/officeDocument/2006/relationships" xmlns:p="http://schemas.openxmlformats.org/presentationml/2006/main">
+<p:sld xmlns:a="http://schemas.openxmlformats.org/drawingml/2006/main" xmlns:r="http://schemas.openxmlformats.org/officeDocument/2006/relationships" xmlns:mc="http://schemas.openxmlformats.org/markup-compatibility/2006" xmlns:mv="urn:schemas-microsoft-com:mac:vml" xmlns:p="http://schemas.openxmlformats.org/presentationml/2006/main" mc:Ignorable="mv" mc:PreserveAttributes="mv:*">
   <p:cSld>
     <p:bg>
       <p:bgRef idx="1001">
@@ -8431,7 +8419,7 @@
     </p:spTree>
     <p:extLst>
       <p:ext uri="{BB962C8B-B14F-4D97-AF65-F5344CB8AC3E}">
-        <p14:creationId xmlns:p14="http://schemas.microsoft.com/office/powerpoint/2010/main" val="1279084256"/>
+        <p14:creationId xmlns:p14="http://schemas.microsoft.com/office/powerpoint/2010/main" xmlns:p="http://schemas.openxmlformats.org/presentationml/2006/main" xmlns:r="http://schemas.openxmlformats.org/officeDocument/2006/relationships" xmlns:a="http://schemas.openxmlformats.org/drawingml/2006/main" xmlns="" val="1279084256"/>
       </p:ext>
     </p:extLst>
   </p:cSld>
@@ -8442,7 +8430,7 @@
 </file>
 
 <file path=ppt/slides/slide21.xml><?xml version="1.0" encoding="utf-8"?>
-<p:sld xmlns:a="http://schemas.openxmlformats.org/drawingml/2006/main" xmlns:r="http://schemas.openxmlformats.org/officeDocument/2006/relationships" xmlns:p="http://schemas.openxmlformats.org/presentationml/2006/main">
+<p:sld xmlns:a="http://schemas.openxmlformats.org/drawingml/2006/main" xmlns:r="http://schemas.openxmlformats.org/officeDocument/2006/relationships" xmlns:mc="http://schemas.openxmlformats.org/markup-compatibility/2006" xmlns:mv="urn:schemas-microsoft-com:mac:vml" xmlns:p="http://schemas.openxmlformats.org/presentationml/2006/main" mc:Ignorable="mv" mc:PreserveAttributes="mv:*">
   <p:cSld>
     <p:spTree>
       <p:nvGrpSpPr>
@@ -8843,7 +8831,7 @@
     </p:spTree>
     <p:extLst>
       <p:ext uri="{BB962C8B-B14F-4D97-AF65-F5344CB8AC3E}">
-        <p14:creationId xmlns:p14="http://schemas.microsoft.com/office/powerpoint/2010/main" val="393658979"/>
+        <p14:creationId xmlns:p14="http://schemas.microsoft.com/office/powerpoint/2010/main" xmlns:p="http://schemas.openxmlformats.org/presentationml/2006/main" xmlns:r="http://schemas.openxmlformats.org/officeDocument/2006/relationships" xmlns:a="http://schemas.openxmlformats.org/drawingml/2006/main" xmlns="" val="393658979"/>
       </p:ext>
     </p:extLst>
   </p:cSld>
@@ -8854,7 +8842,7 @@
 </file>
 
 <file path=ppt/slides/slide22.xml><?xml version="1.0" encoding="utf-8"?>
-<p:sld xmlns:a="http://schemas.openxmlformats.org/drawingml/2006/main" xmlns:r="http://schemas.openxmlformats.org/officeDocument/2006/relationships" xmlns:p="http://schemas.openxmlformats.org/presentationml/2006/main">
+<p:sld xmlns:a="http://schemas.openxmlformats.org/drawingml/2006/main" xmlns:r="http://schemas.openxmlformats.org/officeDocument/2006/relationships" xmlns:mc="http://schemas.openxmlformats.org/markup-compatibility/2006" xmlns:mv="urn:schemas-microsoft-com:mac:vml" xmlns:p="http://schemas.openxmlformats.org/presentationml/2006/main" mc:Ignorable="mv" mc:PreserveAttributes="mv:*">
   <p:cSld>
     <p:spTree>
       <p:nvGrpSpPr>
@@ -8998,7 +8986,7 @@
     </p:spTree>
     <p:extLst>
       <p:ext uri="{BB962C8B-B14F-4D97-AF65-F5344CB8AC3E}">
-        <p14:creationId xmlns:p14="http://schemas.microsoft.com/office/powerpoint/2010/main" val="2936737826"/>
+        <p14:creationId xmlns:p14="http://schemas.microsoft.com/office/powerpoint/2010/main" xmlns:p="http://schemas.openxmlformats.org/presentationml/2006/main" xmlns:r="http://schemas.openxmlformats.org/officeDocument/2006/relationships" xmlns:a="http://schemas.openxmlformats.org/drawingml/2006/main" xmlns="" val="2936737826"/>
       </p:ext>
     </p:extLst>
   </p:cSld>
@@ -9009,7 +8997,7 @@
 </file>
 
 <file path=ppt/slides/slide23.xml><?xml version="1.0" encoding="utf-8"?>
-<p:sld xmlns:a="http://schemas.openxmlformats.org/drawingml/2006/main" xmlns:r="http://schemas.openxmlformats.org/officeDocument/2006/relationships" xmlns:p="http://schemas.openxmlformats.org/presentationml/2006/main">
+<p:sld xmlns:a="http://schemas.openxmlformats.org/drawingml/2006/main" xmlns:r="http://schemas.openxmlformats.org/officeDocument/2006/relationships" xmlns:mc="http://schemas.openxmlformats.org/markup-compatibility/2006" xmlns:mv="urn:schemas-microsoft-com:mac:vml" xmlns:p="http://schemas.openxmlformats.org/presentationml/2006/main" mc:Ignorable="mv" mc:PreserveAttributes="mv:*">
   <p:cSld>
     <p:spTree>
       <p:nvGrpSpPr>
@@ -9138,15 +9126,7 @@
             <a:pPr marL="285750" indent="-285750"/>
             <a:r>
               <a:rPr lang="en-US" dirty="0" smtClean="0"/>
-              <a:t>entries are </a:t>
-            </a:r>
-            <a:r>
-              <a:rPr lang="en-US" dirty="0" smtClean="0"/>
-              <a:t>assumed to be </a:t>
-            </a:r>
-            <a:r>
-              <a:rPr lang="en-US" dirty="0" smtClean="0"/>
-              <a:t>opaque </a:t>
+              <a:t>entries are assumed to be opaque </a:t>
             </a:r>
             <a:r>
               <a:rPr lang="en-US" dirty="0"/>
@@ -9163,7 +9143,7 @@
     </p:spTree>
     <p:extLst>
       <p:ext uri="{BB962C8B-B14F-4D97-AF65-F5344CB8AC3E}">
-        <p14:creationId xmlns:p14="http://schemas.microsoft.com/office/powerpoint/2010/main" val="3657352639"/>
+        <p14:creationId xmlns:p14="http://schemas.microsoft.com/office/powerpoint/2010/main" xmlns:p="http://schemas.openxmlformats.org/presentationml/2006/main" xmlns:r="http://schemas.openxmlformats.org/officeDocument/2006/relationships" xmlns:a="http://schemas.openxmlformats.org/drawingml/2006/main" xmlns="" val="3657352639"/>
       </p:ext>
     </p:extLst>
   </p:cSld>
@@ -9174,7 +9154,7 @@
 </file>
 
 <file path=ppt/slides/slide24.xml><?xml version="1.0" encoding="utf-8"?>
-<p:sld xmlns:a="http://schemas.openxmlformats.org/drawingml/2006/main" xmlns:r="http://schemas.openxmlformats.org/officeDocument/2006/relationships" xmlns:p="http://schemas.openxmlformats.org/presentationml/2006/main">
+<p:sld xmlns:a="http://schemas.openxmlformats.org/drawingml/2006/main" xmlns:r="http://schemas.openxmlformats.org/officeDocument/2006/relationships" xmlns:mc="http://schemas.openxmlformats.org/markup-compatibility/2006" xmlns:mv="urn:schemas-microsoft-com:mac:vml" xmlns:p="http://schemas.openxmlformats.org/presentationml/2006/main" mc:Ignorable="mv" mc:PreserveAttributes="mv:*">
   <p:cSld>
     <p:spTree>
       <p:nvGrpSpPr>
@@ -9781,7 +9761,7 @@
     </p:spTree>
     <p:extLst>
       <p:ext uri="{BB962C8B-B14F-4D97-AF65-F5344CB8AC3E}">
-        <p14:creationId xmlns:p14="http://schemas.microsoft.com/office/powerpoint/2010/main" val="1668556561"/>
+        <p14:creationId xmlns:p14="http://schemas.microsoft.com/office/powerpoint/2010/main" xmlns:p="http://schemas.openxmlformats.org/presentationml/2006/main" xmlns:r="http://schemas.openxmlformats.org/officeDocument/2006/relationships" xmlns:a="http://schemas.openxmlformats.org/drawingml/2006/main" xmlns="" val="1668556561"/>
       </p:ext>
     </p:extLst>
   </p:cSld>
@@ -9792,7 +9772,7 @@
 </file>
 
 <file path=ppt/slides/slide25.xml><?xml version="1.0" encoding="utf-8"?>
-<p:sld xmlns:a="http://schemas.openxmlformats.org/drawingml/2006/main" xmlns:r="http://schemas.openxmlformats.org/officeDocument/2006/relationships" xmlns:p="http://schemas.openxmlformats.org/presentationml/2006/main">
+<p:sld xmlns:a="http://schemas.openxmlformats.org/drawingml/2006/main" xmlns:r="http://schemas.openxmlformats.org/officeDocument/2006/relationships" xmlns:mc="http://schemas.openxmlformats.org/markup-compatibility/2006" xmlns:mv="urn:schemas-microsoft-com:mac:vml" xmlns:p="http://schemas.openxmlformats.org/presentationml/2006/main" mc:Ignorable="mv" mc:PreserveAttributes="mv:*">
   <p:cSld>
     <p:spTree>
       <p:nvGrpSpPr>
@@ -10076,7 +10056,7 @@
     </p:spTree>
     <p:extLst>
       <p:ext uri="{BB962C8B-B14F-4D97-AF65-F5344CB8AC3E}">
-        <p14:creationId xmlns:p14="http://schemas.microsoft.com/office/powerpoint/2010/main" val="3427845436"/>
+        <p14:creationId xmlns:p14="http://schemas.microsoft.com/office/powerpoint/2010/main" xmlns:p="http://schemas.openxmlformats.org/presentationml/2006/main" xmlns:r="http://schemas.openxmlformats.org/officeDocument/2006/relationships" xmlns:a="http://schemas.openxmlformats.org/drawingml/2006/main" xmlns="" val="3427845436"/>
       </p:ext>
     </p:extLst>
   </p:cSld>
@@ -10087,7 +10067,7 @@
 </file>
 
 <file path=ppt/slides/slide26.xml><?xml version="1.0" encoding="utf-8"?>
-<p:sld xmlns:a="http://schemas.openxmlformats.org/drawingml/2006/main" xmlns:r="http://schemas.openxmlformats.org/officeDocument/2006/relationships" xmlns:p="http://schemas.openxmlformats.org/presentationml/2006/main">
+<p:sld xmlns:a="http://schemas.openxmlformats.org/drawingml/2006/main" xmlns:r="http://schemas.openxmlformats.org/officeDocument/2006/relationships" xmlns:mc="http://schemas.openxmlformats.org/markup-compatibility/2006" xmlns:mv="urn:schemas-microsoft-com:mac:vml" xmlns:p="http://schemas.openxmlformats.org/presentationml/2006/main" mc:Ignorable="mv" mc:PreserveAttributes="mv:*">
   <p:cSld>
     <p:spTree>
       <p:nvGrpSpPr>
@@ -10272,7 +10252,7 @@
     </p:spTree>
     <p:extLst>
       <p:ext uri="{BB962C8B-B14F-4D97-AF65-F5344CB8AC3E}">
-        <p14:creationId xmlns:p14="http://schemas.microsoft.com/office/powerpoint/2010/main" val="3493384740"/>
+        <p14:creationId xmlns:p14="http://schemas.microsoft.com/office/powerpoint/2010/main" xmlns:p="http://schemas.openxmlformats.org/presentationml/2006/main" xmlns:r="http://schemas.openxmlformats.org/officeDocument/2006/relationships" xmlns:a="http://schemas.openxmlformats.org/drawingml/2006/main" xmlns="" val="3493384740"/>
       </p:ext>
     </p:extLst>
   </p:cSld>
@@ -10283,7 +10263,7 @@
 </file>
 
 <file path=ppt/slides/slide27.xml><?xml version="1.0" encoding="utf-8"?>
-<p:sld xmlns:a="http://schemas.openxmlformats.org/drawingml/2006/main" xmlns:r="http://schemas.openxmlformats.org/officeDocument/2006/relationships" xmlns:p="http://schemas.openxmlformats.org/presentationml/2006/main">
+<p:sld xmlns:a="http://schemas.openxmlformats.org/drawingml/2006/main" xmlns:r="http://schemas.openxmlformats.org/officeDocument/2006/relationships" xmlns:mc="http://schemas.openxmlformats.org/markup-compatibility/2006" xmlns:mv="urn:schemas-microsoft-com:mac:vml" xmlns:p="http://schemas.openxmlformats.org/presentationml/2006/main" mc:Ignorable="mv" mc:PreserveAttributes="mv:*">
   <p:cSld>
     <p:spTree>
       <p:nvGrpSpPr>
@@ -10902,7 +10882,7 @@
     </p:spTree>
     <p:extLst>
       <p:ext uri="{BB962C8B-B14F-4D97-AF65-F5344CB8AC3E}">
-        <p14:creationId xmlns:p14="http://schemas.microsoft.com/office/powerpoint/2010/main" val="3124065083"/>
+        <p14:creationId xmlns:p14="http://schemas.microsoft.com/office/powerpoint/2010/main" xmlns:p="http://schemas.openxmlformats.org/presentationml/2006/main" xmlns:r="http://schemas.openxmlformats.org/officeDocument/2006/relationships" xmlns:a="http://schemas.openxmlformats.org/drawingml/2006/main" xmlns="" val="3124065083"/>
       </p:ext>
     </p:extLst>
   </p:cSld>
@@ -10913,7 +10893,7 @@
 </file>
 
 <file path=ppt/slides/slide28.xml><?xml version="1.0" encoding="utf-8"?>
-<p:sld xmlns:a="http://schemas.openxmlformats.org/drawingml/2006/main" xmlns:r="http://schemas.openxmlformats.org/officeDocument/2006/relationships" xmlns:p="http://schemas.openxmlformats.org/presentationml/2006/main">
+<p:sld xmlns:a="http://schemas.openxmlformats.org/drawingml/2006/main" xmlns:r="http://schemas.openxmlformats.org/officeDocument/2006/relationships" xmlns:mc="http://schemas.openxmlformats.org/markup-compatibility/2006" xmlns:mv="urn:schemas-microsoft-com:mac:vml" xmlns:p="http://schemas.openxmlformats.org/presentationml/2006/main" mc:Ignorable="mv" mc:PreserveAttributes="mv:*">
   <p:cSld>
     <p:spTree>
       <p:nvGrpSpPr>
@@ -11074,7 +11054,7 @@
     </p:spTree>
     <p:extLst>
       <p:ext uri="{BB962C8B-B14F-4D97-AF65-F5344CB8AC3E}">
-        <p14:creationId xmlns:p14="http://schemas.microsoft.com/office/powerpoint/2010/main" val="3394878304"/>
+        <p14:creationId xmlns:p14="http://schemas.microsoft.com/office/powerpoint/2010/main" xmlns:p="http://schemas.openxmlformats.org/presentationml/2006/main" xmlns:r="http://schemas.openxmlformats.org/officeDocument/2006/relationships" xmlns:a="http://schemas.openxmlformats.org/drawingml/2006/main" xmlns="" val="3394878304"/>
       </p:ext>
     </p:extLst>
   </p:cSld>
@@ -11085,7 +11065,7 @@
 </file>
 
 <file path=ppt/slides/slide29.xml><?xml version="1.0" encoding="utf-8"?>
-<p:sld xmlns:a="http://schemas.openxmlformats.org/drawingml/2006/main" xmlns:r="http://schemas.openxmlformats.org/officeDocument/2006/relationships" xmlns:p="http://schemas.openxmlformats.org/presentationml/2006/main">
+<p:sld xmlns:a="http://schemas.openxmlformats.org/drawingml/2006/main" xmlns:r="http://schemas.openxmlformats.org/officeDocument/2006/relationships" xmlns:mc="http://schemas.openxmlformats.org/markup-compatibility/2006" xmlns:mv="urn:schemas-microsoft-com:mac:vml" xmlns:p="http://schemas.openxmlformats.org/presentationml/2006/main" mc:Ignorable="mv" mc:PreserveAttributes="mv:*">
   <p:cSld>
     <p:spTree>
       <p:nvGrpSpPr>
@@ -11518,7 +11498,7 @@
     </p:spTree>
     <p:extLst>
       <p:ext uri="{BB962C8B-B14F-4D97-AF65-F5344CB8AC3E}">
-        <p14:creationId xmlns:p14="http://schemas.microsoft.com/office/powerpoint/2010/main" val="3419220388"/>
+        <p14:creationId xmlns:p14="http://schemas.microsoft.com/office/powerpoint/2010/main" xmlns:p="http://schemas.openxmlformats.org/presentationml/2006/main" xmlns:r="http://schemas.openxmlformats.org/officeDocument/2006/relationships" xmlns:a="http://schemas.openxmlformats.org/drawingml/2006/main" xmlns="" val="3419220388"/>
       </p:ext>
     </p:extLst>
   </p:cSld>
@@ -11529,7 +11509,7 @@
 </file>
 
 <file path=ppt/slides/slide3.xml><?xml version="1.0" encoding="utf-8"?>
-<p:sld xmlns:a="http://schemas.openxmlformats.org/drawingml/2006/main" xmlns:r="http://schemas.openxmlformats.org/officeDocument/2006/relationships" xmlns:p="http://schemas.openxmlformats.org/presentationml/2006/main">
+<p:sld xmlns:a="http://schemas.openxmlformats.org/drawingml/2006/main" xmlns:r="http://schemas.openxmlformats.org/officeDocument/2006/relationships" xmlns:mc="http://schemas.openxmlformats.org/markup-compatibility/2006" xmlns:mv="urn:schemas-microsoft-com:mac:vml" xmlns:p="http://schemas.openxmlformats.org/presentationml/2006/main" mc:Ignorable="mv" mc:PreserveAttributes="mv:*">
   <p:cSld>
     <p:spTree>
       <p:nvGrpSpPr>
@@ -11687,7 +11667,7 @@
 </file>
 
 <file path=ppt/slides/slide30.xml><?xml version="1.0" encoding="utf-8"?>
-<p:sld xmlns:a="http://schemas.openxmlformats.org/drawingml/2006/main" xmlns:r="http://schemas.openxmlformats.org/officeDocument/2006/relationships" xmlns:p="http://schemas.openxmlformats.org/presentationml/2006/main">
+<p:sld xmlns:a="http://schemas.openxmlformats.org/drawingml/2006/main" xmlns:r="http://schemas.openxmlformats.org/officeDocument/2006/relationships" xmlns:mc="http://schemas.openxmlformats.org/markup-compatibility/2006" xmlns:mv="urn:schemas-microsoft-com:mac:vml" xmlns:p="http://schemas.openxmlformats.org/presentationml/2006/main" mc:Ignorable="mv" mc:PreserveAttributes="mv:*">
   <p:cSld>
     <p:spTree>
       <p:nvGrpSpPr>
@@ -11801,7 +11781,7 @@
     </p:spTree>
     <p:extLst>
       <p:ext uri="{BB962C8B-B14F-4D97-AF65-F5344CB8AC3E}">
-        <p14:creationId xmlns:p14="http://schemas.microsoft.com/office/powerpoint/2010/main" val="1782586087"/>
+        <p14:creationId xmlns:p14="http://schemas.microsoft.com/office/powerpoint/2010/main" xmlns:p="http://schemas.openxmlformats.org/presentationml/2006/main" xmlns:r="http://schemas.openxmlformats.org/officeDocument/2006/relationships" xmlns:a="http://schemas.openxmlformats.org/drawingml/2006/main" xmlns="" val="1782586087"/>
       </p:ext>
     </p:extLst>
   </p:cSld>
@@ -11812,7 +11792,7 @@
 </file>
 
 <file path=ppt/slides/slide31.xml><?xml version="1.0" encoding="utf-8"?>
-<p:sld xmlns:a="http://schemas.openxmlformats.org/drawingml/2006/main" xmlns:r="http://schemas.openxmlformats.org/officeDocument/2006/relationships" xmlns:p="http://schemas.openxmlformats.org/presentationml/2006/main">
+<p:sld xmlns:a="http://schemas.openxmlformats.org/drawingml/2006/main" xmlns:r="http://schemas.openxmlformats.org/officeDocument/2006/relationships" xmlns:mc="http://schemas.openxmlformats.org/markup-compatibility/2006" xmlns:mv="urn:schemas-microsoft-com:mac:vml" xmlns:p="http://schemas.openxmlformats.org/presentationml/2006/main" mc:Ignorable="mv" mc:PreserveAttributes="mv:*">
   <p:cSld>
     <p:spTree>
       <p:nvGrpSpPr>
@@ -12479,7 +12459,7 @@
     </p:spTree>
     <p:extLst>
       <p:ext uri="{BB962C8B-B14F-4D97-AF65-F5344CB8AC3E}">
-        <p14:creationId xmlns:p14="http://schemas.microsoft.com/office/powerpoint/2010/main" val="2979891476"/>
+        <p14:creationId xmlns:p14="http://schemas.microsoft.com/office/powerpoint/2010/main" xmlns:p="http://schemas.openxmlformats.org/presentationml/2006/main" xmlns:r="http://schemas.openxmlformats.org/officeDocument/2006/relationships" xmlns:a="http://schemas.openxmlformats.org/drawingml/2006/main" xmlns="" val="2979891476"/>
       </p:ext>
     </p:extLst>
   </p:cSld>
@@ -12490,7 +12470,7 @@
 </file>
 
 <file path=ppt/slides/slide32.xml><?xml version="1.0" encoding="utf-8"?>
-<p:sld xmlns:a="http://schemas.openxmlformats.org/drawingml/2006/main" xmlns:r="http://schemas.openxmlformats.org/officeDocument/2006/relationships" xmlns:p="http://schemas.openxmlformats.org/presentationml/2006/main">
+<p:sld xmlns:a="http://schemas.openxmlformats.org/drawingml/2006/main" xmlns:r="http://schemas.openxmlformats.org/officeDocument/2006/relationships" xmlns:mc="http://schemas.openxmlformats.org/markup-compatibility/2006" xmlns:mv="urn:schemas-microsoft-com:mac:vml" xmlns:p="http://schemas.openxmlformats.org/presentationml/2006/main" mc:Ignorable="mv" mc:PreserveAttributes="mv:*">
   <p:cSld>
     <p:spTree>
       <p:nvGrpSpPr>
@@ -12878,7 +12858,7 @@
     </p:spTree>
     <p:extLst>
       <p:ext uri="{BB962C8B-B14F-4D97-AF65-F5344CB8AC3E}">
-        <p14:creationId xmlns:p14="http://schemas.microsoft.com/office/powerpoint/2010/main" val="1920102061"/>
+        <p14:creationId xmlns:p14="http://schemas.microsoft.com/office/powerpoint/2010/main" xmlns:p="http://schemas.openxmlformats.org/presentationml/2006/main" xmlns:r="http://schemas.openxmlformats.org/officeDocument/2006/relationships" xmlns:a="http://schemas.openxmlformats.org/drawingml/2006/main" xmlns="" val="1920102061"/>
       </p:ext>
     </p:extLst>
   </p:cSld>
@@ -12889,7 +12869,7 @@
 </file>
 
 <file path=ppt/slides/slide33.xml><?xml version="1.0" encoding="utf-8"?>
-<p:sld xmlns:a="http://schemas.openxmlformats.org/drawingml/2006/main" xmlns:r="http://schemas.openxmlformats.org/officeDocument/2006/relationships" xmlns:p="http://schemas.openxmlformats.org/presentationml/2006/main">
+<p:sld xmlns:a="http://schemas.openxmlformats.org/drawingml/2006/main" xmlns:r="http://schemas.openxmlformats.org/officeDocument/2006/relationships" xmlns:mc="http://schemas.openxmlformats.org/markup-compatibility/2006" xmlns:mv="urn:schemas-microsoft-com:mac:vml" xmlns:p="http://schemas.openxmlformats.org/presentationml/2006/main" mc:Ignorable="mv" mc:PreserveAttributes="mv:*">
   <p:cSld>
     <p:spTree>
       <p:nvGrpSpPr>
@@ -12954,7 +12934,7 @@
     </p:spTree>
     <p:extLst>
       <p:ext uri="{BB962C8B-B14F-4D97-AF65-F5344CB8AC3E}">
-        <p14:creationId xmlns:p14="http://schemas.microsoft.com/office/powerpoint/2010/main" val="379548810"/>
+        <p14:creationId xmlns:p14="http://schemas.microsoft.com/office/powerpoint/2010/main" xmlns:p="http://schemas.openxmlformats.org/presentationml/2006/main" xmlns:r="http://schemas.openxmlformats.org/officeDocument/2006/relationships" xmlns:a="http://schemas.openxmlformats.org/drawingml/2006/main" xmlns="" val="379548810"/>
       </p:ext>
     </p:extLst>
   </p:cSld>
@@ -12965,7 +12945,7 @@
 </file>
 
 <file path=ppt/slides/slide34.xml><?xml version="1.0" encoding="utf-8"?>
-<p:sld xmlns:a="http://schemas.openxmlformats.org/drawingml/2006/main" xmlns:r="http://schemas.openxmlformats.org/officeDocument/2006/relationships" xmlns:p="http://schemas.openxmlformats.org/presentationml/2006/main">
+<p:sld xmlns:a="http://schemas.openxmlformats.org/drawingml/2006/main" xmlns:r="http://schemas.openxmlformats.org/officeDocument/2006/relationships" xmlns:mc="http://schemas.openxmlformats.org/markup-compatibility/2006" xmlns:mv="urn:schemas-microsoft-com:mac:vml" xmlns:p="http://schemas.openxmlformats.org/presentationml/2006/main" mc:Ignorable="mv" mc:PreserveAttributes="mv:*">
   <p:cSld>
     <p:spTree>
       <p:nvGrpSpPr>
@@ -13537,7 +13517,7 @@
     </p:spTree>
     <p:extLst>
       <p:ext uri="{BB962C8B-B14F-4D97-AF65-F5344CB8AC3E}">
-        <p14:creationId xmlns:p14="http://schemas.microsoft.com/office/powerpoint/2010/main" val="2115472614"/>
+        <p14:creationId xmlns:p14="http://schemas.microsoft.com/office/powerpoint/2010/main" xmlns:p="http://schemas.openxmlformats.org/presentationml/2006/main" xmlns:r="http://schemas.openxmlformats.org/officeDocument/2006/relationships" xmlns:a="http://schemas.openxmlformats.org/drawingml/2006/main" xmlns="" val="2115472614"/>
       </p:ext>
     </p:extLst>
   </p:cSld>
@@ -13548,7 +13528,7 @@
 </file>
 
 <file path=ppt/slides/slide35.xml><?xml version="1.0" encoding="utf-8"?>
-<p:sld xmlns:a="http://schemas.openxmlformats.org/drawingml/2006/main" xmlns:r="http://schemas.openxmlformats.org/officeDocument/2006/relationships" xmlns:p="http://schemas.openxmlformats.org/presentationml/2006/main">
+<p:sld xmlns:a="http://schemas.openxmlformats.org/drawingml/2006/main" xmlns:r="http://schemas.openxmlformats.org/officeDocument/2006/relationships" xmlns:mc="http://schemas.openxmlformats.org/markup-compatibility/2006" xmlns:mv="urn:schemas-microsoft-com:mac:vml" xmlns:p="http://schemas.openxmlformats.org/presentationml/2006/main" mc:Ignorable="mv" mc:PreserveAttributes="mv:*">
   <p:cSld>
     <p:spTree>
       <p:nvGrpSpPr>
@@ -13691,7 +13671,7 @@
     </p:spTree>
     <p:extLst>
       <p:ext uri="{BB962C8B-B14F-4D97-AF65-F5344CB8AC3E}">
-        <p14:creationId xmlns:p14="http://schemas.microsoft.com/office/powerpoint/2010/main" val="709120760"/>
+        <p14:creationId xmlns:p14="http://schemas.microsoft.com/office/powerpoint/2010/main" xmlns:p="http://schemas.openxmlformats.org/presentationml/2006/main" xmlns:r="http://schemas.openxmlformats.org/officeDocument/2006/relationships" xmlns:a="http://schemas.openxmlformats.org/drawingml/2006/main" xmlns="" val="709120760"/>
       </p:ext>
     </p:extLst>
   </p:cSld>
@@ -13702,7 +13682,7 @@
 </file>
 
 <file path=ppt/slides/slide36.xml><?xml version="1.0" encoding="utf-8"?>
-<p:sld xmlns:a="http://schemas.openxmlformats.org/drawingml/2006/main" xmlns:r="http://schemas.openxmlformats.org/officeDocument/2006/relationships" xmlns:p="http://schemas.openxmlformats.org/presentationml/2006/main">
+<p:sld xmlns:a="http://schemas.openxmlformats.org/drawingml/2006/main" xmlns:r="http://schemas.openxmlformats.org/officeDocument/2006/relationships" xmlns:mc="http://schemas.openxmlformats.org/markup-compatibility/2006" xmlns:mv="urn:schemas-microsoft-com:mac:vml" xmlns:p="http://schemas.openxmlformats.org/presentationml/2006/main" mc:Ignorable="mv" mc:PreserveAttributes="mv:*">
   <p:cSld>
     <p:spTree>
       <p:nvGrpSpPr>
@@ -14048,7 +14028,7 @@
     </p:spTree>
     <p:extLst>
       <p:ext uri="{BB962C8B-B14F-4D97-AF65-F5344CB8AC3E}">
-        <p14:creationId xmlns:p14="http://schemas.microsoft.com/office/powerpoint/2010/main" val="2065531179"/>
+        <p14:creationId xmlns:p14="http://schemas.microsoft.com/office/powerpoint/2010/main" xmlns:p="http://schemas.openxmlformats.org/presentationml/2006/main" xmlns:r="http://schemas.openxmlformats.org/officeDocument/2006/relationships" xmlns:a="http://schemas.openxmlformats.org/drawingml/2006/main" xmlns="" val="2065531179"/>
       </p:ext>
     </p:extLst>
   </p:cSld>
@@ -14059,7 +14039,7 @@
 </file>
 
 <file path=ppt/slides/slide37.xml><?xml version="1.0" encoding="utf-8"?>
-<p:sld xmlns:a="http://schemas.openxmlformats.org/drawingml/2006/main" xmlns:r="http://schemas.openxmlformats.org/officeDocument/2006/relationships" xmlns:p="http://schemas.openxmlformats.org/presentationml/2006/main">
+<p:sld xmlns:a="http://schemas.openxmlformats.org/drawingml/2006/main" xmlns:r="http://schemas.openxmlformats.org/officeDocument/2006/relationships" xmlns:mc="http://schemas.openxmlformats.org/markup-compatibility/2006" xmlns:mv="urn:schemas-microsoft-com:mac:vml" xmlns:p="http://schemas.openxmlformats.org/presentationml/2006/main" mc:Ignorable="mv" mc:PreserveAttributes="mv:*">
   <p:cSld>
     <p:spTree>
       <p:nvGrpSpPr>
@@ -14441,7 +14421,7 @@
     </p:spTree>
     <p:extLst>
       <p:ext uri="{BB962C8B-B14F-4D97-AF65-F5344CB8AC3E}">
-        <p14:creationId xmlns:p14="http://schemas.microsoft.com/office/powerpoint/2010/main" val="3629655379"/>
+        <p14:creationId xmlns:p14="http://schemas.microsoft.com/office/powerpoint/2010/main" xmlns:p="http://schemas.openxmlformats.org/presentationml/2006/main" xmlns:r="http://schemas.openxmlformats.org/officeDocument/2006/relationships" xmlns:a="http://schemas.openxmlformats.org/drawingml/2006/main" xmlns="" val="3629655379"/>
       </p:ext>
     </p:extLst>
   </p:cSld>
@@ -14452,7 +14432,7 @@
 </file>
 
 <file path=ppt/slides/slide38.xml><?xml version="1.0" encoding="utf-8"?>
-<p:sld xmlns:a="http://schemas.openxmlformats.org/drawingml/2006/main" xmlns:r="http://schemas.openxmlformats.org/officeDocument/2006/relationships" xmlns:p="http://schemas.openxmlformats.org/presentationml/2006/main">
+<p:sld xmlns:a="http://schemas.openxmlformats.org/drawingml/2006/main" xmlns:r="http://schemas.openxmlformats.org/officeDocument/2006/relationships" xmlns:mc="http://schemas.openxmlformats.org/markup-compatibility/2006" xmlns:mv="urn:schemas-microsoft-com:mac:vml" xmlns:p="http://schemas.openxmlformats.org/presentationml/2006/main" mc:Ignorable="mv" mc:PreserveAttributes="mv:*">
   <p:cSld>
     <p:spTree>
       <p:nvGrpSpPr>
@@ -14653,7 +14633,7 @@
     </p:spTree>
     <p:extLst>
       <p:ext uri="{BB962C8B-B14F-4D97-AF65-F5344CB8AC3E}">
-        <p14:creationId xmlns:p14="http://schemas.microsoft.com/office/powerpoint/2010/main" val="2400555662"/>
+        <p14:creationId xmlns:p14="http://schemas.microsoft.com/office/powerpoint/2010/main" xmlns:p="http://schemas.openxmlformats.org/presentationml/2006/main" xmlns:r="http://schemas.openxmlformats.org/officeDocument/2006/relationships" xmlns:a="http://schemas.openxmlformats.org/drawingml/2006/main" xmlns="" val="2400555662"/>
       </p:ext>
     </p:extLst>
   </p:cSld>
@@ -14664,7 +14644,7 @@
 </file>
 
 <file path=ppt/slides/slide39.xml><?xml version="1.0" encoding="utf-8"?>
-<p:sld xmlns:a="http://schemas.openxmlformats.org/drawingml/2006/main" xmlns:r="http://schemas.openxmlformats.org/officeDocument/2006/relationships" xmlns:p="http://schemas.openxmlformats.org/presentationml/2006/main">
+<p:sld xmlns:a="http://schemas.openxmlformats.org/drawingml/2006/main" xmlns:r="http://schemas.openxmlformats.org/officeDocument/2006/relationships" xmlns:mc="http://schemas.openxmlformats.org/markup-compatibility/2006" xmlns:mv="urn:schemas-microsoft-com:mac:vml" xmlns:p="http://schemas.openxmlformats.org/presentationml/2006/main" mc:Ignorable="mv" mc:PreserveAttributes="mv:*">
   <p:cSld>
     <p:spTree>
       <p:nvGrpSpPr>
@@ -14717,7 +14697,7 @@
           <a:blip r:embed="rId2">
             <a:extLst>
               <a:ext uri="{28A0092B-C50C-407E-A947-70E740481C1C}">
-                <a14:useLocalDpi xmlns:a14="http://schemas.microsoft.com/office/drawing/2010/main" val="0"/>
+                <a14:useLocalDpi xmlns:a14="http://schemas.microsoft.com/office/drawing/2010/main" xmlns:p="http://schemas.openxmlformats.org/presentationml/2006/main" xmlns:r="http://schemas.openxmlformats.org/officeDocument/2006/relationships" xmlns:a="http://schemas.openxmlformats.org/drawingml/2006/main" xmlns="" val="0"/>
               </a:ext>
             </a:extLst>
           </a:blip>
@@ -14735,7 +14715,7 @@
     </p:spTree>
     <p:extLst>
       <p:ext uri="{BB962C8B-B14F-4D97-AF65-F5344CB8AC3E}">
-        <p14:creationId xmlns:p14="http://schemas.microsoft.com/office/powerpoint/2010/main" val="2314353703"/>
+        <p14:creationId xmlns:p14="http://schemas.microsoft.com/office/powerpoint/2010/main" xmlns:p="http://schemas.openxmlformats.org/presentationml/2006/main" xmlns:r="http://schemas.openxmlformats.org/officeDocument/2006/relationships" xmlns:a="http://schemas.openxmlformats.org/drawingml/2006/main" xmlns="" val="2314353703"/>
       </p:ext>
     </p:extLst>
   </p:cSld>
@@ -14746,7 +14726,7 @@
 </file>
 
 <file path=ppt/slides/slide4.xml><?xml version="1.0" encoding="utf-8"?>
-<p:sld xmlns:a="http://schemas.openxmlformats.org/drawingml/2006/main" xmlns:r="http://schemas.openxmlformats.org/officeDocument/2006/relationships" xmlns:p="http://schemas.openxmlformats.org/presentationml/2006/main">
+<p:sld xmlns:a="http://schemas.openxmlformats.org/drawingml/2006/main" xmlns:r="http://schemas.openxmlformats.org/officeDocument/2006/relationships" xmlns:mc="http://schemas.openxmlformats.org/markup-compatibility/2006" xmlns:mv="urn:schemas-microsoft-com:mac:vml" xmlns:p="http://schemas.openxmlformats.org/presentationml/2006/main" mc:Ignorable="mv" mc:PreserveAttributes="mv:*">
   <p:cSld>
     <p:spTree>
       <p:nvGrpSpPr>
@@ -15144,7 +15124,7 @@
 </file>
 
 <file path=ppt/slides/slide40.xml><?xml version="1.0" encoding="utf-8"?>
-<p:sld xmlns:a="http://schemas.openxmlformats.org/drawingml/2006/main" xmlns:r="http://schemas.openxmlformats.org/officeDocument/2006/relationships" xmlns:p="http://schemas.openxmlformats.org/presentationml/2006/main">
+<p:sld xmlns:a="http://schemas.openxmlformats.org/drawingml/2006/main" xmlns:r="http://schemas.openxmlformats.org/officeDocument/2006/relationships" xmlns:mc="http://schemas.openxmlformats.org/markup-compatibility/2006" xmlns:mv="urn:schemas-microsoft-com:mac:vml" xmlns:p="http://schemas.openxmlformats.org/presentationml/2006/main" mc:Ignorable="mv" mc:PreserveAttributes="mv:*">
   <p:cSld>
     <p:spTree>
       <p:nvGrpSpPr>
@@ -15494,7 +15474,7 @@
     </p:spTree>
     <p:extLst>
       <p:ext uri="{BB962C8B-B14F-4D97-AF65-F5344CB8AC3E}">
-        <p14:creationId xmlns:p14="http://schemas.microsoft.com/office/powerpoint/2010/main" val="847814926"/>
+        <p14:creationId xmlns:p14="http://schemas.microsoft.com/office/powerpoint/2010/main" xmlns:p="http://schemas.openxmlformats.org/presentationml/2006/main" xmlns:r="http://schemas.openxmlformats.org/officeDocument/2006/relationships" xmlns:a="http://schemas.openxmlformats.org/drawingml/2006/main" xmlns="" val="847814926"/>
       </p:ext>
     </p:extLst>
   </p:cSld>
@@ -15505,7 +15485,7 @@
 </file>
 
 <file path=ppt/slides/slide41.xml><?xml version="1.0" encoding="utf-8"?>
-<p:sld xmlns:a="http://schemas.openxmlformats.org/drawingml/2006/main" xmlns:r="http://schemas.openxmlformats.org/officeDocument/2006/relationships" xmlns:p="http://schemas.openxmlformats.org/presentationml/2006/main">
+<p:sld xmlns:a="http://schemas.openxmlformats.org/drawingml/2006/main" xmlns:r="http://schemas.openxmlformats.org/officeDocument/2006/relationships" xmlns:mc="http://schemas.openxmlformats.org/markup-compatibility/2006" xmlns:mv="urn:schemas-microsoft-com:mac:vml" xmlns:p="http://schemas.openxmlformats.org/presentationml/2006/main" mc:Ignorable="mv" mc:PreserveAttributes="mv:*">
   <p:cSld>
     <p:spTree>
       <p:nvGrpSpPr>
@@ -16055,7 +16035,7 @@
     </p:spTree>
     <p:extLst>
       <p:ext uri="{BB962C8B-B14F-4D97-AF65-F5344CB8AC3E}">
-        <p14:creationId xmlns:p14="http://schemas.microsoft.com/office/powerpoint/2010/main" val="2958372846"/>
+        <p14:creationId xmlns:p14="http://schemas.microsoft.com/office/powerpoint/2010/main" xmlns:p="http://schemas.openxmlformats.org/presentationml/2006/main" xmlns:r="http://schemas.openxmlformats.org/officeDocument/2006/relationships" xmlns:a="http://schemas.openxmlformats.org/drawingml/2006/main" xmlns="" val="2958372846"/>
       </p:ext>
     </p:extLst>
   </p:cSld>
@@ -16066,7 +16046,7 @@
 </file>
 
 <file path=ppt/slides/slide42.xml><?xml version="1.0" encoding="utf-8"?>
-<p:sld xmlns:a="http://schemas.openxmlformats.org/drawingml/2006/main" xmlns:r="http://schemas.openxmlformats.org/officeDocument/2006/relationships" xmlns:p="http://schemas.openxmlformats.org/presentationml/2006/main">
+<p:sld xmlns:a="http://schemas.openxmlformats.org/drawingml/2006/main" xmlns:r="http://schemas.openxmlformats.org/officeDocument/2006/relationships" xmlns:mc="http://schemas.openxmlformats.org/markup-compatibility/2006" xmlns:mv="urn:schemas-microsoft-com:mac:vml" xmlns:p="http://schemas.openxmlformats.org/presentationml/2006/main" mc:Ignorable="mv" mc:PreserveAttributes="mv:*">
   <p:cSld>
     <p:spTree>
       <p:nvGrpSpPr>
@@ -16642,7 +16622,7 @@
     </p:spTree>
     <p:extLst>
       <p:ext uri="{BB962C8B-B14F-4D97-AF65-F5344CB8AC3E}">
-        <p14:creationId xmlns:p14="http://schemas.microsoft.com/office/powerpoint/2010/main" val="2570867600"/>
+        <p14:creationId xmlns:p14="http://schemas.microsoft.com/office/powerpoint/2010/main" xmlns:p="http://schemas.openxmlformats.org/presentationml/2006/main" xmlns:r="http://schemas.openxmlformats.org/officeDocument/2006/relationships" xmlns:a="http://schemas.openxmlformats.org/drawingml/2006/main" xmlns="" val="2570867600"/>
       </p:ext>
     </p:extLst>
   </p:cSld>
@@ -16653,7 +16633,7 @@
 </file>
 
 <file path=ppt/slides/slide43.xml><?xml version="1.0" encoding="utf-8"?>
-<p:sld xmlns:a="http://schemas.openxmlformats.org/drawingml/2006/main" xmlns:r="http://schemas.openxmlformats.org/officeDocument/2006/relationships" xmlns:p="http://schemas.openxmlformats.org/presentationml/2006/main">
+<p:sld xmlns:a="http://schemas.openxmlformats.org/drawingml/2006/main" xmlns:r="http://schemas.openxmlformats.org/officeDocument/2006/relationships" xmlns:mc="http://schemas.openxmlformats.org/markup-compatibility/2006" xmlns:mv="urn:schemas-microsoft-com:mac:vml" xmlns:p="http://schemas.openxmlformats.org/presentationml/2006/main" mc:Ignorable="mv" mc:PreserveAttributes="mv:*">
   <p:cSld>
     <p:spTree>
       <p:nvGrpSpPr>
@@ -17076,7 +17056,7 @@
     </p:spTree>
     <p:extLst>
       <p:ext uri="{BB962C8B-B14F-4D97-AF65-F5344CB8AC3E}">
-        <p14:creationId xmlns:p14="http://schemas.microsoft.com/office/powerpoint/2010/main" val="2697782710"/>
+        <p14:creationId xmlns:p14="http://schemas.microsoft.com/office/powerpoint/2010/main" xmlns:p="http://schemas.openxmlformats.org/presentationml/2006/main" xmlns:r="http://schemas.openxmlformats.org/officeDocument/2006/relationships" xmlns:a="http://schemas.openxmlformats.org/drawingml/2006/main" xmlns="" val="2697782710"/>
       </p:ext>
     </p:extLst>
   </p:cSld>
@@ -17087,7 +17067,7 @@
 </file>
 
 <file path=ppt/slides/slide44.xml><?xml version="1.0" encoding="utf-8"?>
-<p:sld xmlns:a="http://schemas.openxmlformats.org/drawingml/2006/main" xmlns:r="http://schemas.openxmlformats.org/officeDocument/2006/relationships" xmlns:p="http://schemas.openxmlformats.org/presentationml/2006/main">
+<p:sld xmlns:a="http://schemas.openxmlformats.org/drawingml/2006/main" xmlns:r="http://schemas.openxmlformats.org/officeDocument/2006/relationships" xmlns:mc="http://schemas.openxmlformats.org/markup-compatibility/2006" xmlns:mv="urn:schemas-microsoft-com:mac:vml" xmlns:p="http://schemas.openxmlformats.org/presentationml/2006/main" mc:Ignorable="mv" mc:PreserveAttributes="mv:*">
   <p:cSld>
     <p:spTree>
       <p:nvGrpSpPr>
@@ -17496,7 +17476,7 @@
     </p:spTree>
     <p:extLst>
       <p:ext uri="{BB962C8B-B14F-4D97-AF65-F5344CB8AC3E}">
-        <p14:creationId xmlns:p14="http://schemas.microsoft.com/office/powerpoint/2010/main" val="3573218890"/>
+        <p14:creationId xmlns:p14="http://schemas.microsoft.com/office/powerpoint/2010/main" xmlns:p="http://schemas.openxmlformats.org/presentationml/2006/main" xmlns:r="http://schemas.openxmlformats.org/officeDocument/2006/relationships" xmlns:a="http://schemas.openxmlformats.org/drawingml/2006/main" xmlns="" val="3573218890"/>
       </p:ext>
     </p:extLst>
   </p:cSld>
@@ -17507,7 +17487,7 @@
 </file>
 
 <file path=ppt/slides/slide5.xml><?xml version="1.0" encoding="utf-8"?>
-<p:sld xmlns:a="http://schemas.openxmlformats.org/drawingml/2006/main" xmlns:r="http://schemas.openxmlformats.org/officeDocument/2006/relationships" xmlns:p="http://schemas.openxmlformats.org/presentationml/2006/main">
+<p:sld xmlns:a="http://schemas.openxmlformats.org/drawingml/2006/main" xmlns:r="http://schemas.openxmlformats.org/officeDocument/2006/relationships" xmlns:mc="http://schemas.openxmlformats.org/markup-compatibility/2006" xmlns:mv="urn:schemas-microsoft-com:mac:vml" xmlns:p="http://schemas.openxmlformats.org/presentationml/2006/main" mc:Ignorable="mv" mc:PreserveAttributes="mv:*">
   <p:cSld>
     <p:spTree>
       <p:nvGrpSpPr>
@@ -17608,7 +17588,7 @@
 </file>
 
 <file path=ppt/slides/slide6.xml><?xml version="1.0" encoding="utf-8"?>
-<p:sld xmlns:a="http://schemas.openxmlformats.org/drawingml/2006/main" xmlns:r="http://schemas.openxmlformats.org/officeDocument/2006/relationships" xmlns:p="http://schemas.openxmlformats.org/presentationml/2006/main">
+<p:sld xmlns:a="http://schemas.openxmlformats.org/drawingml/2006/main" xmlns:r="http://schemas.openxmlformats.org/officeDocument/2006/relationships" xmlns:mc="http://schemas.openxmlformats.org/markup-compatibility/2006" xmlns:mv="urn:schemas-microsoft-com:mac:vml" xmlns:p="http://schemas.openxmlformats.org/presentationml/2006/main" mc:Ignorable="mv" mc:PreserveAttributes="mv:*">
   <p:cSld>
     <p:spTree>
       <p:nvGrpSpPr>
@@ -18025,7 +18005,7 @@
 </file>
 
 <file path=ppt/slides/slide7.xml><?xml version="1.0" encoding="utf-8"?>
-<p:sld xmlns:a="http://schemas.openxmlformats.org/drawingml/2006/main" xmlns:r="http://schemas.openxmlformats.org/officeDocument/2006/relationships" xmlns:p="http://schemas.openxmlformats.org/presentationml/2006/main">
+<p:sld xmlns:a="http://schemas.openxmlformats.org/drawingml/2006/main" xmlns:r="http://schemas.openxmlformats.org/officeDocument/2006/relationships" xmlns:mc="http://schemas.openxmlformats.org/markup-compatibility/2006" xmlns:mv="urn:schemas-microsoft-com:mac:vml" xmlns:p="http://schemas.openxmlformats.org/presentationml/2006/main" mc:Ignorable="mv" mc:PreserveAttributes="mv:*">
   <p:cSld>
     <p:spTree>
       <p:nvGrpSpPr>
@@ -18429,7 +18409,7 @@
 </file>
 
 <file path=ppt/slides/slide8.xml><?xml version="1.0" encoding="utf-8"?>
-<p:sld xmlns:a="http://schemas.openxmlformats.org/drawingml/2006/main" xmlns:r="http://schemas.openxmlformats.org/officeDocument/2006/relationships" xmlns:p="http://schemas.openxmlformats.org/presentationml/2006/main">
+<p:sld xmlns:a="http://schemas.openxmlformats.org/drawingml/2006/main" xmlns:r="http://schemas.openxmlformats.org/officeDocument/2006/relationships" xmlns:mc="http://schemas.openxmlformats.org/markup-compatibility/2006" xmlns:mv="urn:schemas-microsoft-com:mac:vml" xmlns:p="http://schemas.openxmlformats.org/presentationml/2006/main" mc:Ignorable="mv" mc:PreserveAttributes="mv:*">
   <p:cSld>
     <p:spTree>
       <p:nvGrpSpPr>
@@ -18535,7 +18515,7 @@
 </file>
 
 <file path=ppt/slides/slide9.xml><?xml version="1.0" encoding="utf-8"?>
-<p:sld xmlns:a="http://schemas.openxmlformats.org/drawingml/2006/main" xmlns:r="http://schemas.openxmlformats.org/officeDocument/2006/relationships" xmlns:p="http://schemas.openxmlformats.org/presentationml/2006/main">
+<p:sld xmlns:a="http://schemas.openxmlformats.org/drawingml/2006/main" xmlns:r="http://schemas.openxmlformats.org/officeDocument/2006/relationships" xmlns:mc="http://schemas.openxmlformats.org/markup-compatibility/2006" xmlns:mv="urn:schemas-microsoft-com:mac:vml" xmlns:p="http://schemas.openxmlformats.org/presentationml/2006/main" mc:Ignorable="mv" mc:PreserveAttributes="mv:*">
   <p:cSld>
     <p:bg>
       <p:bgRef idx="1001">

</xml_diff>